<commit_message>
sửa vài chỗ nhỏ
</commit_message>
<xml_diff>
--- a/BÀI THUYẾT TRÌNH MẪU.pptx
+++ b/BÀI THUYẾT TRÌNH MẪU.pptx
@@ -5,23 +5,23 @@
     <p:sldMasterId id="2147483648" r:id="rId1"/>
   </p:sldMasterIdLst>
   <p:sldIdLst>
-    <p:sldId id="256" r:id="rId3"/>
-    <p:sldId id="257" r:id="rId4"/>
-    <p:sldId id="261" r:id="rId5"/>
-    <p:sldId id="271" r:id="rId6"/>
-    <p:sldId id="258" r:id="rId7"/>
-    <p:sldId id="281" r:id="rId8"/>
-    <p:sldId id="286" r:id="rId9"/>
-    <p:sldId id="282" r:id="rId10"/>
-    <p:sldId id="285" r:id="rId11"/>
-    <p:sldId id="283" r:id="rId12"/>
-    <p:sldId id="263" r:id="rId13"/>
-    <p:sldId id="259" r:id="rId14"/>
-    <p:sldId id="264" r:id="rId15"/>
-    <p:sldId id="260" r:id="rId16"/>
-    <p:sldId id="265" r:id="rId17"/>
-    <p:sldId id="266" r:id="rId18"/>
-    <p:sldId id="262" r:id="rId19"/>
+    <p:sldId id="256" r:id="rId2"/>
+    <p:sldId id="257" r:id="rId3"/>
+    <p:sldId id="261" r:id="rId4"/>
+    <p:sldId id="271" r:id="rId5"/>
+    <p:sldId id="258" r:id="rId6"/>
+    <p:sldId id="281" r:id="rId7"/>
+    <p:sldId id="286" r:id="rId8"/>
+    <p:sldId id="282" r:id="rId9"/>
+    <p:sldId id="285" r:id="rId10"/>
+    <p:sldId id="283" r:id="rId11"/>
+    <p:sldId id="263" r:id="rId12"/>
+    <p:sldId id="259" r:id="rId13"/>
+    <p:sldId id="264" r:id="rId14"/>
+    <p:sldId id="260" r:id="rId15"/>
+    <p:sldId id="265" r:id="rId16"/>
+    <p:sldId id="266" r:id="rId17"/>
+    <p:sldId id="262" r:id="rId18"/>
   </p:sldIdLst>
   <p:sldSz cx="9144000" cy="6858000" type="screen4x3"/>
   <p:notesSz cx="6858000" cy="9144000"/>
@@ -150,11 +150,16 @@
       </a:defRPr>
     </a:lvl9pPr>
   </p:defaultTextStyle>
+  <p:extLst>
+    <p:ext uri="{EFAFB233-063F-42B5-8137-9DF3F51BA10A}">
+      <p15:sldGuideLst xmlns:p15="http://schemas.microsoft.com/office/powerpoint/2012/main"/>
+    </p:ext>
+  </p:extLst>
 </p:presentation>
 </file>
 
 <file path=ppt/slideLayouts/slideLayout1.xml><?xml version="1.0" encoding="utf-8"?>
-<p:sldLayout xmlns:a="http://schemas.openxmlformats.org/drawingml/2006/main" xmlns:r="http://schemas.openxmlformats.org/officeDocument/2006/relationships" xmlns:p="http://schemas.openxmlformats.org/presentationml/2006/main" type="title" preserve="1" showMasterSp="0">
+<p:sldLayout xmlns:a="http://schemas.openxmlformats.org/drawingml/2006/main" xmlns:r="http://schemas.openxmlformats.org/officeDocument/2006/relationships" xmlns:p="http://schemas.openxmlformats.org/presentationml/2006/main" showMasterSp="0" type="title" preserve="1">
   <p:cSld name="Title Slide">
     <p:spTree>
       <p:nvGrpSpPr>
@@ -592,6 +597,7 @@
                   <a:schemeClr val="bg1"/>
                 </a:solidFill>
               </a:rPr>
+              <a:t>‹#›</a:t>
             </a:fld>
             <a:endParaRPr lang="en-US" altLang="en-US" sz="1200">
               <a:solidFill>
@@ -648,7 +654,6 @@
               <a:rPr lang="en-US"/>
               <a:t>Click to edit Master title style</a:t>
             </a:r>
-            <a:endParaRPr lang="en-US"/>
           </a:p>
         </p:txBody>
       </p:sp>
@@ -672,7 +677,6 @@
               <a:rPr lang="en-US"/>
               <a:t>Click to edit Master text styles</a:t>
             </a:r>
-            <a:endParaRPr lang="en-US"/>
           </a:p>
           <a:p>
             <a:pPr lvl="1"/>
@@ -680,7 +684,6 @@
               <a:rPr lang="en-US"/>
               <a:t>Second level</a:t>
             </a:r>
-            <a:endParaRPr lang="en-US"/>
           </a:p>
           <a:p>
             <a:pPr lvl="2"/>
@@ -688,7 +691,6 @@
               <a:rPr lang="en-US"/>
               <a:t>Third level</a:t>
             </a:r>
-            <a:endParaRPr lang="en-US"/>
           </a:p>
           <a:p>
             <a:pPr lvl="3"/>
@@ -696,7 +698,6 @@
               <a:rPr lang="en-US"/>
               <a:t>Fourth level</a:t>
             </a:r>
-            <a:endParaRPr lang="en-US"/>
           </a:p>
           <a:p>
             <a:pPr lvl="4"/>
@@ -704,7 +705,6 @@
               <a:rPr lang="en-US"/>
               <a:t>Fifth level</a:t>
             </a:r>
-            <a:endParaRPr lang="en-US"/>
           </a:p>
         </p:txBody>
       </p:sp>
@@ -728,7 +728,8 @@
           </a:lstStyle>
           <a:p>
             <a:fld id="{6BDEAFE6-325E-AA48-AC90-E1B1FC9AAA75}" type="datetimeFigureOut">
-              <a:rPr/>
+              <a:rPr lang="en-VN"/>
+              <a:t>22/10/2023</a:t>
             </a:fld>
             <a:endParaRPr lang="en-US"/>
           </a:p>
@@ -778,6 +779,7 @@
           <a:p>
             <a:fld id="{C9142EC5-85AF-4745-AACF-2F37CD50FCA3}" type="slidenum">
               <a:rPr/>
+              <a:t>‹#›</a:t>
             </a:fld>
             <a:endParaRPr lang="en-US"/>
           </a:p>
@@ -835,7 +837,6 @@
               <a:rPr lang="en-US"/>
               <a:t>Click to edit Master title style</a:t>
             </a:r>
-            <a:endParaRPr lang="en-US"/>
           </a:p>
         </p:txBody>
       </p:sp>
@@ -864,7 +865,6 @@
               <a:rPr lang="en-US"/>
               <a:t>Click to edit Master text styles</a:t>
             </a:r>
-            <a:endParaRPr lang="en-US"/>
           </a:p>
           <a:p>
             <a:pPr lvl="1"/>
@@ -872,7 +872,6 @@
               <a:rPr lang="en-US"/>
               <a:t>Second level</a:t>
             </a:r>
-            <a:endParaRPr lang="en-US"/>
           </a:p>
           <a:p>
             <a:pPr lvl="2"/>
@@ -880,7 +879,6 @@
               <a:rPr lang="en-US"/>
               <a:t>Third level</a:t>
             </a:r>
-            <a:endParaRPr lang="en-US"/>
           </a:p>
           <a:p>
             <a:pPr lvl="3"/>
@@ -888,7 +886,6 @@
               <a:rPr lang="en-US"/>
               <a:t>Fourth level</a:t>
             </a:r>
-            <a:endParaRPr lang="en-US"/>
           </a:p>
           <a:p>
             <a:pPr lvl="4"/>
@@ -896,7 +893,6 @@
               <a:rPr lang="en-US"/>
               <a:t>Fifth level</a:t>
             </a:r>
-            <a:endParaRPr lang="en-US"/>
           </a:p>
         </p:txBody>
       </p:sp>
@@ -920,7 +916,8 @@
           </a:lstStyle>
           <a:p>
             <a:fld id="{6BDEAFE6-325E-AA48-AC90-E1B1FC9AAA75}" type="datetimeFigureOut">
-              <a:rPr/>
+              <a:rPr lang="en-VN"/>
+              <a:t>22/10/2023</a:t>
             </a:fld>
             <a:endParaRPr lang="en-US"/>
           </a:p>
@@ -970,6 +967,7 @@
           <a:p>
             <a:fld id="{C9142EC5-85AF-4745-AACF-2F37CD50FCA3}" type="slidenum">
               <a:rPr/>
+              <a:t>‹#›</a:t>
             </a:fld>
             <a:endParaRPr lang="en-US"/>
           </a:p>
@@ -1101,7 +1099,8 @@
           </a:lstStyle>
           <a:p>
             <a:fld id="{6BDEAFE6-325E-AA48-AC90-E1B1FC9AAA75}" type="datetimeFigureOut">
-              <a:rPr/>
+              <a:rPr lang="en-VN"/>
+              <a:t>22/10/2023</a:t>
             </a:fld>
             <a:endParaRPr lang="en-US"/>
           </a:p>
@@ -1151,6 +1150,7 @@
           <a:p>
             <a:fld id="{C9142EC5-85AF-4745-AACF-2F37CD50FCA3}" type="slidenum">
               <a:rPr/>
+              <a:t>‹#›</a:t>
             </a:fld>
             <a:endParaRPr lang="en-US"/>
           </a:p>
@@ -1203,7 +1203,6 @@
               <a:rPr lang="en-US"/>
               <a:t>Click to edit Master title style</a:t>
             </a:r>
-            <a:endParaRPr lang="en-US"/>
           </a:p>
         </p:txBody>
       </p:sp>
@@ -1227,7 +1226,6 @@
               <a:rPr lang="en-US" dirty="0"/>
               <a:t>Click to edit Master text styles</a:t>
             </a:r>
-            <a:endParaRPr lang="en-US" dirty="0"/>
           </a:p>
           <a:p>
             <a:pPr lvl="1"/>
@@ -1235,7 +1233,6 @@
               <a:rPr lang="en-US" dirty="0"/>
               <a:t>Second level</a:t>
             </a:r>
-            <a:endParaRPr lang="en-US" dirty="0"/>
           </a:p>
           <a:p>
             <a:pPr lvl="2"/>
@@ -1243,7 +1240,6 @@
               <a:rPr lang="en-US" dirty="0"/>
               <a:t>Third level</a:t>
             </a:r>
-            <a:endParaRPr lang="en-US" dirty="0"/>
           </a:p>
           <a:p>
             <a:pPr lvl="3"/>
@@ -1251,7 +1247,6 @@
               <a:rPr lang="en-US" dirty="0"/>
               <a:t>Fourth level</a:t>
             </a:r>
-            <a:endParaRPr lang="en-US" dirty="0"/>
           </a:p>
           <a:p>
             <a:pPr lvl="4"/>
@@ -1259,7 +1254,6 @@
               <a:rPr lang="en-US" dirty="0"/>
               <a:t>Fifth level</a:t>
             </a:r>
-            <a:endParaRPr lang="en-US" dirty="0"/>
           </a:p>
         </p:txBody>
       </p:sp>
@@ -1283,7 +1277,8 @@
           </a:lstStyle>
           <a:p>
             <a:fld id="{6BDEAFE6-325E-AA48-AC90-E1B1FC9AAA75}" type="datetimeFigureOut">
-              <a:rPr/>
+              <a:rPr lang="en-VN"/>
+              <a:t>22/10/2023</a:t>
             </a:fld>
             <a:endParaRPr lang="en-US"/>
           </a:p>
@@ -1333,6 +1328,7 @@
           <a:p>
             <a:fld id="{C9142EC5-85AF-4745-AACF-2F37CD50FCA3}" type="slidenum">
               <a:rPr/>
+              <a:t>‹#›</a:t>
             </a:fld>
             <a:endParaRPr lang="en-US"/>
           </a:p>
@@ -1394,7 +1390,6 @@
               <a:rPr lang="en-US"/>
               <a:t>Click to edit Master title style</a:t>
             </a:r>
-            <a:endParaRPr lang="en-US"/>
           </a:p>
         </p:txBody>
       </p:sp>
@@ -1460,7 +1455,6 @@
               <a:rPr lang="en-US"/>
               <a:t>Click to edit Master text styles</a:t>
             </a:r>
-            <a:endParaRPr lang="en-US"/>
           </a:p>
         </p:txBody>
       </p:sp>
@@ -1484,7 +1478,8 @@
           </a:lstStyle>
           <a:p>
             <a:fld id="{6BDEAFE6-325E-AA48-AC90-E1B1FC9AAA75}" type="datetimeFigureOut">
-              <a:rPr/>
+              <a:rPr lang="en-VN"/>
+              <a:t>22/10/2023</a:t>
             </a:fld>
             <a:endParaRPr lang="en-US"/>
           </a:p>
@@ -1534,6 +1529,7 @@
           <a:p>
             <a:fld id="{C9142EC5-85AF-4745-AACF-2F37CD50FCA3}" type="slidenum">
               <a:rPr/>
+              <a:t>‹#›</a:t>
             </a:fld>
             <a:endParaRPr lang="en-US"/>
           </a:p>
@@ -1586,7 +1582,6 @@
               <a:rPr lang="en-US"/>
               <a:t>Click to edit Master title style</a:t>
             </a:r>
-            <a:endParaRPr lang="en-US"/>
           </a:p>
         </p:txBody>
       </p:sp>
@@ -1643,7 +1638,6 @@
               <a:rPr lang="en-US"/>
               <a:t>Click to edit Master text styles</a:t>
             </a:r>
-            <a:endParaRPr lang="en-US"/>
           </a:p>
           <a:p>
             <a:pPr lvl="1"/>
@@ -1651,7 +1645,6 @@
               <a:rPr lang="en-US"/>
               <a:t>Second level</a:t>
             </a:r>
-            <a:endParaRPr lang="en-US"/>
           </a:p>
           <a:p>
             <a:pPr lvl="2"/>
@@ -1659,7 +1652,6 @@
               <a:rPr lang="en-US"/>
               <a:t>Third level</a:t>
             </a:r>
-            <a:endParaRPr lang="en-US"/>
           </a:p>
           <a:p>
             <a:pPr lvl="3"/>
@@ -1667,7 +1659,6 @@
               <a:rPr lang="en-US"/>
               <a:t>Fourth level</a:t>
             </a:r>
-            <a:endParaRPr lang="en-US"/>
           </a:p>
           <a:p>
             <a:pPr lvl="4"/>
@@ -1675,7 +1666,6 @@
               <a:rPr lang="en-US"/>
               <a:t>Fifth level</a:t>
             </a:r>
-            <a:endParaRPr lang="en-US"/>
           </a:p>
         </p:txBody>
       </p:sp>
@@ -1732,7 +1722,6 @@
               <a:rPr lang="en-US"/>
               <a:t>Click to edit Master text styles</a:t>
             </a:r>
-            <a:endParaRPr lang="en-US"/>
           </a:p>
           <a:p>
             <a:pPr lvl="1"/>
@@ -1740,7 +1729,6 @@
               <a:rPr lang="en-US"/>
               <a:t>Second level</a:t>
             </a:r>
-            <a:endParaRPr lang="en-US"/>
           </a:p>
           <a:p>
             <a:pPr lvl="2"/>
@@ -1748,7 +1736,6 @@
               <a:rPr lang="en-US"/>
               <a:t>Third level</a:t>
             </a:r>
-            <a:endParaRPr lang="en-US"/>
           </a:p>
           <a:p>
             <a:pPr lvl="3"/>
@@ -1756,7 +1743,6 @@
               <a:rPr lang="en-US"/>
               <a:t>Fourth level</a:t>
             </a:r>
-            <a:endParaRPr lang="en-US"/>
           </a:p>
           <a:p>
             <a:pPr lvl="4"/>
@@ -1764,7 +1750,6 @@
               <a:rPr lang="en-US"/>
               <a:t>Fifth level</a:t>
             </a:r>
-            <a:endParaRPr lang="en-US"/>
           </a:p>
         </p:txBody>
       </p:sp>
@@ -1788,7 +1773,8 @@
           </a:lstStyle>
           <a:p>
             <a:fld id="{6BDEAFE6-325E-AA48-AC90-E1B1FC9AAA75}" type="datetimeFigureOut">
-              <a:rPr/>
+              <a:rPr lang="en-VN"/>
+              <a:t>22/10/2023</a:t>
             </a:fld>
             <a:endParaRPr lang="en-US"/>
           </a:p>
@@ -1838,6 +1824,7 @@
           <a:p>
             <a:fld id="{C9142EC5-85AF-4745-AACF-2F37CD50FCA3}" type="slidenum">
               <a:rPr/>
+              <a:t>‹#›</a:t>
             </a:fld>
             <a:endParaRPr lang="en-US"/>
           </a:p>
@@ -1899,7 +1886,6 @@
               <a:rPr lang="en-US"/>
               <a:t>Click to edit Master title style</a:t>
             </a:r>
-            <a:endParaRPr lang="en-US"/>
           </a:p>
         </p:txBody>
       </p:sp>
@@ -1965,7 +1951,6 @@
               <a:rPr lang="en-US"/>
               <a:t>Click to edit Master text styles</a:t>
             </a:r>
-            <a:endParaRPr lang="en-US"/>
           </a:p>
         </p:txBody>
       </p:sp>
@@ -2022,7 +2007,6 @@
               <a:rPr lang="en-US"/>
               <a:t>Click to edit Master text styles</a:t>
             </a:r>
-            <a:endParaRPr lang="en-US"/>
           </a:p>
           <a:p>
             <a:pPr lvl="1"/>
@@ -2030,7 +2014,6 @@
               <a:rPr lang="en-US"/>
               <a:t>Second level</a:t>
             </a:r>
-            <a:endParaRPr lang="en-US"/>
           </a:p>
           <a:p>
             <a:pPr lvl="2"/>
@@ -2038,7 +2021,6 @@
               <a:rPr lang="en-US"/>
               <a:t>Third level</a:t>
             </a:r>
-            <a:endParaRPr lang="en-US"/>
           </a:p>
           <a:p>
             <a:pPr lvl="3"/>
@@ -2046,7 +2028,6 @@
               <a:rPr lang="en-US"/>
               <a:t>Fourth level</a:t>
             </a:r>
-            <a:endParaRPr lang="en-US"/>
           </a:p>
           <a:p>
             <a:pPr lvl="4"/>
@@ -2054,7 +2035,6 @@
               <a:rPr lang="en-US"/>
               <a:t>Fifth level</a:t>
             </a:r>
-            <a:endParaRPr lang="en-US"/>
           </a:p>
         </p:txBody>
       </p:sp>
@@ -2120,7 +2100,6 @@
               <a:rPr lang="en-US"/>
               <a:t>Click to edit Master text styles</a:t>
             </a:r>
-            <a:endParaRPr lang="en-US"/>
           </a:p>
         </p:txBody>
       </p:sp>
@@ -2177,7 +2156,6 @@
               <a:rPr lang="en-US"/>
               <a:t>Click to edit Master text styles</a:t>
             </a:r>
-            <a:endParaRPr lang="en-US"/>
           </a:p>
           <a:p>
             <a:pPr lvl="1"/>
@@ -2185,7 +2163,6 @@
               <a:rPr lang="en-US"/>
               <a:t>Second level</a:t>
             </a:r>
-            <a:endParaRPr lang="en-US"/>
           </a:p>
           <a:p>
             <a:pPr lvl="2"/>
@@ -2193,7 +2170,6 @@
               <a:rPr lang="en-US"/>
               <a:t>Third level</a:t>
             </a:r>
-            <a:endParaRPr lang="en-US"/>
           </a:p>
           <a:p>
             <a:pPr lvl="3"/>
@@ -2201,7 +2177,6 @@
               <a:rPr lang="en-US"/>
               <a:t>Fourth level</a:t>
             </a:r>
-            <a:endParaRPr lang="en-US"/>
           </a:p>
           <a:p>
             <a:pPr lvl="4"/>
@@ -2209,7 +2184,6 @@
               <a:rPr lang="en-US"/>
               <a:t>Fifth level</a:t>
             </a:r>
-            <a:endParaRPr lang="en-US"/>
           </a:p>
         </p:txBody>
       </p:sp>
@@ -2233,7 +2207,8 @@
           </a:lstStyle>
           <a:p>
             <a:fld id="{6BDEAFE6-325E-AA48-AC90-E1B1FC9AAA75}" type="datetimeFigureOut">
-              <a:rPr/>
+              <a:rPr lang="en-VN"/>
+              <a:t>22/10/2023</a:t>
             </a:fld>
             <a:endParaRPr lang="en-US"/>
           </a:p>
@@ -2283,6 +2258,7 @@
           <a:p>
             <a:fld id="{C9142EC5-85AF-4745-AACF-2F37CD50FCA3}" type="slidenum">
               <a:rPr/>
+              <a:t>‹#›</a:t>
             </a:fld>
             <a:endParaRPr lang="en-US"/>
           </a:p>
@@ -2335,7 +2311,6 @@
               <a:rPr lang="en-US"/>
               <a:t>Click to edit Master title style</a:t>
             </a:r>
-            <a:endParaRPr lang="en-US"/>
           </a:p>
         </p:txBody>
       </p:sp>
@@ -2359,7 +2334,8 @@
           </a:lstStyle>
           <a:p>
             <a:fld id="{6BDEAFE6-325E-AA48-AC90-E1B1FC9AAA75}" type="datetimeFigureOut">
-              <a:rPr/>
+              <a:rPr lang="en-VN"/>
+              <a:t>22/10/2023</a:t>
             </a:fld>
             <a:endParaRPr lang="en-US"/>
           </a:p>
@@ -2409,6 +2385,7 @@
           <a:p>
             <a:fld id="{C9142EC5-85AF-4745-AACF-2F37CD50FCA3}" type="slidenum">
               <a:rPr/>
+              <a:t>‹#›</a:t>
             </a:fld>
             <a:endParaRPr lang="en-US"/>
           </a:p>
@@ -2462,7 +2439,8 @@
           </a:lstStyle>
           <a:p>
             <a:fld id="{6BDEAFE6-325E-AA48-AC90-E1B1FC9AAA75}" type="datetimeFigureOut">
-              <a:rPr/>
+              <a:rPr lang="en-VN"/>
+              <a:t>22/10/2023</a:t>
             </a:fld>
             <a:endParaRPr lang="en-US"/>
           </a:p>
@@ -2512,6 +2490,7 @@
           <a:p>
             <a:fld id="{C9142EC5-85AF-4745-AACF-2F37CD50FCA3}" type="slidenum">
               <a:rPr/>
+              <a:t>‹#›</a:t>
             </a:fld>
             <a:endParaRPr lang="en-US"/>
           </a:p>
@@ -2573,7 +2552,6 @@
               <a:rPr lang="en-US"/>
               <a:t>Click to edit Master title style</a:t>
             </a:r>
-            <a:endParaRPr lang="en-US"/>
           </a:p>
         </p:txBody>
       </p:sp>
@@ -2630,7 +2608,6 @@
               <a:rPr lang="en-US"/>
               <a:t>Click to edit Master text styles</a:t>
             </a:r>
-            <a:endParaRPr lang="en-US"/>
           </a:p>
           <a:p>
             <a:pPr lvl="1"/>
@@ -2638,7 +2615,6 @@
               <a:rPr lang="en-US"/>
               <a:t>Second level</a:t>
             </a:r>
-            <a:endParaRPr lang="en-US"/>
           </a:p>
           <a:p>
             <a:pPr lvl="2"/>
@@ -2646,7 +2622,6 @@
               <a:rPr lang="en-US"/>
               <a:t>Third level</a:t>
             </a:r>
-            <a:endParaRPr lang="en-US"/>
           </a:p>
           <a:p>
             <a:pPr lvl="3"/>
@@ -2654,7 +2629,6 @@
               <a:rPr lang="en-US"/>
               <a:t>Fourth level</a:t>
             </a:r>
-            <a:endParaRPr lang="en-US"/>
           </a:p>
           <a:p>
             <a:pPr lvl="4"/>
@@ -2662,7 +2636,6 @@
               <a:rPr lang="en-US"/>
               <a:t>Fifth level</a:t>
             </a:r>
-            <a:endParaRPr lang="en-US"/>
           </a:p>
         </p:txBody>
       </p:sp>
@@ -2728,7 +2701,6 @@
               <a:rPr lang="en-US"/>
               <a:t>Click to edit Master text styles</a:t>
             </a:r>
-            <a:endParaRPr lang="en-US"/>
           </a:p>
         </p:txBody>
       </p:sp>
@@ -2752,7 +2724,8 @@
           </a:lstStyle>
           <a:p>
             <a:fld id="{6BDEAFE6-325E-AA48-AC90-E1B1FC9AAA75}" type="datetimeFigureOut">
-              <a:rPr/>
+              <a:rPr lang="en-VN"/>
+              <a:t>22/10/2023</a:t>
             </a:fld>
             <a:endParaRPr lang="en-US"/>
           </a:p>
@@ -2802,6 +2775,7 @@
           <a:p>
             <a:fld id="{C9142EC5-85AF-4745-AACF-2F37CD50FCA3}" type="slidenum">
               <a:rPr/>
+              <a:t>‹#›</a:t>
             </a:fld>
             <a:endParaRPr lang="en-US"/>
           </a:p>
@@ -2863,7 +2837,6 @@
               <a:rPr lang="en-US"/>
               <a:t>Click to edit Master title style</a:t>
             </a:r>
-            <a:endParaRPr lang="en-US"/>
           </a:p>
         </p:txBody>
       </p:sp>
@@ -2929,7 +2902,6 @@
               <a:rPr lang="en-US" noProof="0"/>
               <a:t>Click icon to add picture</a:t>
             </a:r>
-            <a:endParaRPr lang="en-US" noProof="0"/>
           </a:p>
         </p:txBody>
       </p:sp>
@@ -2995,7 +2967,6 @@
               <a:rPr lang="en-US"/>
               <a:t>Click to edit Master text styles</a:t>
             </a:r>
-            <a:endParaRPr lang="en-US"/>
           </a:p>
         </p:txBody>
       </p:sp>
@@ -3019,7 +2990,8 @@
           </a:lstStyle>
           <a:p>
             <a:fld id="{6BDEAFE6-325E-AA48-AC90-E1B1FC9AAA75}" type="datetimeFigureOut">
-              <a:rPr/>
+              <a:rPr lang="en-VN"/>
+              <a:t>22/10/2023</a:t>
             </a:fld>
             <a:endParaRPr lang="en-US"/>
           </a:p>
@@ -3069,6 +3041,7 @@
           <a:p>
             <a:fld id="{C9142EC5-85AF-4745-AACF-2F37CD50FCA3}" type="slidenum">
               <a:rPr/>
+              <a:t>‹#›</a:t>
             </a:fld>
             <a:endParaRPr lang="en-US"/>
           </a:p>
@@ -3127,7 +3100,7 @@
             <a:avLst/>
           </a:prstGeom>
           <a:blipFill dpi="0" rotWithShape="0">
-            <a:blip r:embed="rId13"/>
+            <a:blip r:embed="rId14"/>
             <a:srcRect/>
             <a:tile tx="0" ty="0" sx="100000" sy="100000" flip="none" algn="tl"/>
           </a:blipFill>
@@ -3585,7 +3558,6 @@
               <a:rPr lang="en-US" altLang="en-US"/>
               <a:t>Click to edit Master text styles</a:t>
             </a:r>
-            <a:endParaRPr lang="en-US" altLang="en-US"/>
           </a:p>
           <a:p>
             <a:pPr lvl="1"/>
@@ -3593,7 +3565,6 @@
               <a:rPr lang="en-US" altLang="en-US"/>
               <a:t>Second level</a:t>
             </a:r>
-            <a:endParaRPr lang="en-US" altLang="en-US"/>
           </a:p>
           <a:p>
             <a:pPr lvl="2"/>
@@ -3601,7 +3572,6 @@
               <a:rPr lang="en-US" altLang="en-US"/>
               <a:t>Third level</a:t>
             </a:r>
-            <a:endParaRPr lang="en-US" altLang="en-US"/>
           </a:p>
           <a:p>
             <a:pPr lvl="3"/>
@@ -3609,7 +3579,6 @@
               <a:rPr lang="en-US" altLang="en-US"/>
               <a:t>Fourth level</a:t>
             </a:r>
-            <a:endParaRPr lang="en-US" altLang="en-US"/>
           </a:p>
           <a:p>
             <a:pPr lvl="4"/>
@@ -3617,7 +3586,6 @@
               <a:rPr lang="en-US" altLang="en-US"/>
               <a:t>Fifth level</a:t>
             </a:r>
-            <a:endParaRPr lang="en-US" altLang="en-US"/>
           </a:p>
         </p:txBody>
       </p:sp>
@@ -3657,7 +3625,8 @@
           </a:lstStyle>
           <a:p>
             <a:fld id="{6BDEAFE6-325E-AA48-AC90-E1B1FC9AAA75}" type="datetimeFigureOut">
-              <a:rPr/>
+              <a:rPr lang="en-VN"/>
+              <a:t>22/10/2023</a:t>
             </a:fld>
             <a:endParaRPr lang="en-US"/>
           </a:p>
@@ -3737,6 +3706,7 @@
           <a:p>
             <a:fld id="{C9142EC5-85AF-4745-AACF-2F37CD50FCA3}" type="slidenum">
               <a:rPr/>
+              <a:t>‹#›</a:t>
             </a:fld>
             <a:endParaRPr lang="en-US"/>
           </a:p>
@@ -3793,7 +3763,6 @@
               <a:rPr lang="en-US" altLang="en-US"/>
               <a:t>Click to edit Master title style</a:t>
             </a:r>
-            <a:endParaRPr lang="en-US" altLang="en-US"/>
           </a:p>
         </p:txBody>
       </p:sp>
@@ -3931,6 +3900,7 @@
                   <a:schemeClr val="bg1"/>
                 </a:solidFill>
               </a:rPr>
+              <a:t>‹#›</a:t>
             </a:fld>
             <a:endParaRPr lang="en-US" altLang="en-US" sz="1200">
               <a:solidFill>
@@ -4085,6 +4055,7 @@
                   <a:srgbClr val="C00000"/>
                 </a:solidFill>
               </a:rPr>
+              <a:t>‹#›</a:t>
             </a:fld>
             <a:endParaRPr lang="en-US" altLang="en-US" sz="1350" b="1">
               <a:solidFill>
@@ -4566,7 +4537,7 @@
           <p:nvPr/>
         </p:nvPicPr>
         <p:blipFill>
-          <a:blip r:embed="rId1"/>
+          <a:blip r:embed="rId2"/>
           <a:stretch>
             <a:fillRect/>
           </a:stretch>
@@ -4723,11 +4694,11 @@
           <p:nvPr/>
         </p:nvPicPr>
         <p:blipFill>
-          <a:blip r:embed="rId2">
+          <a:blip r:embed="rId3">
             <a:extLst>
               <a:ext uri="{BEBA8EAE-BF5A-486C-A8C5-ECC9F3942E4B}">
                 <a14:imgProps xmlns:a14="http://schemas.microsoft.com/office/drawing/2010/main">
-                  <a14:imgLayer r:embed="rId3">
+                  <a14:imgLayer r:embed="rId4">
                     <a14:imgEffect>
                       <a14:artisticBlur/>
                     </a14:imgEffect>
@@ -4835,16 +4806,6 @@
               </a:rPr>
               <a:t>HỆ THỐNG NHẬN DIỆN KHUÔN MẶT</a:t>
             </a:r>
-            <a:endParaRPr lang="en-US" sz="5400">
-              <a:ln w="0"/>
-              <a:effectLst>
-                <a:outerShdw blurRad="38100" dist="19050" dir="2700000" algn="tl" rotWithShape="0">
-                  <a:schemeClr val="dk1">
-                    <a:alpha val="40000"/>
-                  </a:schemeClr>
-                </a:outerShdw>
-              </a:effectLst>
-            </a:endParaRPr>
           </a:p>
         </p:txBody>
       </p:sp>
@@ -4855,7 +4816,7 @@
           <p:nvPr/>
         </p:nvPicPr>
         <p:blipFill>
-          <a:blip r:embed="rId1"/>
+          <a:blip r:embed="rId2"/>
           <a:stretch>
             <a:fillRect/>
           </a:stretch>
@@ -4948,11 +4909,6 @@
               </a:rPr>
               <a:t>NHÓM 7</a:t>
             </a:r>
-            <a:endParaRPr lang="en-US" sz="3200">
-              <a:solidFill>
-                <a:srgbClr val="FF0000"/>
-              </a:solidFill>
-            </a:endParaRPr>
           </a:p>
         </p:txBody>
       </p:sp>
@@ -5008,11 +4964,6 @@
               </a:rPr>
               <a:t>1</a:t>
             </a:r>
-            <a:endParaRPr lang="en-US">
-              <a:solidFill>
-                <a:srgbClr val="FF0000"/>
-              </a:solidFill>
-            </a:endParaRPr>
           </a:p>
         </p:txBody>
       </p:sp>
@@ -5121,12 +5072,6 @@
               </a:rPr>
               <a:t>4.HOẠT ĐỘNG </a:t>
             </a:r>
-            <a:endParaRPr lang="en-US" sz="3200" b="1">
-              <a:solidFill>
-                <a:schemeClr val="bg1"/>
-              </a:solidFill>
-              <a:latin typeface="+mj-lt"/>
-            </a:endParaRPr>
           </a:p>
         </p:txBody>
       </p:sp>
@@ -5163,7 +5108,7 @@
           <p:nvPr/>
         </p:nvPicPr>
         <p:blipFill>
-          <a:blip r:embed="rId1"/>
+          <a:blip r:embed="rId2"/>
           <a:stretch>
             <a:fillRect/>
           </a:stretch>
@@ -5230,11 +5175,6 @@
               </a:rPr>
               <a:t>10</a:t>
             </a:r>
-            <a:endParaRPr lang="en-US">
-              <a:solidFill>
-                <a:srgbClr val="FF0000"/>
-              </a:solidFill>
-            </a:endParaRPr>
           </a:p>
         </p:txBody>
       </p:sp>
@@ -5277,13 +5217,6 @@
               </a:rPr>
               <a:t>4.3.Phân tích kết cấu da</a:t>
             </a:r>
-            <a:endParaRPr lang="en-US" sz="2400" dirty="0">
-              <a:solidFill>
-                <a:srgbClr val="FF0000"/>
-              </a:solidFill>
-              <a:ea typeface="SF Pro Semibold" pitchFamily="2" charset="0"/>
-              <a:cs typeface="Arial" panose="020B0604020202020204" pitchFamily="34" charset="0"/>
-            </a:endParaRPr>
           </a:p>
           <a:p>
             <a:pPr marL="457200" indent="-457200">
@@ -5300,10 +5233,6 @@
               </a:rPr>
               <a:t> sử dụng các chi tiết hình ảnh của da, được chụp trong các hình ảnh kỹ thuật số hoặc máy scan tiêu chuẩn.</a:t>
             </a:r>
-            <a:endParaRPr lang="en-US" sz="2400" dirty="0">
-              <a:ea typeface="SF Pro Semibold" pitchFamily="2" charset="0"/>
-              <a:cs typeface="Arial" panose="020B0604020202020204" pitchFamily="34" charset="0"/>
-            </a:endParaRPr>
           </a:p>
           <a:p>
             <a:pPr marL="457200" indent="-457200">
@@ -5320,10 +5249,6 @@
               </a:rPr>
               <a:t>phân tích kết cấu da, các đường đặc trưng, hình dạng và điểm nốt trên da.</a:t>
             </a:r>
-            <a:endParaRPr lang="en-US" sz="2400" dirty="0">
-              <a:ea typeface="SF Pro Semibold" pitchFamily="2" charset="0"/>
-              <a:cs typeface="Arial" panose="020B0604020202020204" pitchFamily="34" charset="0"/>
-            </a:endParaRPr>
           </a:p>
           <a:p>
             <a:pPr marL="457200" indent="-457200">
@@ -5340,10 +5265,6 @@
               </a:rPr>
               <a:t>Đưa vào không gian toán học.</a:t>
             </a:r>
-            <a:endParaRPr lang="en-US" sz="2400" dirty="0">
-              <a:ea typeface="SF Pro Semibold" pitchFamily="2" charset="0"/>
-              <a:cs typeface="Arial" panose="020B0604020202020204" pitchFamily="34" charset="0"/>
-            </a:endParaRPr>
           </a:p>
           <a:p>
             <a:pPr marL="457200" indent="-457200">
@@ -5482,7 +5403,7 @@
           <p:nvPr/>
         </p:nvPicPr>
         <p:blipFill>
-          <a:blip r:embed="rId1"/>
+          <a:blip r:embed="rId2"/>
           <a:stretch>
             <a:fillRect/>
           </a:stretch>
@@ -5530,12 +5451,6 @@
               </a:rPr>
               <a:t>3.ĐỘ TIN CẬY VÀ CHÍNH XÁC. </a:t>
             </a:r>
-            <a:endParaRPr lang="en-US" sz="3200" b="1">
-              <a:solidFill>
-                <a:schemeClr val="bg1"/>
-              </a:solidFill>
-              <a:latin typeface="+mj-lt"/>
-            </a:endParaRPr>
           </a:p>
         </p:txBody>
       </p:sp>
@@ -5572,7 +5487,7 @@
           <p:nvPr/>
         </p:nvPicPr>
         <p:blipFill>
-          <a:blip r:embed="rId2"/>
+          <a:blip r:embed="rId3"/>
           <a:stretch>
             <a:fillRect/>
           </a:stretch>
@@ -5639,11 +5554,6 @@
               </a:rPr>
               <a:t>3</a:t>
             </a:r>
-            <a:endParaRPr lang="en-US">
-              <a:solidFill>
-                <a:srgbClr val="FF0000"/>
-              </a:solidFill>
-            </a:endParaRPr>
           </a:p>
         </p:txBody>
       </p:sp>
@@ -5655,8 +5565,8 @@
         </p:nvSpPr>
         <p:spPr>
           <a:xfrm>
-            <a:off x="703384" y="1121261"/>
-            <a:ext cx="8169310" cy="1383665"/>
+            <a:off x="703383" y="1121261"/>
+            <a:ext cx="8309987" cy="658835"/>
           </a:xfrm>
           <a:prstGeom prst="rect">
             <a:avLst/>
@@ -5826,13 +5736,6 @@
               </a:rPr>
               <a:t>?: </a:t>
             </a:r>
-            <a:endParaRPr lang="en-US" sz="2800" dirty="0">
-              <a:solidFill>
-                <a:srgbClr val="FF0000"/>
-              </a:solidFill>
-              <a:ea typeface="SF Pro Semibold" pitchFamily="2" charset="0"/>
-              <a:cs typeface="Arial" panose="020B0604020202020204" pitchFamily="34" charset="0"/>
-            </a:endParaRPr>
           </a:p>
         </p:txBody>
       </p:sp>
@@ -5941,12 +5844,6 @@
               </a:rPr>
               <a:t>3.ĐỘ TIN CẬY VÀ CHÍNH XÁC. </a:t>
             </a:r>
-            <a:endParaRPr lang="en-US" sz="3200" b="1">
-              <a:solidFill>
-                <a:schemeClr val="bg1"/>
-              </a:solidFill>
-              <a:latin typeface="+mj-lt"/>
-            </a:endParaRPr>
           </a:p>
         </p:txBody>
       </p:sp>
@@ -5983,7 +5880,7 @@
           <p:nvPr/>
         </p:nvPicPr>
         <p:blipFill>
-          <a:blip r:embed="rId1"/>
+          <a:blip r:embed="rId2"/>
           <a:stretch>
             <a:fillRect/>
           </a:stretch>
@@ -6050,11 +5947,6 @@
               </a:rPr>
               <a:t>4</a:t>
             </a:r>
-            <a:endParaRPr lang="en-US">
-              <a:solidFill>
-                <a:srgbClr val="FF0000"/>
-              </a:solidFill>
-            </a:endParaRPr>
           </a:p>
         </p:txBody>
       </p:sp>
@@ -6217,13 +6109,6 @@
               </a:rPr>
               <a:t>?:  </a:t>
             </a:r>
-            <a:endParaRPr lang="en-US" sz="2800" dirty="0">
-              <a:solidFill>
-                <a:srgbClr val="FF0000"/>
-              </a:solidFill>
-              <a:ea typeface="SF Pro Semibold" pitchFamily="2" charset="0"/>
-              <a:cs typeface="Arial" panose="020B0604020202020204" pitchFamily="34" charset="0"/>
-            </a:endParaRPr>
           </a:p>
           <a:p>
             <a:pPr marL="457200" indent="-457200">
@@ -6409,11 +6294,6 @@
               </a:rPr>
               <a:t> </a:t>
             </a:r>
-            <a:endParaRPr lang="en-US" sz="2400" dirty="0">
-              <a:effectLst/>
-              <a:ea typeface="SF Pro Semibold" pitchFamily="2" charset="0"/>
-              <a:cs typeface="Arial" panose="020B0604020202020204" pitchFamily="34" charset="0"/>
-            </a:endParaRPr>
           </a:p>
           <a:p>
             <a:pPr marL="457200" indent="-457200">
@@ -6577,10 +6457,6 @@
               </a:rPr>
               <a:t>. </a:t>
             </a:r>
-            <a:endParaRPr lang="en-US" sz="2400" dirty="0">
-              <a:ea typeface="SF Pro Semibold" pitchFamily="2" charset="0"/>
-              <a:cs typeface="Arial" panose="020B0604020202020204" pitchFamily="34" charset="0"/>
-            </a:endParaRPr>
           </a:p>
           <a:p>
             <a:pPr>
@@ -6595,10 +6471,6 @@
               </a:rPr>
               <a:t>	</a:t>
             </a:r>
-            <a:endParaRPr lang="en-US" sz="2400" dirty="0">
-              <a:ea typeface="SF Pro Semibold" pitchFamily="2" charset="0"/>
-              <a:cs typeface="Arial" panose="020B0604020202020204" pitchFamily="34" charset="0"/>
-            </a:endParaRPr>
           </a:p>
           <a:p>
             <a:pPr>
@@ -6711,10 +6583,6 @@
               </a:rPr>
               <a:t>. </a:t>
             </a:r>
-            <a:endParaRPr lang="en-US" sz="2400" dirty="0">
-              <a:ea typeface="SF Pro Semibold" pitchFamily="2" charset="0"/>
-              <a:cs typeface="Arial" panose="020B0604020202020204" pitchFamily="34" charset="0"/>
-            </a:endParaRPr>
           </a:p>
         </p:txBody>
       </p:sp>
@@ -6823,12 +6691,6 @@
               </a:rPr>
               <a:t>3.ĐỘ TIN CẬY VÀ CHÍNH XÁC. </a:t>
             </a:r>
-            <a:endParaRPr lang="en-US" sz="3200" b="1">
-              <a:solidFill>
-                <a:schemeClr val="bg1"/>
-              </a:solidFill>
-              <a:latin typeface="+mj-lt"/>
-            </a:endParaRPr>
           </a:p>
         </p:txBody>
       </p:sp>
@@ -6865,7 +6727,7 @@
           <p:nvPr/>
         </p:nvPicPr>
         <p:blipFill>
-          <a:blip r:embed="rId1"/>
+          <a:blip r:embed="rId2"/>
           <a:stretch>
             <a:fillRect/>
           </a:stretch>
@@ -6932,11 +6794,6 @@
               </a:rPr>
               <a:t>4</a:t>
             </a:r>
-            <a:endParaRPr lang="en-US">
-              <a:solidFill>
-                <a:srgbClr val="FF0000"/>
-              </a:solidFill>
-            </a:endParaRPr>
           </a:p>
         </p:txBody>
       </p:sp>
@@ -7099,13 +6956,6 @@
               </a:rPr>
               <a:t>?:  </a:t>
             </a:r>
-            <a:endParaRPr lang="en-US" sz="2800" dirty="0">
-              <a:solidFill>
-                <a:srgbClr val="FF0000"/>
-              </a:solidFill>
-              <a:ea typeface="SF Pro Semibold" pitchFamily="2" charset="0"/>
-              <a:cs typeface="Arial" panose="020B0604020202020204" pitchFamily="34" charset="0"/>
-            </a:endParaRPr>
           </a:p>
         </p:txBody>
       </p:sp>
@@ -7118,7 +6968,7 @@
           <p:nvPr/>
         </p:nvPicPr>
         <p:blipFill>
-          <a:blip r:embed="rId2"/>
+          <a:blip r:embed="rId3"/>
           <a:stretch>
             <a:fillRect/>
           </a:stretch>
@@ -7238,12 +7088,6 @@
               </a:rPr>
               <a:t>3.ĐỘ TIN CẬY VÀ CHÍNH XÁC. </a:t>
             </a:r>
-            <a:endParaRPr lang="en-US" sz="3200" b="1">
-              <a:solidFill>
-                <a:schemeClr val="bg1"/>
-              </a:solidFill>
-              <a:latin typeface="+mj-lt"/>
-            </a:endParaRPr>
           </a:p>
         </p:txBody>
       </p:sp>
@@ -7280,7 +7124,7 @@
           <p:nvPr/>
         </p:nvPicPr>
         <p:blipFill>
-          <a:blip r:embed="rId1"/>
+          <a:blip r:embed="rId2"/>
           <a:stretch>
             <a:fillRect/>
           </a:stretch>
@@ -7347,11 +7191,6 @@
               </a:rPr>
               <a:t>4</a:t>
             </a:r>
-            <a:endParaRPr lang="en-US">
-              <a:solidFill>
-                <a:srgbClr val="FF0000"/>
-              </a:solidFill>
-            </a:endParaRPr>
           </a:p>
         </p:txBody>
       </p:sp>
@@ -7394,13 +7233,6 @@
               </a:rPr>
               <a:t>3.3.Điểm tin cậy trong nhận dạng khuôn mặt?:  </a:t>
             </a:r>
-            <a:endParaRPr lang="en-US" sz="2800" dirty="0">
-              <a:solidFill>
-                <a:srgbClr val="FF0000"/>
-              </a:solidFill>
-              <a:ea typeface="SF Pro Semibold" pitchFamily="2" charset="0"/>
-              <a:cs typeface="Arial" panose="020B0604020202020204" pitchFamily="34" charset="0"/>
-            </a:endParaRPr>
           </a:p>
           <a:p>
             <a:pPr marL="457200" indent="-457200">
@@ -7418,11 +7250,6 @@
               </a:rPr>
               <a:t>Hệ thống sẽ phát hiện, so sánh khuôn mặt với dữ liệu từ database. </a:t>
             </a:r>
-            <a:endParaRPr lang="en-US" sz="2400" dirty="0">
-              <a:effectLst/>
-              <a:ea typeface="SF Pro Semibold" pitchFamily="2" charset="0"/>
-              <a:cs typeface="Arial" panose="020B0604020202020204" pitchFamily="34" charset="0"/>
-            </a:endParaRPr>
           </a:p>
           <a:p>
             <a:pPr marL="457200" indent="-457200">
@@ -7439,10 +7266,6 @@
               </a:rPr>
               <a:t> Điểm tin cậy càng cao thì khả năng hai hình ảnh thuộc về cùng một người càng cao. </a:t>
             </a:r>
-            <a:endParaRPr lang="en-US" sz="2400" dirty="0">
-              <a:ea typeface="SF Pro Semibold" pitchFamily="2" charset="0"/>
-              <a:cs typeface="Arial" panose="020B0604020202020204" pitchFamily="34" charset="0"/>
-            </a:endParaRPr>
           </a:p>
           <a:p>
             <a:pPr>
@@ -7457,10 +7280,6 @@
               </a:rPr>
               <a:t>	</a:t>
             </a:r>
-            <a:endParaRPr lang="en-US" sz="2400" dirty="0">
-              <a:ea typeface="SF Pro Semibold" pitchFamily="2" charset="0"/>
-              <a:cs typeface="Arial" panose="020B0604020202020204" pitchFamily="34" charset="0"/>
-            </a:endParaRPr>
           </a:p>
           <a:p>
             <a:pPr>
@@ -7475,10 +7294,6 @@
               </a:rPr>
               <a:t>=&gt; Ngưỡng điểm này thường lên đến &gt;90%.</a:t>
             </a:r>
-            <a:endParaRPr lang="en-US" sz="2400" dirty="0">
-              <a:ea typeface="SF Pro Semibold" pitchFamily="2" charset="0"/>
-              <a:cs typeface="Arial" panose="020B0604020202020204" pitchFamily="34" charset="0"/>
-            </a:endParaRPr>
           </a:p>
         </p:txBody>
       </p:sp>
@@ -7549,13 +7364,6 @@
               </a:rPr>
               <a:t>3.3.Điểm tin cậy trong nhận dạng khuôn mặt?:  </a:t>
             </a:r>
-            <a:endParaRPr lang="en-US" sz="2800" dirty="0">
-              <a:solidFill>
-                <a:srgbClr val="FF0000"/>
-              </a:solidFill>
-              <a:ea typeface="SF Pro Semibold" pitchFamily="2" charset="0"/>
-              <a:cs typeface="Arial" panose="020B0604020202020204" pitchFamily="34" charset="0"/>
-            </a:endParaRPr>
           </a:p>
         </p:txBody>
       </p:sp>
@@ -7636,12 +7444,6 @@
               </a:rPr>
               <a:t>3.ĐỘ TIN CẬY VÀ CHÍNH XÁC. </a:t>
             </a:r>
-            <a:endParaRPr lang="en-US" sz="3200" b="1">
-              <a:solidFill>
-                <a:schemeClr val="bg1"/>
-              </a:solidFill>
-              <a:latin typeface="+mj-lt"/>
-            </a:endParaRPr>
           </a:p>
         </p:txBody>
       </p:sp>
@@ -7678,7 +7480,7 @@
           <p:nvPr/>
         </p:nvPicPr>
         <p:blipFill>
-          <a:blip r:embed="rId1"/>
+          <a:blip r:embed="rId2"/>
           <a:stretch>
             <a:fillRect/>
           </a:stretch>
@@ -7745,11 +7547,6 @@
               </a:rPr>
               <a:t>4</a:t>
             </a:r>
-            <a:endParaRPr lang="en-US">
-              <a:solidFill>
-                <a:srgbClr val="FF0000"/>
-              </a:solidFill>
-            </a:endParaRPr>
           </a:p>
         </p:txBody>
       </p:sp>
@@ -7762,7 +7559,7 @@
           <p:nvPr/>
         </p:nvPicPr>
         <p:blipFill>
-          <a:blip r:embed="rId2"/>
+          <a:blip r:embed="rId3"/>
           <a:stretch>
             <a:fillRect/>
           </a:stretch>
@@ -7810,7 +7607,7 @@
       <p:sp>
         <p:nvSpPr>
           <p:cNvPr id="10" name="TextBox 9">
-            <a:hlinkClick r:id="rId1"/>
+            <a:hlinkClick r:id="rId2"/>
           </p:cNvPr>
           <p:cNvSpPr txBox="1"/>
           <p:nvPr/>
@@ -7845,10 +7642,6 @@
               </a:rPr>
               <a:t>https://en.wikipedia.org/wiki/Facial_recognition_system</a:t>
             </a:r>
-            <a:endParaRPr lang="en-US" sz="2400" dirty="0">
-              <a:ea typeface="SF Pro Semibold" pitchFamily="2" charset="0"/>
-              <a:cs typeface="Arial" panose="020B0604020202020204" pitchFamily="34" charset="0"/>
-            </a:endParaRPr>
           </a:p>
         </p:txBody>
       </p:sp>
@@ -7929,12 +7722,6 @@
               </a:rPr>
               <a:t>CÁC TRANG TÀI LIỆU THAM KHẢO. </a:t>
             </a:r>
-            <a:endParaRPr lang="en-US" sz="3200" b="1">
-              <a:solidFill>
-                <a:schemeClr val="bg1"/>
-              </a:solidFill>
-              <a:latin typeface="+mj-lt"/>
-            </a:endParaRPr>
           </a:p>
         </p:txBody>
       </p:sp>
@@ -7971,7 +7758,7 @@
           <p:nvPr/>
         </p:nvPicPr>
         <p:blipFill>
-          <a:blip r:embed="rId2"/>
+          <a:blip r:embed="rId3"/>
           <a:stretch>
             <a:fillRect/>
           </a:stretch>
@@ -8038,18 +7825,13 @@
               </a:rPr>
               <a:t>4</a:t>
             </a:r>
-            <a:endParaRPr lang="en-US">
-              <a:solidFill>
-                <a:srgbClr val="FF0000"/>
-              </a:solidFill>
-            </a:endParaRPr>
           </a:p>
         </p:txBody>
       </p:sp>
       <p:sp>
         <p:nvSpPr>
           <p:cNvPr id="17" name="TextBox 16">
-            <a:hlinkClick r:id="rId3"/>
+            <a:hlinkClick r:id="rId4"/>
           </p:cNvPr>
           <p:cNvSpPr txBox="1"/>
           <p:nvPr/>
@@ -8084,17 +7866,13 @@
               </a:rPr>
               <a:t>https://this.deakin.edu.au/innovation/facial-recognition-id-how-safe-is-your-face#:~:text=It's%20not%20relatively%20more%20secure,your%20phone%20using%20Face%20ID.</a:t>
             </a:r>
-            <a:endParaRPr lang="en-US" sz="2400" dirty="0">
-              <a:ea typeface="SF Pro Semibold" pitchFamily="2" charset="0"/>
-              <a:cs typeface="Arial" panose="020B0604020202020204" pitchFamily="34" charset="0"/>
-            </a:endParaRPr>
           </a:p>
         </p:txBody>
       </p:sp>
       <p:sp>
         <p:nvSpPr>
           <p:cNvPr id="18" name="TextBox 17">
-            <a:hlinkClick r:id="rId4"/>
+            <a:hlinkClick r:id="rId5"/>
           </p:cNvPr>
           <p:cNvSpPr txBox="1"/>
           <p:nvPr/>
@@ -8129,10 +7907,6 @@
               </a:rPr>
               <a:t>https://senstar.com/senstarpedia/pros-and-cons-of-facial-recognition/</a:t>
             </a:r>
-            <a:endParaRPr lang="en-US" sz="2400" dirty="0">
-              <a:ea typeface="SF Pro Semibold" pitchFamily="2" charset="0"/>
-              <a:cs typeface="Arial" panose="020B0604020202020204" pitchFamily="34" charset="0"/>
-            </a:endParaRPr>
           </a:p>
         </p:txBody>
       </p:sp>
@@ -8241,12 +8015,6 @@
               </a:rPr>
               <a:t>KẾT THÚC. </a:t>
             </a:r>
-            <a:endParaRPr lang="en-US" sz="3200" b="1">
-              <a:solidFill>
-                <a:schemeClr val="bg1"/>
-              </a:solidFill>
-              <a:latin typeface="+mj-lt"/>
-            </a:endParaRPr>
           </a:p>
         </p:txBody>
       </p:sp>
@@ -8283,7 +8051,7 @@
           <p:nvPr/>
         </p:nvPicPr>
         <p:blipFill>
-          <a:blip r:embed="rId1"/>
+          <a:blip r:embed="rId2"/>
           <a:stretch>
             <a:fillRect/>
           </a:stretch>
@@ -8350,11 +8118,6 @@
               </a:rPr>
               <a:t>4</a:t>
             </a:r>
-            <a:endParaRPr lang="en-US">
-              <a:solidFill>
-                <a:srgbClr val="FF0000"/>
-              </a:solidFill>
-            </a:endParaRPr>
           </a:p>
         </p:txBody>
       </p:sp>
@@ -8367,7 +8130,7 @@
           <p:nvPr/>
         </p:nvPicPr>
         <p:blipFill>
-          <a:blip r:embed="rId2"/>
+          <a:blip r:embed="rId3"/>
           <a:stretch>
             <a:fillRect/>
           </a:stretch>
@@ -8487,12 +8250,6 @@
               </a:rPr>
               <a:t>MỤC LỤC</a:t>
             </a:r>
-            <a:endParaRPr lang="en-US" sz="3200" b="1">
-              <a:solidFill>
-                <a:schemeClr val="bg1"/>
-              </a:solidFill>
-              <a:latin typeface="+mj-lt"/>
-            </a:endParaRPr>
           </a:p>
         </p:txBody>
       </p:sp>
@@ -8529,7 +8286,7 @@
           <p:nvPr/>
         </p:nvPicPr>
         <p:blipFill>
-          <a:blip r:embed="rId1"/>
+          <a:blip r:embed="rId2"/>
           <a:stretch>
             <a:fillRect/>
           </a:stretch>
@@ -8596,11 +8353,6 @@
               </a:rPr>
               <a:t>2</a:t>
             </a:r>
-            <a:endParaRPr lang="en-US">
-              <a:solidFill>
-                <a:srgbClr val="FF0000"/>
-              </a:solidFill>
-            </a:endParaRPr>
           </a:p>
         </p:txBody>
       </p:sp>
@@ -8822,6 +8574,89 @@
               </a:rPr>
               <a:t>.</a:t>
             </a:r>
+          </a:p>
+          <a:p>
+            <a:r>
+              <a:rPr lang="en-US" sz="2400" dirty="0">
+                <a:solidFill>
+                  <a:srgbClr val="FF0000"/>
+                </a:solidFill>
+                <a:ea typeface="SF Pro Semibold" pitchFamily="2" charset="0"/>
+                <a:cs typeface="Arial" panose="020B0604020202020204" pitchFamily="34" charset="0"/>
+              </a:rPr>
+              <a:t>1.1.Khái </a:t>
+            </a:r>
+            <a:r>
+              <a:rPr lang="en-US" sz="2400" dirty="0" err="1">
+                <a:solidFill>
+                  <a:srgbClr val="FF0000"/>
+                </a:solidFill>
+                <a:ea typeface="SF Pro Semibold" pitchFamily="2" charset="0"/>
+                <a:cs typeface="Arial" panose="020B0604020202020204" pitchFamily="34" charset="0"/>
+              </a:rPr>
+              <a:t>niệm.</a:t>
+            </a:r>
+            <a:r>
+              <a:rPr lang="en-US" sz="2400" dirty="0">
+                <a:solidFill>
+                  <a:srgbClr val="FF0000"/>
+                </a:solidFill>
+                <a:ea typeface="SF Pro Semibold" pitchFamily="2" charset="0"/>
+                <a:cs typeface="Arial" panose="020B0604020202020204" pitchFamily="34" charset="0"/>
+              </a:rPr>
+              <a:t>	</a:t>
+            </a:r>
+          </a:p>
+          <a:p>
+            <a:r>
+              <a:rPr lang="en-US" sz="2400" dirty="0">
+                <a:solidFill>
+                  <a:srgbClr val="FF0000"/>
+                </a:solidFill>
+                <a:ea typeface="SF Pro Semibold" pitchFamily="2" charset="0"/>
+                <a:cs typeface="Arial" panose="020B0604020202020204" pitchFamily="34" charset="0"/>
+              </a:rPr>
+              <a:t>1.2.Cấu </a:t>
+            </a:r>
+            <a:r>
+              <a:rPr lang="en-US" sz="2400" dirty="0" err="1">
+                <a:solidFill>
+                  <a:srgbClr val="FF0000"/>
+                </a:solidFill>
+                <a:ea typeface="SF Pro Semibold" pitchFamily="2" charset="0"/>
+                <a:cs typeface="Arial" panose="020B0604020202020204" pitchFamily="34" charset="0"/>
+              </a:rPr>
+              <a:t>tạo</a:t>
+            </a:r>
+            <a:r>
+              <a:rPr lang="en-US" sz="2400" dirty="0">
+                <a:solidFill>
+                  <a:srgbClr val="FF0000"/>
+                </a:solidFill>
+                <a:ea typeface="SF Pro Semibold" pitchFamily="2" charset="0"/>
+                <a:cs typeface="Arial" panose="020B0604020202020204" pitchFamily="34" charset="0"/>
+              </a:rPr>
+              <a:t> Face ID.</a:t>
+            </a:r>
+            <a:endParaRPr lang="vi-VN" sz="2400" dirty="0">
+              <a:solidFill>
+                <a:srgbClr val="FF0000"/>
+              </a:solidFill>
+              <a:ea typeface="SF Pro Semibold" pitchFamily="2" charset="0"/>
+              <a:cs typeface="Arial" panose="020B0604020202020204" pitchFamily="34" charset="0"/>
+            </a:endParaRPr>
+          </a:p>
+          <a:p>
+            <a:r>
+              <a:rPr lang="vi-VN" sz="2400" dirty="0">
+                <a:solidFill>
+                  <a:srgbClr val="FF0000"/>
+                </a:solidFill>
+                <a:ea typeface="SF Pro Semibold" pitchFamily="2" charset="0"/>
+                <a:cs typeface="Arial" panose="020B0604020202020204" pitchFamily="34" charset="0"/>
+              </a:rPr>
+              <a:t>2. Nguyên lý hoạt động.</a:t>
+            </a:r>
             <a:endParaRPr lang="en-US" sz="2400" dirty="0">
               <a:solidFill>
                 <a:srgbClr val="FF0000"/>
@@ -8839,7 +8674,7 @@
                 <a:ea typeface="SF Pro Semibold" pitchFamily="2" charset="0"/>
                 <a:cs typeface="Arial" panose="020B0604020202020204" pitchFamily="34" charset="0"/>
               </a:rPr>
-              <a:t>1.1.Khái </a:t>
+              <a:t>2.1.Cơ </a:t>
             </a:r>
             <a:r>
               <a:rPr lang="en-US" sz="2400" dirty="0" err="1">
@@ -8849,17 +8684,7 @@
                 <a:ea typeface="SF Pro Semibold" pitchFamily="2" charset="0"/>
                 <a:cs typeface="Arial" panose="020B0604020202020204" pitchFamily="34" charset="0"/>
               </a:rPr>
-              <a:t>niệm.</a:t>
-            </a:r>
-            <a:r>
-              <a:rPr lang="en-US" sz="2400" dirty="0">
-                <a:solidFill>
-                  <a:srgbClr val="FF0000"/>
-                </a:solidFill>
-                <a:ea typeface="SF Pro Semibold" pitchFamily="2" charset="0"/>
-                <a:cs typeface="Arial" panose="020B0604020202020204" pitchFamily="34" charset="0"/>
-              </a:rPr>
-              <a:t>	</a:t>
+              <a:t>bản.</a:t>
             </a:r>
             <a:endParaRPr lang="en-US" sz="2400" dirty="0">
               <a:solidFill>
@@ -8878,7 +8703,7 @@
                 <a:ea typeface="SF Pro Semibold" pitchFamily="2" charset="0"/>
                 <a:cs typeface="Arial" panose="020B0604020202020204" pitchFamily="34" charset="0"/>
               </a:rPr>
-              <a:t>1.2.Cấu </a:t>
+              <a:t>2.2.Nhận </a:t>
             </a:r>
             <a:r>
               <a:rPr lang="en-US" sz="2400" dirty="0" err="1">
@@ -8888,7 +8713,7 @@
                 <a:ea typeface="SF Pro Semibold" pitchFamily="2" charset="0"/>
                 <a:cs typeface="Arial" panose="020B0604020202020204" pitchFamily="34" charset="0"/>
               </a:rPr>
-              <a:t>tạo</a:t>
+              <a:t>dạng</a:t>
             </a:r>
             <a:r>
               <a:rPr lang="en-US" sz="2400" dirty="0">
@@ -8898,26 +8723,17 @@
                 <a:ea typeface="SF Pro Semibold" pitchFamily="2" charset="0"/>
                 <a:cs typeface="Arial" panose="020B0604020202020204" pitchFamily="34" charset="0"/>
               </a:rPr>
-              <a:t> Face ID.</a:t>
-            </a:r>
-            <a:endParaRPr lang="vi-VN" sz="2400" dirty="0">
-              <a:solidFill>
-                <a:srgbClr val="FF0000"/>
-              </a:solidFill>
-              <a:ea typeface="SF Pro Semibold" pitchFamily="2" charset="0"/>
-              <a:cs typeface="Arial" panose="020B0604020202020204" pitchFamily="34" charset="0"/>
-            </a:endParaRPr>
-          </a:p>
-          <a:p>
-            <a:r>
-              <a:rPr lang="vi-VN" sz="2400" dirty="0">
-                <a:solidFill>
-                  <a:srgbClr val="FF0000"/>
-                </a:solidFill>
-                <a:ea typeface="SF Pro Semibold" pitchFamily="2" charset="0"/>
-                <a:cs typeface="Arial" panose="020B0604020202020204" pitchFamily="34" charset="0"/>
-              </a:rPr>
-              <a:t>2. Nguyên lý hoạt động.</a:t>
+              <a:t> 3 </a:t>
+            </a:r>
+            <a:r>
+              <a:rPr lang="en-US" sz="2400" dirty="0" err="1">
+                <a:solidFill>
+                  <a:srgbClr val="FF0000"/>
+                </a:solidFill>
+                <a:ea typeface="SF Pro Semibold" pitchFamily="2" charset="0"/>
+                <a:cs typeface="Arial" panose="020B0604020202020204" pitchFamily="34" charset="0"/>
+              </a:rPr>
+              <a:t>chiều.</a:t>
             </a:r>
             <a:endParaRPr lang="en-US" sz="2400" dirty="0">
               <a:solidFill>
@@ -8936,7 +8752,7 @@
                 <a:ea typeface="SF Pro Semibold" pitchFamily="2" charset="0"/>
                 <a:cs typeface="Arial" panose="020B0604020202020204" pitchFamily="34" charset="0"/>
               </a:rPr>
-              <a:t>2.1.Cơ </a:t>
+              <a:t>2.3.Phân </a:t>
             </a:r>
             <a:r>
               <a:rPr lang="en-US" sz="2400" dirty="0" err="1">
@@ -8946,7 +8762,69 @@
                 <a:ea typeface="SF Pro Semibold" pitchFamily="2" charset="0"/>
                 <a:cs typeface="Arial" panose="020B0604020202020204" pitchFamily="34" charset="0"/>
               </a:rPr>
-              <a:t>bản.</a:t>
+              <a:t>tích</a:t>
+            </a:r>
+            <a:r>
+              <a:rPr lang="en-US" sz="2400" dirty="0">
+                <a:solidFill>
+                  <a:srgbClr val="FF0000"/>
+                </a:solidFill>
+                <a:ea typeface="SF Pro Semibold" pitchFamily="2" charset="0"/>
+                <a:cs typeface="Arial" panose="020B0604020202020204" pitchFamily="34" charset="0"/>
+              </a:rPr>
+              <a:t> </a:t>
+            </a:r>
+            <a:r>
+              <a:rPr lang="en-US" sz="2400" dirty="0" err="1">
+                <a:solidFill>
+                  <a:srgbClr val="FF0000"/>
+                </a:solidFill>
+                <a:ea typeface="SF Pro Semibold" pitchFamily="2" charset="0"/>
+                <a:cs typeface="Arial" panose="020B0604020202020204" pitchFamily="34" charset="0"/>
+              </a:rPr>
+              <a:t>kết</a:t>
+            </a:r>
+            <a:r>
+              <a:rPr lang="en-US" sz="2400" dirty="0">
+                <a:solidFill>
+                  <a:srgbClr val="FF0000"/>
+                </a:solidFill>
+                <a:ea typeface="SF Pro Semibold" pitchFamily="2" charset="0"/>
+                <a:cs typeface="Arial" panose="020B0604020202020204" pitchFamily="34" charset="0"/>
+              </a:rPr>
+              <a:t> </a:t>
+            </a:r>
+            <a:r>
+              <a:rPr lang="en-US" sz="2400" dirty="0" err="1">
+                <a:solidFill>
+                  <a:srgbClr val="FF0000"/>
+                </a:solidFill>
+                <a:ea typeface="SF Pro Semibold" pitchFamily="2" charset="0"/>
+                <a:cs typeface="Arial" panose="020B0604020202020204" pitchFamily="34" charset="0"/>
+              </a:rPr>
+              <a:t>cấu</a:t>
+            </a:r>
+            <a:r>
+              <a:rPr lang="en-US" sz="2400" dirty="0">
+                <a:solidFill>
+                  <a:srgbClr val="FF0000"/>
+                </a:solidFill>
+                <a:ea typeface="SF Pro Semibold" pitchFamily="2" charset="0"/>
+                <a:cs typeface="Arial" panose="020B0604020202020204" pitchFamily="34" charset="0"/>
+              </a:rPr>
+              <a:t> da.</a:t>
+            </a:r>
+          </a:p>
+          <a:p>
+            <a:r>
+              <a:rPr lang="vi-VN" sz="2400" dirty="0">
+                <a:solidFill>
+                  <a:srgbClr val="FF0000"/>
+                </a:solidFill>
+                <a:ea typeface="SF Pro Semibold" pitchFamily="2" charset="0"/>
+                <a:cs typeface="Arial" panose="020B0604020202020204" pitchFamily="34" charset="0"/>
+              </a:rPr>
+              <a:t>3. Độ tin cậy và chính xác.</a:t>
             </a:r>
             <a:endParaRPr lang="en-US" sz="2400" dirty="0">
               <a:solidFill>
@@ -8965,7 +8843,7 @@
                 <a:ea typeface="SF Pro Semibold" pitchFamily="2" charset="0"/>
                 <a:cs typeface="Arial" panose="020B0604020202020204" pitchFamily="34" charset="0"/>
               </a:rPr>
-              <a:t>2.2.Nhận </a:t>
+              <a:t>3.1.Nhận </a:t>
             </a:r>
             <a:r>
               <a:rPr lang="en-US" sz="2400" dirty="0" err="1">
@@ -8975,7 +8853,7 @@
                 <a:ea typeface="SF Pro Semibold" pitchFamily="2" charset="0"/>
                 <a:cs typeface="Arial" panose="020B0604020202020204" pitchFamily="34" charset="0"/>
               </a:rPr>
-              <a:t>dạng</a:t>
+              <a:t>dạng</a:t>
             </a:r>
             <a:r>
               <a:rPr lang="en-US" sz="2400" dirty="0">
@@ -8985,7 +8863,7 @@
                 <a:ea typeface="SF Pro Semibold" pitchFamily="2" charset="0"/>
                 <a:cs typeface="Arial" panose="020B0604020202020204" pitchFamily="34" charset="0"/>
               </a:rPr>
-              <a:t> 3 </a:t>
+              <a:t> </a:t>
             </a:r>
             <a:r>
               <a:rPr lang="en-US" sz="2400" dirty="0" err="1">
@@ -8995,17 +8873,8 @@
                 <a:ea typeface="SF Pro Semibold" pitchFamily="2" charset="0"/>
                 <a:cs typeface="Arial" panose="020B0604020202020204" pitchFamily="34" charset="0"/>
               </a:rPr>
-              <a:t>chiều.</a:t>
-            </a:r>
-            <a:endParaRPr lang="en-US" sz="2400" dirty="0">
-              <a:solidFill>
-                <a:srgbClr val="FF0000"/>
-              </a:solidFill>
-              <a:ea typeface="SF Pro Semibold" pitchFamily="2" charset="0"/>
-              <a:cs typeface="Arial" panose="020B0604020202020204" pitchFamily="34" charset="0"/>
-            </a:endParaRPr>
-          </a:p>
-          <a:p>
+              <a:t>khuôn</a:t>
+            </a:r>
             <a:r>
               <a:rPr lang="en-US" sz="2400" dirty="0">
                 <a:solidFill>
@@ -9014,7 +8883,7 @@
                 <a:ea typeface="SF Pro Semibold" pitchFamily="2" charset="0"/>
                 <a:cs typeface="Arial" panose="020B0604020202020204" pitchFamily="34" charset="0"/>
               </a:rPr>
-              <a:t>2.3.Phân </a:t>
+              <a:t> </a:t>
             </a:r>
             <a:r>
               <a:rPr lang="en-US" sz="2400" dirty="0" err="1">
@@ -9024,7 +8893,7 @@
                 <a:ea typeface="SF Pro Semibold" pitchFamily="2" charset="0"/>
                 <a:cs typeface="Arial" panose="020B0604020202020204" pitchFamily="34" charset="0"/>
               </a:rPr>
-              <a:t>tích</a:t>
+              <a:t>mặt</a:t>
             </a:r>
             <a:r>
               <a:rPr lang="en-US" sz="2400" dirty="0">
@@ -9044,7 +8913,7 @@
                 <a:ea typeface="SF Pro Semibold" pitchFamily="2" charset="0"/>
                 <a:cs typeface="Arial" panose="020B0604020202020204" pitchFamily="34" charset="0"/>
               </a:rPr>
-              <a:t>kết</a:t>
+              <a:t>có</a:t>
             </a:r>
             <a:r>
               <a:rPr lang="en-US" sz="2400" dirty="0">
@@ -9064,7 +8933,7 @@
                 <a:ea typeface="SF Pro Semibold" pitchFamily="2" charset="0"/>
                 <a:cs typeface="Arial" panose="020B0604020202020204" pitchFamily="34" charset="0"/>
               </a:rPr>
-              <a:t>cấu</a:t>
+              <a:t>chính</a:t>
             </a:r>
             <a:r>
               <a:rPr lang="en-US" sz="2400" dirty="0">
@@ -9074,36 +8943,18 @@
                 <a:ea typeface="SF Pro Semibold" pitchFamily="2" charset="0"/>
                 <a:cs typeface="Arial" panose="020B0604020202020204" pitchFamily="34" charset="0"/>
               </a:rPr>
-              <a:t> da.</a:t>
-            </a:r>
-            <a:endParaRPr lang="en-US" sz="2400" dirty="0">
-              <a:solidFill>
-                <a:srgbClr val="FF0000"/>
-              </a:solidFill>
-              <a:ea typeface="SF Pro Semibold" pitchFamily="2" charset="0"/>
-              <a:cs typeface="Arial" panose="020B0604020202020204" pitchFamily="34" charset="0"/>
-            </a:endParaRPr>
-          </a:p>
-          <a:p>
-            <a:r>
-              <a:rPr lang="vi-VN" sz="2400" dirty="0">
-                <a:solidFill>
-                  <a:srgbClr val="FF0000"/>
-                </a:solidFill>
-                <a:ea typeface="SF Pro Semibold" pitchFamily="2" charset="0"/>
-                <a:cs typeface="Arial" panose="020B0604020202020204" pitchFamily="34" charset="0"/>
-              </a:rPr>
-              <a:t>3. Độ tin cậy và chính xác.</a:t>
-            </a:r>
-            <a:endParaRPr lang="en-US" sz="2400" dirty="0">
-              <a:solidFill>
-                <a:srgbClr val="FF0000"/>
-              </a:solidFill>
-              <a:ea typeface="SF Pro Semibold" pitchFamily="2" charset="0"/>
-              <a:cs typeface="Arial" panose="020B0604020202020204" pitchFamily="34" charset="0"/>
-            </a:endParaRPr>
-          </a:p>
-          <a:p>
+              <a:t> </a:t>
+            </a:r>
+            <a:r>
+              <a:rPr lang="en-US" sz="2400" dirty="0" err="1">
+                <a:solidFill>
+                  <a:srgbClr val="FF0000"/>
+                </a:solidFill>
+                <a:ea typeface="SF Pro Semibold" pitchFamily="2" charset="0"/>
+                <a:cs typeface="Arial" panose="020B0604020202020204" pitchFamily="34" charset="0"/>
+              </a:rPr>
+              <a:t>xác</a:t>
+            </a:r>
             <a:r>
               <a:rPr lang="en-US" sz="2400" dirty="0">
                 <a:solidFill>
@@ -9112,7 +8963,7 @@
                 <a:ea typeface="SF Pro Semibold" pitchFamily="2" charset="0"/>
                 <a:cs typeface="Arial" panose="020B0604020202020204" pitchFamily="34" charset="0"/>
               </a:rPr>
-              <a:t>3.1.Nhận </a:t>
+              <a:t> </a:t>
             </a:r>
             <a:r>
               <a:rPr lang="en-US" sz="2400" dirty="0" err="1">
@@ -9122,7 +8973,7 @@
                 <a:ea typeface="SF Pro Semibold" pitchFamily="2" charset="0"/>
                 <a:cs typeface="Arial" panose="020B0604020202020204" pitchFamily="34" charset="0"/>
               </a:rPr>
-              <a:t>dạng</a:t>
+              <a:t>không</a:t>
             </a:r>
             <a:r>
               <a:rPr lang="en-US" sz="2400" dirty="0">
@@ -9132,6 +8983,38 @@
                 <a:ea typeface="SF Pro Semibold" pitchFamily="2" charset="0"/>
                 <a:cs typeface="Arial" panose="020B0604020202020204" pitchFamily="34" charset="0"/>
               </a:rPr>
+              <a:t>?</a:t>
+            </a:r>
+          </a:p>
+          <a:p>
+            <a:r>
+              <a:rPr lang="en-US" sz="2400" dirty="0">
+                <a:solidFill>
+                  <a:srgbClr val="FF0000"/>
+                </a:solidFill>
+                <a:ea typeface="SF Pro Semibold" pitchFamily="2" charset="0"/>
+                <a:cs typeface="Arial" panose="020B0604020202020204" pitchFamily="34" charset="0"/>
+              </a:rPr>
+              <a:t>3.2.Nhận </a:t>
+            </a:r>
+            <a:r>
+              <a:rPr lang="en-US" sz="2400" dirty="0" err="1">
+                <a:solidFill>
+                  <a:srgbClr val="FF0000"/>
+                </a:solidFill>
+                <a:ea typeface="SF Pro Semibold" pitchFamily="2" charset="0"/>
+                <a:cs typeface="Arial" panose="020B0604020202020204" pitchFamily="34" charset="0"/>
+              </a:rPr>
+              <a:t>diện</a:t>
+            </a:r>
+            <a:r>
+              <a:rPr lang="en-US" sz="2400" dirty="0">
+                <a:solidFill>
+                  <a:srgbClr val="FF0000"/>
+                </a:solidFill>
+                <a:ea typeface="SF Pro Semibold" pitchFamily="2" charset="0"/>
+                <a:cs typeface="Arial" panose="020B0604020202020204" pitchFamily="34" charset="0"/>
+              </a:rPr>
               <a:t> </a:t>
             </a:r>
             <a:r>
@@ -9192,6 +9075,26 @@
                 <a:ea typeface="SF Pro Semibold" pitchFamily="2" charset="0"/>
                 <a:cs typeface="Arial" panose="020B0604020202020204" pitchFamily="34" charset="0"/>
               </a:rPr>
+              <a:t> an </a:t>
+            </a:r>
+            <a:r>
+              <a:rPr lang="en-US" sz="2400" dirty="0" err="1">
+                <a:solidFill>
+                  <a:srgbClr val="FF0000"/>
+                </a:solidFill>
+                <a:ea typeface="SF Pro Semibold" pitchFamily="2" charset="0"/>
+                <a:cs typeface="Arial" panose="020B0604020202020204" pitchFamily="34" charset="0"/>
+              </a:rPr>
+              <a:t>toàn</a:t>
+            </a:r>
+            <a:r>
+              <a:rPr lang="en-US" sz="2400" dirty="0">
+                <a:solidFill>
+                  <a:srgbClr val="FF0000"/>
+                </a:solidFill>
+                <a:ea typeface="SF Pro Semibold" pitchFamily="2" charset="0"/>
+                <a:cs typeface="Arial" panose="020B0604020202020204" pitchFamily="34" charset="0"/>
+              </a:rPr>
               <a:t> </a:t>
             </a:r>
             <a:r>
@@ -9202,7 +9105,7 @@
                 <a:ea typeface="SF Pro Semibold" pitchFamily="2" charset="0"/>
                 <a:cs typeface="Arial" panose="020B0604020202020204" pitchFamily="34" charset="0"/>
               </a:rPr>
-              <a:t>chính</a:t>
+              <a:t>không</a:t>
             </a:r>
             <a:r>
               <a:rPr lang="en-US" sz="2400" dirty="0">
@@ -9212,194 +9115,8 @@
                 <a:ea typeface="SF Pro Semibold" pitchFamily="2" charset="0"/>
                 <a:cs typeface="Arial" panose="020B0604020202020204" pitchFamily="34" charset="0"/>
               </a:rPr>
-              <a:t> </a:t>
-            </a:r>
-            <a:r>
-              <a:rPr lang="en-US" sz="2400" dirty="0" err="1">
-                <a:solidFill>
-                  <a:srgbClr val="FF0000"/>
-                </a:solidFill>
-                <a:ea typeface="SF Pro Semibold" pitchFamily="2" charset="0"/>
-                <a:cs typeface="Arial" panose="020B0604020202020204" pitchFamily="34" charset="0"/>
-              </a:rPr>
-              <a:t>xác</a:t>
-            </a:r>
-            <a:r>
-              <a:rPr lang="en-US" sz="2400" dirty="0">
-                <a:solidFill>
-                  <a:srgbClr val="FF0000"/>
-                </a:solidFill>
-                <a:ea typeface="SF Pro Semibold" pitchFamily="2" charset="0"/>
-                <a:cs typeface="Arial" panose="020B0604020202020204" pitchFamily="34" charset="0"/>
-              </a:rPr>
-              <a:t> </a:t>
-            </a:r>
-            <a:r>
-              <a:rPr lang="en-US" sz="2400" dirty="0" err="1">
-                <a:solidFill>
-                  <a:srgbClr val="FF0000"/>
-                </a:solidFill>
-                <a:ea typeface="SF Pro Semibold" pitchFamily="2" charset="0"/>
-                <a:cs typeface="Arial" panose="020B0604020202020204" pitchFamily="34" charset="0"/>
-              </a:rPr>
-              <a:t>không</a:t>
-            </a:r>
-            <a:r>
-              <a:rPr lang="en-US" sz="2400" dirty="0">
-                <a:solidFill>
-                  <a:srgbClr val="FF0000"/>
-                </a:solidFill>
-                <a:ea typeface="SF Pro Semibold" pitchFamily="2" charset="0"/>
-                <a:cs typeface="Arial" panose="020B0604020202020204" pitchFamily="34" charset="0"/>
-              </a:rPr>
               <a:t>?</a:t>
             </a:r>
-            <a:endParaRPr lang="en-US" sz="2400" dirty="0">
-              <a:solidFill>
-                <a:srgbClr val="FF0000"/>
-              </a:solidFill>
-              <a:ea typeface="SF Pro Semibold" pitchFamily="2" charset="0"/>
-              <a:cs typeface="Arial" panose="020B0604020202020204" pitchFamily="34" charset="0"/>
-            </a:endParaRPr>
-          </a:p>
-          <a:p>
-            <a:r>
-              <a:rPr lang="en-US" sz="2400" dirty="0">
-                <a:solidFill>
-                  <a:srgbClr val="FF0000"/>
-                </a:solidFill>
-                <a:ea typeface="SF Pro Semibold" pitchFamily="2" charset="0"/>
-                <a:cs typeface="Arial" panose="020B0604020202020204" pitchFamily="34" charset="0"/>
-              </a:rPr>
-              <a:t>3.2.Nhận </a:t>
-            </a:r>
-            <a:r>
-              <a:rPr lang="en-US" sz="2400" dirty="0" err="1">
-                <a:solidFill>
-                  <a:srgbClr val="FF0000"/>
-                </a:solidFill>
-                <a:ea typeface="SF Pro Semibold" pitchFamily="2" charset="0"/>
-                <a:cs typeface="Arial" panose="020B0604020202020204" pitchFamily="34" charset="0"/>
-              </a:rPr>
-              <a:t>diện</a:t>
-            </a:r>
-            <a:r>
-              <a:rPr lang="en-US" sz="2400" dirty="0">
-                <a:solidFill>
-                  <a:srgbClr val="FF0000"/>
-                </a:solidFill>
-                <a:ea typeface="SF Pro Semibold" pitchFamily="2" charset="0"/>
-                <a:cs typeface="Arial" panose="020B0604020202020204" pitchFamily="34" charset="0"/>
-              </a:rPr>
-              <a:t> </a:t>
-            </a:r>
-            <a:r>
-              <a:rPr lang="en-US" sz="2400" dirty="0" err="1">
-                <a:solidFill>
-                  <a:srgbClr val="FF0000"/>
-                </a:solidFill>
-                <a:ea typeface="SF Pro Semibold" pitchFamily="2" charset="0"/>
-                <a:cs typeface="Arial" panose="020B0604020202020204" pitchFamily="34" charset="0"/>
-              </a:rPr>
-              <a:t>khuôn</a:t>
-            </a:r>
-            <a:r>
-              <a:rPr lang="en-US" sz="2400" dirty="0">
-                <a:solidFill>
-                  <a:srgbClr val="FF0000"/>
-                </a:solidFill>
-                <a:ea typeface="SF Pro Semibold" pitchFamily="2" charset="0"/>
-                <a:cs typeface="Arial" panose="020B0604020202020204" pitchFamily="34" charset="0"/>
-              </a:rPr>
-              <a:t> </a:t>
-            </a:r>
-            <a:r>
-              <a:rPr lang="en-US" sz="2400" dirty="0" err="1">
-                <a:solidFill>
-                  <a:srgbClr val="FF0000"/>
-                </a:solidFill>
-                <a:ea typeface="SF Pro Semibold" pitchFamily="2" charset="0"/>
-                <a:cs typeface="Arial" panose="020B0604020202020204" pitchFamily="34" charset="0"/>
-              </a:rPr>
-              <a:t>mặt</a:t>
-            </a:r>
-            <a:r>
-              <a:rPr lang="en-US" sz="2400" dirty="0">
-                <a:solidFill>
-                  <a:srgbClr val="FF0000"/>
-                </a:solidFill>
-                <a:ea typeface="SF Pro Semibold" pitchFamily="2" charset="0"/>
-                <a:cs typeface="Arial" panose="020B0604020202020204" pitchFamily="34" charset="0"/>
-              </a:rPr>
-              <a:t> </a:t>
-            </a:r>
-            <a:r>
-              <a:rPr lang="en-US" sz="2400" dirty="0" err="1">
-                <a:solidFill>
-                  <a:srgbClr val="FF0000"/>
-                </a:solidFill>
-                <a:ea typeface="SF Pro Semibold" pitchFamily="2" charset="0"/>
-                <a:cs typeface="Arial" panose="020B0604020202020204" pitchFamily="34" charset="0"/>
-              </a:rPr>
-              <a:t>có</a:t>
-            </a:r>
-            <a:r>
-              <a:rPr lang="en-US" sz="2400" dirty="0">
-                <a:solidFill>
-                  <a:srgbClr val="FF0000"/>
-                </a:solidFill>
-                <a:ea typeface="SF Pro Semibold" pitchFamily="2" charset="0"/>
-                <a:cs typeface="Arial" panose="020B0604020202020204" pitchFamily="34" charset="0"/>
-              </a:rPr>
-              <a:t> an </a:t>
-            </a:r>
-            <a:r>
-              <a:rPr lang="en-US" sz="2400" dirty="0" err="1">
-                <a:solidFill>
-                  <a:srgbClr val="FF0000"/>
-                </a:solidFill>
-                <a:ea typeface="SF Pro Semibold" pitchFamily="2" charset="0"/>
-                <a:cs typeface="Arial" panose="020B0604020202020204" pitchFamily="34" charset="0"/>
-              </a:rPr>
-              <a:t>toàn</a:t>
-            </a:r>
-            <a:r>
-              <a:rPr lang="en-US" sz="2400" dirty="0">
-                <a:solidFill>
-                  <a:srgbClr val="FF0000"/>
-                </a:solidFill>
-                <a:ea typeface="SF Pro Semibold" pitchFamily="2" charset="0"/>
-                <a:cs typeface="Arial" panose="020B0604020202020204" pitchFamily="34" charset="0"/>
-              </a:rPr>
-              <a:t> </a:t>
-            </a:r>
-            <a:r>
-              <a:rPr lang="en-US" sz="2400" dirty="0" err="1">
-                <a:solidFill>
-                  <a:srgbClr val="FF0000"/>
-                </a:solidFill>
-                <a:ea typeface="SF Pro Semibold" pitchFamily="2" charset="0"/>
-                <a:cs typeface="Arial" panose="020B0604020202020204" pitchFamily="34" charset="0"/>
-              </a:rPr>
-              <a:t>không</a:t>
-            </a:r>
-            <a:r>
-              <a:rPr lang="en-US" sz="2400" dirty="0">
-                <a:solidFill>
-                  <a:srgbClr val="FF0000"/>
-                </a:solidFill>
-                <a:ea typeface="SF Pro Semibold" pitchFamily="2" charset="0"/>
-                <a:cs typeface="Arial" panose="020B0604020202020204" pitchFamily="34" charset="0"/>
-              </a:rPr>
-              <a:t>?</a:t>
-            </a:r>
-            <a:endParaRPr lang="en-US" sz="2400" dirty="0">
-              <a:solidFill>
-                <a:srgbClr val="FF0000"/>
-              </a:solidFill>
-              <a:ea typeface="SF Pro Semibold" pitchFamily="2" charset="0"/>
-              <a:cs typeface="Arial" panose="020B0604020202020204" pitchFamily="34" charset="0"/>
-            </a:endParaRPr>
           </a:p>
           <a:p>
             <a:r>
@@ -9642,12 +9359,6 @@
               </a:rPr>
               <a:t>ái Niệm và Cấu Tạo</a:t>
             </a:r>
-            <a:endParaRPr lang="vi-VN" altLang="en-US" sz="3200" b="1">
-              <a:solidFill>
-                <a:schemeClr val="bg1"/>
-              </a:solidFill>
-              <a:latin typeface="+mj-lt"/>
-            </a:endParaRPr>
           </a:p>
         </p:txBody>
       </p:sp>
@@ -9684,7 +9395,7 @@
           <p:nvPr/>
         </p:nvPicPr>
         <p:blipFill>
-          <a:blip r:embed="rId1"/>
+          <a:blip r:embed="rId2"/>
           <a:stretch>
             <a:fillRect/>
           </a:stretch>
@@ -9751,11 +9462,6 @@
               </a:rPr>
               <a:t>2</a:t>
             </a:r>
-            <a:endParaRPr lang="en-US">
-              <a:solidFill>
-                <a:srgbClr val="FF0000"/>
-              </a:solidFill>
-            </a:endParaRPr>
           </a:p>
         </p:txBody>
       </p:sp>
@@ -9960,13 +9666,6 @@
               </a:rPr>
               <a:t>1.1.Khái Niệm</a:t>
             </a:r>
-            <a:endParaRPr lang="vi-VN" sz="2800" dirty="0">
-              <a:solidFill>
-                <a:srgbClr val="FF0000"/>
-              </a:solidFill>
-              <a:ea typeface="SF Pro Semibold" pitchFamily="2" charset="0"/>
-              <a:cs typeface="Arial" panose="020B0604020202020204" pitchFamily="34" charset="0"/>
-            </a:endParaRPr>
           </a:p>
         </p:txBody>
       </p:sp>
@@ -9990,6 +9689,7 @@
           <a:bodyPr wrap="square" rtlCol="0">
             <a:noAutofit/>
           </a:bodyPr>
+          <a:lstStyle/>
           <a:p>
             <a:pPr marL="0" indent="0" algn="l">
               <a:lnSpc>
@@ -10009,9 +9709,6 @@
               </a:rPr>
               <a:t>Công nghệ nhận diện khuôn mặt là một công nghệ sinh trắc học ánh xạ các đặc điểm khuôn mặt của một cá nhân về mặt toán học và lưu trữ dữ liệu dưới dạng faceprint</a:t>
             </a:r>
-            <a:endParaRPr lang="en-US" sz="2400">
-              <a:cs typeface="Arial" panose="020B0604020202020204" pitchFamily="34" charset="0"/>
-            </a:endParaRPr>
           </a:p>
         </p:txBody>
       </p:sp>
@@ -10024,7 +9721,7 @@
           <p:nvPr/>
         </p:nvPicPr>
         <p:blipFill>
-          <a:blip r:embed="rId2"/>
+          <a:blip r:embed="rId3"/>
           <a:stretch>
             <a:fillRect/>
           </a:stretch>
@@ -10048,7 +9745,7 @@
           <p:nvPr/>
         </p:nvPicPr>
         <p:blipFill>
-          <a:blip r:embed="rId3"/>
+          <a:blip r:embed="rId4"/>
           <a:stretch>
             <a:fillRect/>
           </a:stretch>
@@ -10168,12 +9865,6 @@
               </a:rPr>
               <a:t>1.Khái Niệm và Cấu Tạo</a:t>
             </a:r>
-            <a:endParaRPr lang="vi-VN" altLang="en-US" sz="3200" b="1">
-              <a:solidFill>
-                <a:schemeClr val="bg1"/>
-              </a:solidFill>
-              <a:latin typeface="+mj-lt"/>
-            </a:endParaRPr>
           </a:p>
         </p:txBody>
       </p:sp>
@@ -10210,7 +9901,7 @@
           <p:nvPr/>
         </p:nvPicPr>
         <p:blipFill>
-          <a:blip r:embed="rId1"/>
+          <a:blip r:embed="rId2"/>
           <a:stretch>
             <a:fillRect/>
           </a:stretch>
@@ -10277,11 +9968,6 @@
               </a:rPr>
               <a:t>2</a:t>
             </a:r>
-            <a:endParaRPr lang="en-US">
-              <a:solidFill>
-                <a:srgbClr val="FF0000"/>
-              </a:solidFill>
-            </a:endParaRPr>
           </a:p>
         </p:txBody>
       </p:sp>
@@ -10486,13 +10172,6 @@
               </a:rPr>
               <a:t>1.2 Cấu tạo Face ID</a:t>
             </a:r>
-            <a:endParaRPr lang="vi-VN" sz="2800" dirty="0">
-              <a:solidFill>
-                <a:srgbClr val="FF0000"/>
-              </a:solidFill>
-              <a:ea typeface="SF Pro Semibold" pitchFamily="2" charset="0"/>
-              <a:cs typeface="Arial" panose="020B0604020202020204" pitchFamily="34" charset="0"/>
-            </a:endParaRPr>
           </a:p>
         </p:txBody>
       </p:sp>
@@ -10516,6 +10195,7 @@
           <a:bodyPr wrap="square" rtlCol="0">
             <a:spAutoFit/>
           </a:bodyPr>
+          <a:lstStyle/>
           <a:p>
             <a:pPr>
               <a:lnSpc>
@@ -10528,9 +10208,6 @@
               </a:rPr>
               <a:t>Face ID bao gồm hai phần</a:t>
             </a:r>
-            <a:endParaRPr lang="en-US" sz="2400">
-              <a:cs typeface="Arial" panose="020B0604020202020204" pitchFamily="34" charset="0"/>
-            </a:endParaRPr>
           </a:p>
           <a:p>
             <a:pPr marL="285750" indent="-285750">
@@ -10546,9 +10223,6 @@
               </a:rPr>
               <a:t>mô-đun máy chiếu chấm chiếu hơn 30.000 điểm hồng ngoại lên mặt người dùng</a:t>
             </a:r>
-            <a:endParaRPr lang="en-US" sz="2400">
-              <a:cs typeface="Arial" panose="020B0604020202020204" pitchFamily="34" charset="0"/>
-            </a:endParaRPr>
           </a:p>
           <a:p>
             <a:pPr marL="285750" indent="-285750">
@@ -10564,9 +10238,6 @@
               </a:rPr>
               <a:t> mô-đun camera hồng ngoại đọc mẫu </a:t>
             </a:r>
-            <a:endParaRPr lang="en-US" sz="2400">
-              <a:cs typeface="Arial" panose="020B0604020202020204" pitchFamily="34" charset="0"/>
-            </a:endParaRPr>
           </a:p>
         </p:txBody>
       </p:sp>
@@ -10579,7 +10250,7 @@
           <p:nvPr/>
         </p:nvPicPr>
         <p:blipFill>
-          <a:blip r:embed="rId2"/>
+          <a:blip r:embed="rId3"/>
           <a:stretch>
             <a:fillRect/>
           </a:stretch>
@@ -10603,7 +10274,7 @@
           <p:nvPr/>
         </p:nvPicPr>
         <p:blipFill>
-          <a:blip r:embed="rId3"/>
+          <a:blip r:embed="rId4"/>
           <a:stretch>
             <a:fillRect/>
           </a:stretch>
@@ -10723,12 +10394,6 @@
               </a:rPr>
               <a:t>3.ĐỘ TIN CẬY VÀ CHÍNH XÁC. </a:t>
             </a:r>
-            <a:endParaRPr lang="en-US" sz="3200" b="1">
-              <a:solidFill>
-                <a:schemeClr val="bg1"/>
-              </a:solidFill>
-              <a:latin typeface="+mj-lt"/>
-            </a:endParaRPr>
           </a:p>
         </p:txBody>
       </p:sp>
@@ -10765,7 +10430,7 @@
           <p:nvPr/>
         </p:nvPicPr>
         <p:blipFill>
-          <a:blip r:embed="rId1"/>
+          <a:blip r:embed="rId2"/>
           <a:stretch>
             <a:fillRect/>
           </a:stretch>
@@ -10832,11 +10497,6 @@
               </a:rPr>
               <a:t>3</a:t>
             </a:r>
-            <a:endParaRPr lang="en-US">
-              <a:solidFill>
-                <a:srgbClr val="FF0000"/>
-              </a:solidFill>
-            </a:endParaRPr>
           </a:p>
         </p:txBody>
       </p:sp>
@@ -11019,13 +10679,6 @@
               </a:rPr>
               <a:t>?: </a:t>
             </a:r>
-            <a:endParaRPr lang="en-US" sz="2800" dirty="0">
-              <a:solidFill>
-                <a:srgbClr val="FF0000"/>
-              </a:solidFill>
-              <a:ea typeface="SF Pro Semibold" pitchFamily="2" charset="0"/>
-              <a:cs typeface="Arial" panose="020B0604020202020204" pitchFamily="34" charset="0"/>
-            </a:endParaRPr>
           </a:p>
           <a:p>
             <a:pPr marL="457200" indent="-457200">
@@ -11119,10 +10772,6 @@
               </a:rPr>
               <a:t>: </a:t>
             </a:r>
-            <a:endParaRPr lang="en-US" sz="2400" dirty="0">
-              <a:ea typeface="SF Pro Semibold" pitchFamily="2" charset="0"/>
-              <a:cs typeface="Arial" panose="020B0604020202020204" pitchFamily="34" charset="0"/>
-            </a:endParaRPr>
           </a:p>
           <a:p>
             <a:pPr marL="457200" indent="-457200">
@@ -11219,11 +10868,6 @@
               </a:rPr>
               <a:t>. </a:t>
             </a:r>
-            <a:endParaRPr lang="en-US" sz="2400" dirty="0">
-              <a:effectLst/>
-              <a:ea typeface="SF Pro Semibold" pitchFamily="2" charset="0"/>
-              <a:cs typeface="Arial" panose="020B0604020202020204" pitchFamily="34" charset="0"/>
-            </a:endParaRPr>
           </a:p>
           <a:p>
             <a:pPr marL="457200" indent="-457200">
@@ -11303,10 +10947,6 @@
               </a:rPr>
               <a:t>. </a:t>
             </a:r>
-            <a:endParaRPr lang="en-US" sz="2400" dirty="0">
-              <a:ea typeface="SF Pro Semibold" pitchFamily="2" charset="0"/>
-              <a:cs typeface="Arial" panose="020B0604020202020204" pitchFamily="34" charset="0"/>
-            </a:endParaRPr>
           </a:p>
           <a:p>
             <a:pPr marL="457200" indent="-457200">
@@ -11400,10 +11040,6 @@
               </a:rPr>
               <a:t>	</a:t>
             </a:r>
-            <a:endParaRPr lang="en-US" sz="2400" dirty="0">
-              <a:ea typeface="SF Pro Semibold" pitchFamily="2" charset="0"/>
-              <a:cs typeface="Arial" panose="020B0604020202020204" pitchFamily="34" charset="0"/>
-            </a:endParaRPr>
           </a:p>
           <a:p>
             <a:pPr>
@@ -11642,10 +11278,6 @@
               </a:rPr>
               <a:t> nay. </a:t>
             </a:r>
-            <a:endParaRPr lang="en-US" sz="2400" dirty="0">
-              <a:ea typeface="SF Pro Semibold" pitchFamily="2" charset="0"/>
-              <a:cs typeface="Arial" panose="020B0604020202020204" pitchFamily="34" charset="0"/>
-            </a:endParaRPr>
           </a:p>
         </p:txBody>
       </p:sp>
@@ -11754,12 +11386,6 @@
               </a:rPr>
               <a:t>4.HOẠT ĐỘNG </a:t>
             </a:r>
-            <a:endParaRPr lang="en-US" sz="3200" b="1">
-              <a:solidFill>
-                <a:schemeClr val="bg1"/>
-              </a:solidFill>
-              <a:latin typeface="+mj-lt"/>
-            </a:endParaRPr>
           </a:p>
         </p:txBody>
       </p:sp>
@@ -11796,7 +11422,7 @@
           <p:nvPr/>
         </p:nvPicPr>
         <p:blipFill>
-          <a:blip r:embed="rId1"/>
+          <a:blip r:embed="rId2"/>
           <a:stretch>
             <a:fillRect/>
           </a:stretch>
@@ -11863,11 +11489,6 @@
               </a:rPr>
               <a:t>6</a:t>
             </a:r>
-            <a:endParaRPr lang="en-US">
-              <a:solidFill>
-                <a:srgbClr val="FF0000"/>
-              </a:solidFill>
-            </a:endParaRPr>
           </a:p>
         </p:txBody>
       </p:sp>
@@ -11910,13 +11531,6 @@
               </a:rPr>
               <a:t>4.1.Truyền thống </a:t>
             </a:r>
-            <a:endParaRPr lang="en-US" sz="2800" dirty="0">
-              <a:solidFill>
-                <a:srgbClr val="FF0000"/>
-              </a:solidFill>
-              <a:ea typeface="SF Pro Semibold" pitchFamily="2" charset="0"/>
-              <a:cs typeface="Arial" panose="020B0604020202020204" pitchFamily="34" charset="0"/>
-            </a:endParaRPr>
           </a:p>
           <a:p>
             <a:pPr marL="457200" indent="-457200">
@@ -11933,10 +11547,6 @@
               </a:rPr>
               <a:t>Mỗi khuôn mặt đều có nhiều điểm mốc. Là phần lòi lõm tạo nên khuôn mặt.</a:t>
             </a:r>
-            <a:endParaRPr lang="en-US" sz="2400" dirty="0">
-              <a:ea typeface="SF Pro Semibold" pitchFamily="2" charset="0"/>
-              <a:cs typeface="Arial" panose="020B0604020202020204" pitchFamily="34" charset="0"/>
-            </a:endParaRPr>
           </a:p>
           <a:p>
             <a:pPr marL="457200" indent="-457200">
@@ -11953,10 +11563,6 @@
               </a:rPr>
               <a:t>Hệ thống nhận diện qua những điểm nút</a:t>
             </a:r>
-            <a:endParaRPr lang="en-US" sz="2400" dirty="0">
-              <a:ea typeface="SF Pro Semibold" pitchFamily="2" charset="0"/>
-              <a:cs typeface="Arial" panose="020B0604020202020204" pitchFamily="34" charset="0"/>
-            </a:endParaRPr>
           </a:p>
           <a:p>
             <a:pPr marL="457200" indent="-457200">
@@ -11973,10 +11579,6 @@
               </a:rPr>
               <a:t>Mỗi mặt người có khoảng 80 điểm nút</a:t>
             </a:r>
-            <a:endParaRPr lang="en-US" sz="2400" dirty="0">
-              <a:ea typeface="SF Pro Semibold" pitchFamily="2" charset="0"/>
-              <a:cs typeface="Arial" panose="020B0604020202020204" pitchFamily="34" charset="0"/>
-            </a:endParaRPr>
           </a:p>
           <a:p>
             <a:pPr marL="457200" indent="-457200">
@@ -12032,10 +11634,6 @@
               </a:rPr>
               <a:t>Độ sâu của hốc mắt</a:t>
             </a:r>
-            <a:endParaRPr lang="en-US" sz="2400" dirty="0">
-              <a:ea typeface="SF Pro Semibold" pitchFamily="2" charset="0"/>
-              <a:cs typeface="Arial" panose="020B0604020202020204" pitchFamily="34" charset="0"/>
-            </a:endParaRPr>
           </a:p>
         </p:txBody>
       </p:sp>
@@ -12144,12 +11742,6 @@
               </a:rPr>
               <a:t>4.HOẠT ĐỘNG </a:t>
             </a:r>
-            <a:endParaRPr lang="en-US" sz="3200" b="1">
-              <a:solidFill>
-                <a:schemeClr val="bg1"/>
-              </a:solidFill>
-              <a:latin typeface="+mj-lt"/>
-            </a:endParaRPr>
           </a:p>
         </p:txBody>
       </p:sp>
@@ -12186,7 +11778,7 @@
           <p:nvPr/>
         </p:nvPicPr>
         <p:blipFill>
-          <a:blip r:embed="rId1"/>
+          <a:blip r:embed="rId2"/>
           <a:stretch>
             <a:fillRect/>
           </a:stretch>
@@ -12253,11 +11845,6 @@
               </a:rPr>
               <a:t>7</a:t>
             </a:r>
-            <a:endParaRPr lang="en-US">
-              <a:solidFill>
-                <a:srgbClr val="FF0000"/>
-              </a:solidFill>
-            </a:endParaRPr>
           </a:p>
         </p:txBody>
       </p:sp>
@@ -12300,13 +11887,6 @@
               </a:rPr>
               <a:t>4.1.Truyền thống </a:t>
             </a:r>
-            <a:endParaRPr lang="en-US" sz="2800" dirty="0">
-              <a:solidFill>
-                <a:srgbClr val="FF0000"/>
-              </a:solidFill>
-              <a:ea typeface="SF Pro Semibold" pitchFamily="2" charset="0"/>
-              <a:cs typeface="Arial" panose="020B0604020202020204" pitchFamily="34" charset="0"/>
-            </a:endParaRPr>
           </a:p>
           <a:p>
             <a:pPr marL="0" indent="0">
@@ -12332,7 +11912,7 @@
           <p:nvPr/>
         </p:nvPicPr>
         <p:blipFill>
-          <a:blip r:embed="rId2"/>
+          <a:blip r:embed="rId3"/>
           <a:stretch>
             <a:fillRect/>
           </a:stretch>
@@ -12356,7 +11936,7 @@
           <p:nvPr/>
         </p:nvPicPr>
         <p:blipFill>
-          <a:blip r:embed="rId3"/>
+          <a:blip r:embed="rId4"/>
           <a:stretch>
             <a:fillRect/>
           </a:stretch>
@@ -12380,7 +11960,7 @@
           <p:nvPr/>
         </p:nvPicPr>
         <p:blipFill>
-          <a:blip r:embed="rId4"/>
+          <a:blip r:embed="rId5"/>
           <a:stretch>
             <a:fillRect/>
           </a:stretch>
@@ -12500,12 +12080,6 @@
               </a:rPr>
               <a:t>4.HOẠT ĐỘNG </a:t>
             </a:r>
-            <a:endParaRPr lang="en-US" sz="3200" b="1">
-              <a:solidFill>
-                <a:schemeClr val="bg1"/>
-              </a:solidFill>
-              <a:latin typeface="+mj-lt"/>
-            </a:endParaRPr>
           </a:p>
         </p:txBody>
       </p:sp>
@@ -12542,7 +12116,7 @@
           <p:nvPr/>
         </p:nvPicPr>
         <p:blipFill>
-          <a:blip r:embed="rId1"/>
+          <a:blip r:embed="rId2"/>
           <a:stretch>
             <a:fillRect/>
           </a:stretch>
@@ -12609,11 +12183,6 @@
               </a:rPr>
               <a:t>8</a:t>
             </a:r>
-            <a:endParaRPr lang="en-US">
-              <a:solidFill>
-                <a:srgbClr val="FF0000"/>
-              </a:solidFill>
-            </a:endParaRPr>
           </a:p>
         </p:txBody>
       </p:sp>
@@ -12656,13 +12225,6 @@
               </a:rPr>
               <a:t>4.2.Nâng cao dạng 3D</a:t>
             </a:r>
-            <a:endParaRPr lang="en-US" sz="2400" dirty="0">
-              <a:solidFill>
-                <a:srgbClr val="FF0000"/>
-              </a:solidFill>
-              <a:ea typeface="SF Pro Semibold" pitchFamily="2" charset="0"/>
-              <a:cs typeface="Arial" panose="020B0604020202020204" pitchFamily="34" charset="0"/>
-            </a:endParaRPr>
           </a:p>
           <a:p>
             <a:pPr marL="457200" indent="-457200">
@@ -12679,10 +12241,6 @@
               </a:rPr>
               <a:t> Kỹ thuật này sử dụng các cảm biến 3D để nắm bắt thông tin về hình dạng của khuôn mặt.</a:t>
             </a:r>
-            <a:endParaRPr lang="en-US" sz="2400" dirty="0">
-              <a:ea typeface="SF Pro Semibold" pitchFamily="2" charset="0"/>
-              <a:cs typeface="Arial" panose="020B0604020202020204" pitchFamily="34" charset="0"/>
-            </a:endParaRPr>
           </a:p>
           <a:p>
             <a:pPr marL="457200" indent="-457200">
@@ -12699,10 +12257,6 @@
               </a:rPr>
               <a:t>Thông tin này được sử dụng xác định một khuôn mặt như các đường viền của hốc mắt, mũi và cằm.</a:t>
             </a:r>
-            <a:endParaRPr lang="en-US" sz="2400" dirty="0">
-              <a:ea typeface="SF Pro Semibold" pitchFamily="2" charset="0"/>
-              <a:cs typeface="Arial" panose="020B0604020202020204" pitchFamily="34" charset="0"/>
-            </a:endParaRPr>
           </a:p>
           <a:p>
             <a:pPr marL="457200" indent="-457200">
@@ -12719,10 +12273,6 @@
               </a:rPr>
               <a:t>Nhận dạng khuôn mặt 3D là nó không bị ảnh hưởng bởi những thay đổi trong ánh sáng.</a:t>
             </a:r>
-            <a:endParaRPr lang="en-US" sz="2400" dirty="0">
-              <a:ea typeface="SF Pro Semibold" pitchFamily="2" charset="0"/>
-              <a:cs typeface="Arial" panose="020B0604020202020204" pitchFamily="34" charset="0"/>
-            </a:endParaRPr>
           </a:p>
           <a:p>
             <a:pPr marL="457200" indent="-457200">
@@ -12844,12 +12394,6 @@
               </a:rPr>
               <a:t>4.HOẠT ĐỘNG </a:t>
             </a:r>
-            <a:endParaRPr lang="en-US" sz="3200" b="1">
-              <a:solidFill>
-                <a:schemeClr val="bg1"/>
-              </a:solidFill>
-              <a:latin typeface="+mj-lt"/>
-            </a:endParaRPr>
           </a:p>
         </p:txBody>
       </p:sp>
@@ -12886,7 +12430,7 @@
           <p:nvPr/>
         </p:nvPicPr>
         <p:blipFill>
-          <a:blip r:embed="rId1"/>
+          <a:blip r:embed="rId2"/>
           <a:stretch>
             <a:fillRect/>
           </a:stretch>
@@ -12953,11 +12497,6 @@
               </a:rPr>
               <a:t>9</a:t>
             </a:r>
-            <a:endParaRPr lang="en-US">
-              <a:solidFill>
-                <a:srgbClr val="FF0000"/>
-              </a:solidFill>
-            </a:endParaRPr>
           </a:p>
         </p:txBody>
       </p:sp>
@@ -13000,13 +12539,6 @@
               </a:rPr>
               <a:t>4.2.Nâng cao dạng 3D</a:t>
             </a:r>
-            <a:endParaRPr lang="en-US" sz="2400" dirty="0">
-              <a:solidFill>
-                <a:srgbClr val="FF0000"/>
-              </a:solidFill>
-              <a:ea typeface="SF Pro Semibold" pitchFamily="2" charset="0"/>
-              <a:cs typeface="Arial" panose="020B0604020202020204" pitchFamily="34" charset="0"/>
-            </a:endParaRPr>
           </a:p>
           <a:p>
             <a:pPr marL="0" indent="0">
@@ -13045,7 +12577,7 @@
           <p:nvPr/>
         </p:nvPicPr>
         <p:blipFill>
-          <a:blip r:embed="rId2"/>
+          <a:blip r:embed="rId3"/>
           <a:stretch>
             <a:fillRect/>
           </a:stretch>
@@ -13069,7 +12601,7 @@
           <p:nvPr/>
         </p:nvPicPr>
         <p:blipFill>
-          <a:blip r:embed="rId3"/>
+          <a:blip r:embed="rId4"/>
           <a:stretch>
             <a:fillRect/>
           </a:stretch>
@@ -13315,6 +12847,7 @@
       </a:bgFillStyleLst>
     </a:fmtScheme>
   </a:themeElements>
+  <a:objectDefaults/>
   <a:extraClrSchemeLst>
     <a:extraClrScheme>
       <a:clrScheme name="cdb2004158l 1">

</xml_diff>

<commit_message>
sửa lại cái tiêu đề phần 1 của ông Văn
</commit_message>
<xml_diff>
--- a/BÀI THUYẾT TRÌNH MẪU.pptx
+++ b/BÀI THUYẾT TRÌNH MẪU.pptx
@@ -5,23 +5,23 @@
     <p:sldMasterId id="2147483648" r:id="rId1"/>
   </p:sldMasterIdLst>
   <p:sldIdLst>
-    <p:sldId id="256" r:id="rId3"/>
-    <p:sldId id="257" r:id="rId4"/>
-    <p:sldId id="261" r:id="rId5"/>
-    <p:sldId id="271" r:id="rId6"/>
-    <p:sldId id="281" r:id="rId7"/>
-    <p:sldId id="286" r:id="rId8"/>
-    <p:sldId id="282" r:id="rId9"/>
-    <p:sldId id="285" r:id="rId10"/>
-    <p:sldId id="283" r:id="rId11"/>
-    <p:sldId id="263" r:id="rId12"/>
-    <p:sldId id="259" r:id="rId13"/>
-    <p:sldId id="258" r:id="rId14"/>
-    <p:sldId id="264" r:id="rId15"/>
-    <p:sldId id="260" r:id="rId16"/>
-    <p:sldId id="265" r:id="rId17"/>
-    <p:sldId id="266" r:id="rId18"/>
-    <p:sldId id="262" r:id="rId19"/>
+    <p:sldId id="256" r:id="rId2"/>
+    <p:sldId id="257" r:id="rId3"/>
+    <p:sldId id="261" r:id="rId4"/>
+    <p:sldId id="271" r:id="rId5"/>
+    <p:sldId id="281" r:id="rId6"/>
+    <p:sldId id="286" r:id="rId7"/>
+    <p:sldId id="282" r:id="rId8"/>
+    <p:sldId id="285" r:id="rId9"/>
+    <p:sldId id="283" r:id="rId10"/>
+    <p:sldId id="263" r:id="rId11"/>
+    <p:sldId id="259" r:id="rId12"/>
+    <p:sldId id="258" r:id="rId13"/>
+    <p:sldId id="264" r:id="rId14"/>
+    <p:sldId id="260" r:id="rId15"/>
+    <p:sldId id="265" r:id="rId16"/>
+    <p:sldId id="266" r:id="rId17"/>
+    <p:sldId id="262" r:id="rId18"/>
   </p:sldIdLst>
   <p:sldSz cx="9144000" cy="6858000" type="screen4x3"/>
   <p:notesSz cx="6858000" cy="9144000"/>
@@ -150,11 +150,16 @@
       </a:defRPr>
     </a:lvl9pPr>
   </p:defaultTextStyle>
+  <p:extLst>
+    <p:ext uri="{EFAFB233-063F-42B5-8137-9DF3F51BA10A}">
+      <p15:sldGuideLst xmlns:p15="http://schemas.microsoft.com/office/powerpoint/2012/main"/>
+    </p:ext>
+  </p:extLst>
 </p:presentation>
 </file>
 
 <file path=ppt/slideLayouts/slideLayout1.xml><?xml version="1.0" encoding="utf-8"?>
-<p:sldLayout xmlns:a="http://schemas.openxmlformats.org/drawingml/2006/main" xmlns:r="http://schemas.openxmlformats.org/officeDocument/2006/relationships" xmlns:p="http://schemas.openxmlformats.org/presentationml/2006/main" type="title" preserve="1" showMasterSp="0">
+<p:sldLayout xmlns:a="http://schemas.openxmlformats.org/drawingml/2006/main" xmlns:r="http://schemas.openxmlformats.org/officeDocument/2006/relationships" xmlns:p="http://schemas.openxmlformats.org/presentationml/2006/main" showMasterSp="0" type="title" preserve="1">
   <p:cSld name="Title Slide">
     <p:spTree>
       <p:nvGrpSpPr>
@@ -592,6 +597,7 @@
                   <a:schemeClr val="bg1"/>
                 </a:solidFill>
               </a:rPr>
+              <a:t>‹#›</a:t>
             </a:fld>
             <a:endParaRPr lang="en-US" altLang="en-US" sz="1200">
               <a:solidFill>
@@ -648,7 +654,6 @@
               <a:rPr lang="en-US"/>
               <a:t>Click to edit Master title style</a:t>
             </a:r>
-            <a:endParaRPr lang="en-US"/>
           </a:p>
         </p:txBody>
       </p:sp>
@@ -672,7 +677,6 @@
               <a:rPr lang="en-US"/>
               <a:t>Click to edit Master text styles</a:t>
             </a:r>
-            <a:endParaRPr lang="en-US"/>
           </a:p>
           <a:p>
             <a:pPr lvl="1"/>
@@ -680,7 +684,6 @@
               <a:rPr lang="en-US"/>
               <a:t>Second level</a:t>
             </a:r>
-            <a:endParaRPr lang="en-US"/>
           </a:p>
           <a:p>
             <a:pPr lvl="2"/>
@@ -688,7 +691,6 @@
               <a:rPr lang="en-US"/>
               <a:t>Third level</a:t>
             </a:r>
-            <a:endParaRPr lang="en-US"/>
           </a:p>
           <a:p>
             <a:pPr lvl="3"/>
@@ -696,7 +698,6 @@
               <a:rPr lang="en-US"/>
               <a:t>Fourth level</a:t>
             </a:r>
-            <a:endParaRPr lang="en-US"/>
           </a:p>
           <a:p>
             <a:pPr lvl="4"/>
@@ -704,7 +705,6 @@
               <a:rPr lang="en-US"/>
               <a:t>Fifth level</a:t>
             </a:r>
-            <a:endParaRPr lang="en-US"/>
           </a:p>
         </p:txBody>
       </p:sp>
@@ -729,6 +729,7 @@
           <a:p>
             <a:fld id="{6BDEAFE6-325E-AA48-AC90-E1B1FC9AAA75}" type="datetimeFigureOut">
               <a:rPr lang="en-US"/>
+              <a:t>10/22/23</a:t>
             </a:fld>
             <a:endParaRPr lang="en-US"/>
           </a:p>
@@ -778,6 +779,7 @@
           <a:p>
             <a:fld id="{C9142EC5-85AF-4745-AACF-2F37CD50FCA3}" type="slidenum">
               <a:rPr/>
+              <a:t>‹#›</a:t>
             </a:fld>
             <a:endParaRPr lang="en-US"/>
           </a:p>
@@ -835,7 +837,6 @@
               <a:rPr lang="en-US"/>
               <a:t>Click to edit Master title style</a:t>
             </a:r>
-            <a:endParaRPr lang="en-US"/>
           </a:p>
         </p:txBody>
       </p:sp>
@@ -864,7 +865,6 @@
               <a:rPr lang="en-US"/>
               <a:t>Click to edit Master text styles</a:t>
             </a:r>
-            <a:endParaRPr lang="en-US"/>
           </a:p>
           <a:p>
             <a:pPr lvl="1"/>
@@ -872,7 +872,6 @@
               <a:rPr lang="en-US"/>
               <a:t>Second level</a:t>
             </a:r>
-            <a:endParaRPr lang="en-US"/>
           </a:p>
           <a:p>
             <a:pPr lvl="2"/>
@@ -880,7 +879,6 @@
               <a:rPr lang="en-US"/>
               <a:t>Third level</a:t>
             </a:r>
-            <a:endParaRPr lang="en-US"/>
           </a:p>
           <a:p>
             <a:pPr lvl="3"/>
@@ -888,7 +886,6 @@
               <a:rPr lang="en-US"/>
               <a:t>Fourth level</a:t>
             </a:r>
-            <a:endParaRPr lang="en-US"/>
           </a:p>
           <a:p>
             <a:pPr lvl="4"/>
@@ -896,7 +893,6 @@
               <a:rPr lang="en-US"/>
               <a:t>Fifth level</a:t>
             </a:r>
-            <a:endParaRPr lang="en-US"/>
           </a:p>
         </p:txBody>
       </p:sp>
@@ -921,6 +917,7 @@
           <a:p>
             <a:fld id="{6BDEAFE6-325E-AA48-AC90-E1B1FC9AAA75}" type="datetimeFigureOut">
               <a:rPr lang="en-US"/>
+              <a:t>10/22/23</a:t>
             </a:fld>
             <a:endParaRPr lang="en-US"/>
           </a:p>
@@ -970,6 +967,7 @@
           <a:p>
             <a:fld id="{C9142EC5-85AF-4745-AACF-2F37CD50FCA3}" type="slidenum">
               <a:rPr/>
+              <a:t>‹#›</a:t>
             </a:fld>
             <a:endParaRPr lang="en-US"/>
           </a:p>
@@ -1102,6 +1100,7 @@
           <a:p>
             <a:fld id="{6BDEAFE6-325E-AA48-AC90-E1B1FC9AAA75}" type="datetimeFigureOut">
               <a:rPr lang="en-US"/>
+              <a:t>10/22/23</a:t>
             </a:fld>
             <a:endParaRPr lang="en-US"/>
           </a:p>
@@ -1151,6 +1150,7 @@
           <a:p>
             <a:fld id="{C9142EC5-85AF-4745-AACF-2F37CD50FCA3}" type="slidenum">
               <a:rPr/>
+              <a:t>‹#›</a:t>
             </a:fld>
             <a:endParaRPr lang="en-US"/>
           </a:p>
@@ -1203,7 +1203,6 @@
               <a:rPr lang="en-US"/>
               <a:t>Click to edit Master title style</a:t>
             </a:r>
-            <a:endParaRPr lang="en-US"/>
           </a:p>
         </p:txBody>
       </p:sp>
@@ -1227,7 +1226,6 @@
               <a:rPr lang="en-US" dirty="0"/>
               <a:t>Click to edit Master text styles</a:t>
             </a:r>
-            <a:endParaRPr lang="en-US" dirty="0"/>
           </a:p>
           <a:p>
             <a:pPr lvl="1"/>
@@ -1235,7 +1233,6 @@
               <a:rPr lang="en-US" dirty="0"/>
               <a:t>Second level</a:t>
             </a:r>
-            <a:endParaRPr lang="en-US" dirty="0"/>
           </a:p>
           <a:p>
             <a:pPr lvl="2"/>
@@ -1243,7 +1240,6 @@
               <a:rPr lang="en-US" dirty="0"/>
               <a:t>Third level</a:t>
             </a:r>
-            <a:endParaRPr lang="en-US" dirty="0"/>
           </a:p>
           <a:p>
             <a:pPr lvl="3"/>
@@ -1251,7 +1247,6 @@
               <a:rPr lang="en-US" dirty="0"/>
               <a:t>Fourth level</a:t>
             </a:r>
-            <a:endParaRPr lang="en-US" dirty="0"/>
           </a:p>
           <a:p>
             <a:pPr lvl="4"/>
@@ -1259,7 +1254,6 @@
               <a:rPr lang="en-US" dirty="0"/>
               <a:t>Fifth level</a:t>
             </a:r>
-            <a:endParaRPr lang="en-US" dirty="0"/>
           </a:p>
         </p:txBody>
       </p:sp>
@@ -1284,6 +1278,7 @@
           <a:p>
             <a:fld id="{6BDEAFE6-325E-AA48-AC90-E1B1FC9AAA75}" type="datetimeFigureOut">
               <a:rPr lang="en-US"/>
+              <a:t>10/22/23</a:t>
             </a:fld>
             <a:endParaRPr lang="en-US"/>
           </a:p>
@@ -1333,6 +1328,7 @@
           <a:p>
             <a:fld id="{C9142EC5-85AF-4745-AACF-2F37CD50FCA3}" type="slidenum">
               <a:rPr/>
+              <a:t>‹#›</a:t>
             </a:fld>
             <a:endParaRPr lang="en-US"/>
           </a:p>
@@ -1394,7 +1390,6 @@
               <a:rPr lang="en-US"/>
               <a:t>Click to edit Master title style</a:t>
             </a:r>
-            <a:endParaRPr lang="en-US"/>
           </a:p>
         </p:txBody>
       </p:sp>
@@ -1460,7 +1455,6 @@
               <a:rPr lang="en-US"/>
               <a:t>Click to edit Master text styles</a:t>
             </a:r>
-            <a:endParaRPr lang="en-US"/>
           </a:p>
         </p:txBody>
       </p:sp>
@@ -1485,6 +1479,7 @@
           <a:p>
             <a:fld id="{6BDEAFE6-325E-AA48-AC90-E1B1FC9AAA75}" type="datetimeFigureOut">
               <a:rPr lang="en-US"/>
+              <a:t>10/22/23</a:t>
             </a:fld>
             <a:endParaRPr lang="en-US"/>
           </a:p>
@@ -1534,6 +1529,7 @@
           <a:p>
             <a:fld id="{C9142EC5-85AF-4745-AACF-2F37CD50FCA3}" type="slidenum">
               <a:rPr/>
+              <a:t>‹#›</a:t>
             </a:fld>
             <a:endParaRPr lang="en-US"/>
           </a:p>
@@ -1586,7 +1582,6 @@
               <a:rPr lang="en-US"/>
               <a:t>Click to edit Master title style</a:t>
             </a:r>
-            <a:endParaRPr lang="en-US"/>
           </a:p>
         </p:txBody>
       </p:sp>
@@ -1643,7 +1638,6 @@
               <a:rPr lang="en-US"/>
               <a:t>Click to edit Master text styles</a:t>
             </a:r>
-            <a:endParaRPr lang="en-US"/>
           </a:p>
           <a:p>
             <a:pPr lvl="1"/>
@@ -1651,7 +1645,6 @@
               <a:rPr lang="en-US"/>
               <a:t>Second level</a:t>
             </a:r>
-            <a:endParaRPr lang="en-US"/>
           </a:p>
           <a:p>
             <a:pPr lvl="2"/>
@@ -1659,7 +1652,6 @@
               <a:rPr lang="en-US"/>
               <a:t>Third level</a:t>
             </a:r>
-            <a:endParaRPr lang="en-US"/>
           </a:p>
           <a:p>
             <a:pPr lvl="3"/>
@@ -1667,7 +1659,6 @@
               <a:rPr lang="en-US"/>
               <a:t>Fourth level</a:t>
             </a:r>
-            <a:endParaRPr lang="en-US"/>
           </a:p>
           <a:p>
             <a:pPr lvl="4"/>
@@ -1675,7 +1666,6 @@
               <a:rPr lang="en-US"/>
               <a:t>Fifth level</a:t>
             </a:r>
-            <a:endParaRPr lang="en-US"/>
           </a:p>
         </p:txBody>
       </p:sp>
@@ -1732,7 +1722,6 @@
               <a:rPr lang="en-US"/>
               <a:t>Click to edit Master text styles</a:t>
             </a:r>
-            <a:endParaRPr lang="en-US"/>
           </a:p>
           <a:p>
             <a:pPr lvl="1"/>
@@ -1740,7 +1729,6 @@
               <a:rPr lang="en-US"/>
               <a:t>Second level</a:t>
             </a:r>
-            <a:endParaRPr lang="en-US"/>
           </a:p>
           <a:p>
             <a:pPr lvl="2"/>
@@ -1748,7 +1736,6 @@
               <a:rPr lang="en-US"/>
               <a:t>Third level</a:t>
             </a:r>
-            <a:endParaRPr lang="en-US"/>
           </a:p>
           <a:p>
             <a:pPr lvl="3"/>
@@ -1756,7 +1743,6 @@
               <a:rPr lang="en-US"/>
               <a:t>Fourth level</a:t>
             </a:r>
-            <a:endParaRPr lang="en-US"/>
           </a:p>
           <a:p>
             <a:pPr lvl="4"/>
@@ -1764,7 +1750,6 @@
               <a:rPr lang="en-US"/>
               <a:t>Fifth level</a:t>
             </a:r>
-            <a:endParaRPr lang="en-US"/>
           </a:p>
         </p:txBody>
       </p:sp>
@@ -1789,6 +1774,7 @@
           <a:p>
             <a:fld id="{6BDEAFE6-325E-AA48-AC90-E1B1FC9AAA75}" type="datetimeFigureOut">
               <a:rPr lang="en-US"/>
+              <a:t>10/22/23</a:t>
             </a:fld>
             <a:endParaRPr lang="en-US"/>
           </a:p>
@@ -1838,6 +1824,7 @@
           <a:p>
             <a:fld id="{C9142EC5-85AF-4745-AACF-2F37CD50FCA3}" type="slidenum">
               <a:rPr/>
+              <a:t>‹#›</a:t>
             </a:fld>
             <a:endParaRPr lang="en-US"/>
           </a:p>
@@ -1899,7 +1886,6 @@
               <a:rPr lang="en-US"/>
               <a:t>Click to edit Master title style</a:t>
             </a:r>
-            <a:endParaRPr lang="en-US"/>
           </a:p>
         </p:txBody>
       </p:sp>
@@ -1965,7 +1951,6 @@
               <a:rPr lang="en-US"/>
               <a:t>Click to edit Master text styles</a:t>
             </a:r>
-            <a:endParaRPr lang="en-US"/>
           </a:p>
         </p:txBody>
       </p:sp>
@@ -2022,7 +2007,6 @@
               <a:rPr lang="en-US"/>
               <a:t>Click to edit Master text styles</a:t>
             </a:r>
-            <a:endParaRPr lang="en-US"/>
           </a:p>
           <a:p>
             <a:pPr lvl="1"/>
@@ -2030,7 +2014,6 @@
               <a:rPr lang="en-US"/>
               <a:t>Second level</a:t>
             </a:r>
-            <a:endParaRPr lang="en-US"/>
           </a:p>
           <a:p>
             <a:pPr lvl="2"/>
@@ -2038,7 +2021,6 @@
               <a:rPr lang="en-US"/>
               <a:t>Third level</a:t>
             </a:r>
-            <a:endParaRPr lang="en-US"/>
           </a:p>
           <a:p>
             <a:pPr lvl="3"/>
@@ -2046,7 +2028,6 @@
               <a:rPr lang="en-US"/>
               <a:t>Fourth level</a:t>
             </a:r>
-            <a:endParaRPr lang="en-US"/>
           </a:p>
           <a:p>
             <a:pPr lvl="4"/>
@@ -2054,7 +2035,6 @@
               <a:rPr lang="en-US"/>
               <a:t>Fifth level</a:t>
             </a:r>
-            <a:endParaRPr lang="en-US"/>
           </a:p>
         </p:txBody>
       </p:sp>
@@ -2120,7 +2100,6 @@
               <a:rPr lang="en-US"/>
               <a:t>Click to edit Master text styles</a:t>
             </a:r>
-            <a:endParaRPr lang="en-US"/>
           </a:p>
         </p:txBody>
       </p:sp>
@@ -2177,7 +2156,6 @@
               <a:rPr lang="en-US"/>
               <a:t>Click to edit Master text styles</a:t>
             </a:r>
-            <a:endParaRPr lang="en-US"/>
           </a:p>
           <a:p>
             <a:pPr lvl="1"/>
@@ -2185,7 +2163,6 @@
               <a:rPr lang="en-US"/>
               <a:t>Second level</a:t>
             </a:r>
-            <a:endParaRPr lang="en-US"/>
           </a:p>
           <a:p>
             <a:pPr lvl="2"/>
@@ -2193,7 +2170,6 @@
               <a:rPr lang="en-US"/>
               <a:t>Third level</a:t>
             </a:r>
-            <a:endParaRPr lang="en-US"/>
           </a:p>
           <a:p>
             <a:pPr lvl="3"/>
@@ -2201,7 +2177,6 @@
               <a:rPr lang="en-US"/>
               <a:t>Fourth level</a:t>
             </a:r>
-            <a:endParaRPr lang="en-US"/>
           </a:p>
           <a:p>
             <a:pPr lvl="4"/>
@@ -2209,7 +2184,6 @@
               <a:rPr lang="en-US"/>
               <a:t>Fifth level</a:t>
             </a:r>
-            <a:endParaRPr lang="en-US"/>
           </a:p>
         </p:txBody>
       </p:sp>
@@ -2234,6 +2208,7 @@
           <a:p>
             <a:fld id="{6BDEAFE6-325E-AA48-AC90-E1B1FC9AAA75}" type="datetimeFigureOut">
               <a:rPr lang="en-US"/>
+              <a:t>10/22/23</a:t>
             </a:fld>
             <a:endParaRPr lang="en-US"/>
           </a:p>
@@ -2283,6 +2258,7 @@
           <a:p>
             <a:fld id="{C9142EC5-85AF-4745-AACF-2F37CD50FCA3}" type="slidenum">
               <a:rPr/>
+              <a:t>‹#›</a:t>
             </a:fld>
             <a:endParaRPr lang="en-US"/>
           </a:p>
@@ -2335,7 +2311,6 @@
               <a:rPr lang="en-US"/>
               <a:t>Click to edit Master title style</a:t>
             </a:r>
-            <a:endParaRPr lang="en-US"/>
           </a:p>
         </p:txBody>
       </p:sp>
@@ -2360,6 +2335,7 @@
           <a:p>
             <a:fld id="{6BDEAFE6-325E-AA48-AC90-E1B1FC9AAA75}" type="datetimeFigureOut">
               <a:rPr lang="en-US"/>
+              <a:t>10/22/23</a:t>
             </a:fld>
             <a:endParaRPr lang="en-US"/>
           </a:p>
@@ -2409,6 +2385,7 @@
           <a:p>
             <a:fld id="{C9142EC5-85AF-4745-AACF-2F37CD50FCA3}" type="slidenum">
               <a:rPr/>
+              <a:t>‹#›</a:t>
             </a:fld>
             <a:endParaRPr lang="en-US"/>
           </a:p>
@@ -2463,6 +2440,7 @@
           <a:p>
             <a:fld id="{6BDEAFE6-325E-AA48-AC90-E1B1FC9AAA75}" type="datetimeFigureOut">
               <a:rPr lang="en-US"/>
+              <a:t>10/22/23</a:t>
             </a:fld>
             <a:endParaRPr lang="en-US"/>
           </a:p>
@@ -2512,6 +2490,7 @@
           <a:p>
             <a:fld id="{C9142EC5-85AF-4745-AACF-2F37CD50FCA3}" type="slidenum">
               <a:rPr/>
+              <a:t>‹#›</a:t>
             </a:fld>
             <a:endParaRPr lang="en-US"/>
           </a:p>
@@ -2573,7 +2552,6 @@
               <a:rPr lang="en-US"/>
               <a:t>Click to edit Master title style</a:t>
             </a:r>
-            <a:endParaRPr lang="en-US"/>
           </a:p>
         </p:txBody>
       </p:sp>
@@ -2630,7 +2608,6 @@
               <a:rPr lang="en-US"/>
               <a:t>Click to edit Master text styles</a:t>
             </a:r>
-            <a:endParaRPr lang="en-US"/>
           </a:p>
           <a:p>
             <a:pPr lvl="1"/>
@@ -2638,7 +2615,6 @@
               <a:rPr lang="en-US"/>
               <a:t>Second level</a:t>
             </a:r>
-            <a:endParaRPr lang="en-US"/>
           </a:p>
           <a:p>
             <a:pPr lvl="2"/>
@@ -2646,7 +2622,6 @@
               <a:rPr lang="en-US"/>
               <a:t>Third level</a:t>
             </a:r>
-            <a:endParaRPr lang="en-US"/>
           </a:p>
           <a:p>
             <a:pPr lvl="3"/>
@@ -2654,7 +2629,6 @@
               <a:rPr lang="en-US"/>
               <a:t>Fourth level</a:t>
             </a:r>
-            <a:endParaRPr lang="en-US"/>
           </a:p>
           <a:p>
             <a:pPr lvl="4"/>
@@ -2662,7 +2636,6 @@
               <a:rPr lang="en-US"/>
               <a:t>Fifth level</a:t>
             </a:r>
-            <a:endParaRPr lang="en-US"/>
           </a:p>
         </p:txBody>
       </p:sp>
@@ -2728,7 +2701,6 @@
               <a:rPr lang="en-US"/>
               <a:t>Click to edit Master text styles</a:t>
             </a:r>
-            <a:endParaRPr lang="en-US"/>
           </a:p>
         </p:txBody>
       </p:sp>
@@ -2753,6 +2725,7 @@
           <a:p>
             <a:fld id="{6BDEAFE6-325E-AA48-AC90-E1B1FC9AAA75}" type="datetimeFigureOut">
               <a:rPr lang="en-US"/>
+              <a:t>10/22/23</a:t>
             </a:fld>
             <a:endParaRPr lang="en-US"/>
           </a:p>
@@ -2802,6 +2775,7 @@
           <a:p>
             <a:fld id="{C9142EC5-85AF-4745-AACF-2F37CD50FCA3}" type="slidenum">
               <a:rPr/>
+              <a:t>‹#›</a:t>
             </a:fld>
             <a:endParaRPr lang="en-US"/>
           </a:p>
@@ -2863,7 +2837,6 @@
               <a:rPr lang="en-US"/>
               <a:t>Click to edit Master title style</a:t>
             </a:r>
-            <a:endParaRPr lang="en-US"/>
           </a:p>
         </p:txBody>
       </p:sp>
@@ -2929,7 +2902,6 @@
               <a:rPr lang="en-US" noProof="0"/>
               <a:t>Click icon to add picture</a:t>
             </a:r>
-            <a:endParaRPr lang="en-US" noProof="0"/>
           </a:p>
         </p:txBody>
       </p:sp>
@@ -2995,7 +2967,6 @@
               <a:rPr lang="en-US"/>
               <a:t>Click to edit Master text styles</a:t>
             </a:r>
-            <a:endParaRPr lang="en-US"/>
           </a:p>
         </p:txBody>
       </p:sp>
@@ -3020,6 +2991,7 @@
           <a:p>
             <a:fld id="{6BDEAFE6-325E-AA48-AC90-E1B1FC9AAA75}" type="datetimeFigureOut">
               <a:rPr lang="en-US"/>
+              <a:t>10/22/23</a:t>
             </a:fld>
             <a:endParaRPr lang="en-US"/>
           </a:p>
@@ -3069,6 +3041,7 @@
           <a:p>
             <a:fld id="{C9142EC5-85AF-4745-AACF-2F37CD50FCA3}" type="slidenum">
               <a:rPr/>
+              <a:t>‹#›</a:t>
             </a:fld>
             <a:endParaRPr lang="en-US"/>
           </a:p>
@@ -3127,7 +3100,7 @@
             <a:avLst/>
           </a:prstGeom>
           <a:blipFill dpi="0" rotWithShape="0">
-            <a:blip r:embed="rId13"/>
+            <a:blip r:embed="rId14"/>
             <a:srcRect/>
             <a:tile tx="0" ty="0" sx="100000" sy="100000" flip="none" algn="tl"/>
           </a:blipFill>
@@ -3585,7 +3558,6 @@
               <a:rPr lang="en-US" altLang="en-US"/>
               <a:t>Click to edit Master text styles</a:t>
             </a:r>
-            <a:endParaRPr lang="en-US" altLang="en-US"/>
           </a:p>
           <a:p>
             <a:pPr lvl="1"/>
@@ -3593,7 +3565,6 @@
               <a:rPr lang="en-US" altLang="en-US"/>
               <a:t>Second level</a:t>
             </a:r>
-            <a:endParaRPr lang="en-US" altLang="en-US"/>
           </a:p>
           <a:p>
             <a:pPr lvl="2"/>
@@ -3601,7 +3572,6 @@
               <a:rPr lang="en-US" altLang="en-US"/>
               <a:t>Third level</a:t>
             </a:r>
-            <a:endParaRPr lang="en-US" altLang="en-US"/>
           </a:p>
           <a:p>
             <a:pPr lvl="3"/>
@@ -3609,7 +3579,6 @@
               <a:rPr lang="en-US" altLang="en-US"/>
               <a:t>Fourth level</a:t>
             </a:r>
-            <a:endParaRPr lang="en-US" altLang="en-US"/>
           </a:p>
           <a:p>
             <a:pPr lvl="4"/>
@@ -3617,7 +3586,6 @@
               <a:rPr lang="en-US" altLang="en-US"/>
               <a:t>Fifth level</a:t>
             </a:r>
-            <a:endParaRPr lang="en-US" altLang="en-US"/>
           </a:p>
         </p:txBody>
       </p:sp>
@@ -3658,6 +3626,7 @@
           <a:p>
             <a:fld id="{6BDEAFE6-325E-AA48-AC90-E1B1FC9AAA75}" type="datetimeFigureOut">
               <a:rPr lang="en-US"/>
+              <a:t>10/22/23</a:t>
             </a:fld>
             <a:endParaRPr lang="en-US"/>
           </a:p>
@@ -3737,6 +3706,7 @@
           <a:p>
             <a:fld id="{C9142EC5-85AF-4745-AACF-2F37CD50FCA3}" type="slidenum">
               <a:rPr/>
+              <a:t>‹#›</a:t>
             </a:fld>
             <a:endParaRPr lang="en-US"/>
           </a:p>
@@ -3793,7 +3763,6 @@
               <a:rPr lang="en-US" altLang="en-US"/>
               <a:t>Click to edit Master title style</a:t>
             </a:r>
-            <a:endParaRPr lang="en-US" altLang="en-US"/>
           </a:p>
         </p:txBody>
       </p:sp>
@@ -3931,6 +3900,7 @@
                   <a:schemeClr val="bg1"/>
                 </a:solidFill>
               </a:rPr>
+              <a:t>‹#›</a:t>
             </a:fld>
             <a:endParaRPr lang="en-US" altLang="en-US" sz="1200">
               <a:solidFill>
@@ -4085,6 +4055,7 @@
                   <a:srgbClr val="C00000"/>
                 </a:solidFill>
               </a:rPr>
+              <a:t>‹#›</a:t>
             </a:fld>
             <a:endParaRPr lang="en-US" altLang="en-US" sz="1350" b="1">
               <a:solidFill>
@@ -4566,7 +4537,7 @@
           <p:nvPr/>
         </p:nvPicPr>
         <p:blipFill>
-          <a:blip r:embed="rId1"/>
+          <a:blip r:embed="rId2"/>
           <a:stretch>
             <a:fillRect/>
           </a:stretch>
@@ -4723,11 +4694,11 @@
           <p:nvPr/>
         </p:nvPicPr>
         <p:blipFill>
-          <a:blip r:embed="rId2">
+          <a:blip r:embed="rId3">
             <a:extLst>
               <a:ext uri="{BEBA8EAE-BF5A-486C-A8C5-ECC9F3942E4B}">
                 <a14:imgProps xmlns:a14="http://schemas.microsoft.com/office/drawing/2010/main">
-                  <a14:imgLayer r:embed="rId3">
+                  <a14:imgLayer r:embed="rId4">
                     <a14:imgEffect>
                       <a14:artisticBlur/>
                     </a14:imgEffect>
@@ -4835,16 +4806,6 @@
               </a:rPr>
               <a:t>HỆ THỐNG NHẬN DIỆN KHUÔN MẶT</a:t>
             </a:r>
-            <a:endParaRPr lang="en-US" sz="5400">
-              <a:ln w="0"/>
-              <a:effectLst>
-                <a:outerShdw blurRad="38100" dist="19050" dir="2700000" algn="tl" rotWithShape="0">
-                  <a:schemeClr val="dk1">
-                    <a:alpha val="40000"/>
-                  </a:schemeClr>
-                </a:outerShdw>
-              </a:effectLst>
-            </a:endParaRPr>
           </a:p>
         </p:txBody>
       </p:sp>
@@ -4855,7 +4816,7 @@
           <p:nvPr/>
         </p:nvPicPr>
         <p:blipFill>
-          <a:blip r:embed="rId1"/>
+          <a:blip r:embed="rId2"/>
           <a:stretch>
             <a:fillRect/>
           </a:stretch>
@@ -4948,11 +4909,6 @@
               </a:rPr>
               <a:t>NHÓM 7</a:t>
             </a:r>
-            <a:endParaRPr lang="en-US" sz="3200">
-              <a:solidFill>
-                <a:srgbClr val="FF0000"/>
-              </a:solidFill>
-            </a:endParaRPr>
           </a:p>
         </p:txBody>
       </p:sp>
@@ -5010,11 +4966,6 @@
               </a:rPr>
               <a:t>1</a:t>
             </a:r>
-            <a:endParaRPr lang="en-US">
-              <a:solidFill>
-                <a:srgbClr val="FF0000"/>
-              </a:solidFill>
-            </a:endParaRPr>
           </a:p>
         </p:txBody>
       </p:sp>
@@ -5101,7 +5052,7 @@
           <p:nvPr/>
         </p:nvPicPr>
         <p:blipFill>
-          <a:blip r:embed="rId1"/>
+          <a:blip r:embed="rId2"/>
           <a:stretch>
             <a:fillRect/>
           </a:stretch>
@@ -5149,12 +5100,6 @@
               </a:rPr>
               <a:t>3.ĐỘ TIN CẬY VÀ CHÍNH XÁC. </a:t>
             </a:r>
-            <a:endParaRPr lang="en-US" sz="3200" b="1">
-              <a:solidFill>
-                <a:schemeClr val="bg1"/>
-              </a:solidFill>
-              <a:latin typeface="+mj-lt"/>
-            </a:endParaRPr>
           </a:p>
         </p:txBody>
       </p:sp>
@@ -5191,7 +5136,7 @@
           <p:nvPr/>
         </p:nvPicPr>
         <p:blipFill>
-          <a:blip r:embed="rId2"/>
+          <a:blip r:embed="rId3"/>
           <a:stretch>
             <a:fillRect/>
           </a:stretch>
@@ -5260,11 +5205,6 @@
               </a:rPr>
               <a:t>10</a:t>
             </a:r>
-            <a:endParaRPr lang="en-US">
-              <a:solidFill>
-                <a:srgbClr val="FF0000"/>
-              </a:solidFill>
-            </a:endParaRPr>
           </a:p>
         </p:txBody>
       </p:sp>
@@ -5447,13 +5387,6 @@
               </a:rPr>
               <a:t>?: </a:t>
             </a:r>
-            <a:endParaRPr lang="en-US" sz="2800" dirty="0">
-              <a:solidFill>
-                <a:srgbClr val="FF0000"/>
-              </a:solidFill>
-              <a:ea typeface="SF Pro Semibold" pitchFamily="2" charset="0"/>
-              <a:cs typeface="Arial" panose="020B0604020202020204" pitchFamily="34" charset="0"/>
-            </a:endParaRPr>
           </a:p>
         </p:txBody>
       </p:sp>
@@ -5562,12 +5495,6 @@
               </a:rPr>
               <a:t>3.ĐỘ TIN CẬY VÀ CHÍNH XÁC. </a:t>
             </a:r>
-            <a:endParaRPr lang="en-US" sz="3200" b="1">
-              <a:solidFill>
-                <a:schemeClr val="bg1"/>
-              </a:solidFill>
-              <a:latin typeface="+mj-lt"/>
-            </a:endParaRPr>
           </a:p>
         </p:txBody>
       </p:sp>
@@ -5604,7 +5531,7 @@
           <p:nvPr/>
         </p:nvPicPr>
         <p:blipFill>
-          <a:blip r:embed="rId1"/>
+          <a:blip r:embed="rId2"/>
           <a:stretch>
             <a:fillRect/>
           </a:stretch>
@@ -5778,13 +5705,6 @@
               </a:rPr>
               <a:t>?:  </a:t>
             </a:r>
-            <a:endParaRPr lang="en-US" sz="2800" dirty="0">
-              <a:solidFill>
-                <a:srgbClr val="FF0000"/>
-              </a:solidFill>
-              <a:ea typeface="SF Pro Semibold" pitchFamily="2" charset="0"/>
-              <a:cs typeface="Arial" panose="020B0604020202020204" pitchFamily="34" charset="0"/>
-            </a:endParaRPr>
           </a:p>
           <a:p>
             <a:pPr marL="457200" indent="-457200">
@@ -5970,11 +5890,6 @@
               </a:rPr>
               <a:t> </a:t>
             </a:r>
-            <a:endParaRPr lang="en-US" sz="2400" dirty="0">
-              <a:effectLst/>
-              <a:ea typeface="SF Pro Semibold" pitchFamily="2" charset="0"/>
-              <a:cs typeface="Arial" panose="020B0604020202020204" pitchFamily="34" charset="0"/>
-            </a:endParaRPr>
           </a:p>
           <a:p>
             <a:pPr marL="457200" indent="-457200">
@@ -6138,10 +6053,6 @@
               </a:rPr>
               <a:t>. </a:t>
             </a:r>
-            <a:endParaRPr lang="en-US" sz="2400" dirty="0">
-              <a:ea typeface="SF Pro Semibold" pitchFamily="2" charset="0"/>
-              <a:cs typeface="Arial" panose="020B0604020202020204" pitchFamily="34" charset="0"/>
-            </a:endParaRPr>
           </a:p>
           <a:p>
             <a:pPr>
@@ -6156,10 +6067,6 @@
               </a:rPr>
               <a:t>	</a:t>
             </a:r>
-            <a:endParaRPr lang="en-US" sz="2400" dirty="0">
-              <a:ea typeface="SF Pro Semibold" pitchFamily="2" charset="0"/>
-              <a:cs typeface="Arial" panose="020B0604020202020204" pitchFamily="34" charset="0"/>
-            </a:endParaRPr>
           </a:p>
           <a:p>
             <a:pPr>
@@ -6272,10 +6179,6 @@
               </a:rPr>
               <a:t>. </a:t>
             </a:r>
-            <a:endParaRPr lang="en-US" sz="2400" dirty="0">
-              <a:ea typeface="SF Pro Semibold" pitchFamily="2" charset="0"/>
-              <a:cs typeface="Arial" panose="020B0604020202020204" pitchFamily="34" charset="0"/>
-            </a:endParaRPr>
           </a:p>
         </p:txBody>
       </p:sp>
@@ -6333,11 +6236,6 @@
               </a:rPr>
               <a:t>11</a:t>
             </a:r>
-            <a:endParaRPr lang="en-US">
-              <a:solidFill>
-                <a:srgbClr val="FF0000"/>
-              </a:solidFill>
-            </a:endParaRPr>
           </a:p>
         </p:txBody>
       </p:sp>
@@ -6446,12 +6344,6 @@
               </a:rPr>
               <a:t>3.ĐỘ TIN CẬY VÀ CHÍNH XÁC. </a:t>
             </a:r>
-            <a:endParaRPr lang="en-US" sz="3200" b="1">
-              <a:solidFill>
-                <a:schemeClr val="bg1"/>
-              </a:solidFill>
-              <a:latin typeface="+mj-lt"/>
-            </a:endParaRPr>
           </a:p>
         </p:txBody>
       </p:sp>
@@ -6488,7 +6380,7 @@
           <p:nvPr/>
         </p:nvPicPr>
         <p:blipFill>
-          <a:blip r:embed="rId1"/>
+          <a:blip r:embed="rId2"/>
           <a:stretch>
             <a:fillRect/>
           </a:stretch>
@@ -6682,13 +6574,6 @@
               </a:rPr>
               <a:t>?: </a:t>
             </a:r>
-            <a:endParaRPr lang="en-US" sz="2800" dirty="0">
-              <a:solidFill>
-                <a:srgbClr val="FF0000"/>
-              </a:solidFill>
-              <a:ea typeface="SF Pro Semibold" pitchFamily="2" charset="0"/>
-              <a:cs typeface="Arial" panose="020B0604020202020204" pitchFamily="34" charset="0"/>
-            </a:endParaRPr>
           </a:p>
           <a:p>
             <a:pPr marL="457200" indent="-457200">
@@ -6782,10 +6667,6 @@
               </a:rPr>
               <a:t>: </a:t>
             </a:r>
-            <a:endParaRPr lang="en-US" sz="2400" dirty="0">
-              <a:ea typeface="SF Pro Semibold" pitchFamily="2" charset="0"/>
-              <a:cs typeface="Arial" panose="020B0604020202020204" pitchFamily="34" charset="0"/>
-            </a:endParaRPr>
           </a:p>
           <a:p>
             <a:pPr marL="457200" indent="-457200">
@@ -6882,11 +6763,6 @@
               </a:rPr>
               <a:t>. </a:t>
             </a:r>
-            <a:endParaRPr lang="en-US" sz="2400" dirty="0">
-              <a:effectLst/>
-              <a:ea typeface="SF Pro Semibold" pitchFamily="2" charset="0"/>
-              <a:cs typeface="Arial" panose="020B0604020202020204" pitchFamily="34" charset="0"/>
-            </a:endParaRPr>
           </a:p>
           <a:p>
             <a:pPr marL="457200" indent="-457200">
@@ -6966,10 +6842,6 @@
               </a:rPr>
               <a:t>. </a:t>
             </a:r>
-            <a:endParaRPr lang="en-US" sz="2400" dirty="0">
-              <a:ea typeface="SF Pro Semibold" pitchFamily="2" charset="0"/>
-              <a:cs typeface="Arial" panose="020B0604020202020204" pitchFamily="34" charset="0"/>
-            </a:endParaRPr>
           </a:p>
           <a:p>
             <a:pPr marL="457200" indent="-457200">
@@ -7063,10 +6935,6 @@
               </a:rPr>
               <a:t>	</a:t>
             </a:r>
-            <a:endParaRPr lang="en-US" sz="2400" dirty="0">
-              <a:ea typeface="SF Pro Semibold" pitchFamily="2" charset="0"/>
-              <a:cs typeface="Arial" panose="020B0604020202020204" pitchFamily="34" charset="0"/>
-            </a:endParaRPr>
           </a:p>
           <a:p>
             <a:pPr>
@@ -7305,10 +7173,6 @@
               </a:rPr>
               <a:t> nay. </a:t>
             </a:r>
-            <a:endParaRPr lang="en-US" sz="2400" dirty="0">
-              <a:ea typeface="SF Pro Semibold" pitchFamily="2" charset="0"/>
-              <a:cs typeface="Arial" panose="020B0604020202020204" pitchFamily="34" charset="0"/>
-            </a:endParaRPr>
           </a:p>
         </p:txBody>
       </p:sp>
@@ -7366,11 +7230,6 @@
               </a:rPr>
               <a:t>12</a:t>
             </a:r>
-            <a:endParaRPr lang="en-US">
-              <a:solidFill>
-                <a:srgbClr val="FF0000"/>
-              </a:solidFill>
-            </a:endParaRPr>
           </a:p>
         </p:txBody>
       </p:sp>
@@ -7479,12 +7338,6 @@
               </a:rPr>
               <a:t>3.ĐỘ TIN CẬY VÀ CHÍNH XÁC. </a:t>
             </a:r>
-            <a:endParaRPr lang="en-US" sz="3200" b="1">
-              <a:solidFill>
-                <a:schemeClr val="bg1"/>
-              </a:solidFill>
-              <a:latin typeface="+mj-lt"/>
-            </a:endParaRPr>
           </a:p>
         </p:txBody>
       </p:sp>
@@ -7521,7 +7374,7 @@
           <p:nvPr/>
         </p:nvPicPr>
         <p:blipFill>
-          <a:blip r:embed="rId1"/>
+          <a:blip r:embed="rId2"/>
           <a:stretch>
             <a:fillRect/>
           </a:stretch>
@@ -7695,13 +7548,6 @@
               </a:rPr>
               <a:t>?:  </a:t>
             </a:r>
-            <a:endParaRPr lang="en-US" sz="2800" dirty="0">
-              <a:solidFill>
-                <a:srgbClr val="FF0000"/>
-              </a:solidFill>
-              <a:ea typeface="SF Pro Semibold" pitchFamily="2" charset="0"/>
-              <a:cs typeface="Arial" panose="020B0604020202020204" pitchFamily="34" charset="0"/>
-            </a:endParaRPr>
           </a:p>
         </p:txBody>
       </p:sp>
@@ -7714,7 +7560,7 @@
           <p:nvPr/>
         </p:nvPicPr>
         <p:blipFill>
-          <a:blip r:embed="rId2"/>
+          <a:blip r:embed="rId3"/>
           <a:stretch>
             <a:fillRect/>
           </a:stretch>
@@ -7783,11 +7629,6 @@
               </a:rPr>
               <a:t>13</a:t>
             </a:r>
-            <a:endParaRPr lang="en-US">
-              <a:solidFill>
-                <a:srgbClr val="FF0000"/>
-              </a:solidFill>
-            </a:endParaRPr>
           </a:p>
         </p:txBody>
       </p:sp>
@@ -7896,12 +7737,6 @@
               </a:rPr>
               <a:t>3.ĐỘ TIN CẬY VÀ CHÍNH XÁC. </a:t>
             </a:r>
-            <a:endParaRPr lang="en-US" sz="3200" b="1">
-              <a:solidFill>
-                <a:schemeClr val="bg1"/>
-              </a:solidFill>
-              <a:latin typeface="+mj-lt"/>
-            </a:endParaRPr>
           </a:p>
         </p:txBody>
       </p:sp>
@@ -7938,7 +7773,7 @@
           <p:nvPr/>
         </p:nvPicPr>
         <p:blipFill>
-          <a:blip r:embed="rId1"/>
+          <a:blip r:embed="rId2"/>
           <a:stretch>
             <a:fillRect/>
           </a:stretch>
@@ -7992,13 +7827,6 @@
               </a:rPr>
               <a:t>3.3.Điểm tin cậy trong nhận dạng khuôn mặt?:  </a:t>
             </a:r>
-            <a:endParaRPr lang="en-US" sz="2800" dirty="0">
-              <a:solidFill>
-                <a:srgbClr val="FF0000"/>
-              </a:solidFill>
-              <a:ea typeface="SF Pro Semibold" pitchFamily="2" charset="0"/>
-              <a:cs typeface="Arial" panose="020B0604020202020204" pitchFamily="34" charset="0"/>
-            </a:endParaRPr>
           </a:p>
           <a:p>
             <a:pPr marL="457200" indent="-457200">
@@ -8016,11 +7844,6 @@
               </a:rPr>
               <a:t>Hệ thống sẽ phát hiện, so sánh khuôn mặt với dữ liệu từ database. </a:t>
             </a:r>
-            <a:endParaRPr lang="en-US" sz="2400" dirty="0">
-              <a:effectLst/>
-              <a:ea typeface="SF Pro Semibold" pitchFamily="2" charset="0"/>
-              <a:cs typeface="Arial" panose="020B0604020202020204" pitchFamily="34" charset="0"/>
-            </a:endParaRPr>
           </a:p>
           <a:p>
             <a:pPr marL="457200" indent="-457200">
@@ -8037,10 +7860,6 @@
               </a:rPr>
               <a:t> Điểm tin cậy càng cao thì khả năng hai hình ảnh thuộc về cùng một người càng cao. </a:t>
             </a:r>
-            <a:endParaRPr lang="en-US" sz="2400" dirty="0">
-              <a:ea typeface="SF Pro Semibold" pitchFamily="2" charset="0"/>
-              <a:cs typeface="Arial" panose="020B0604020202020204" pitchFamily="34" charset="0"/>
-            </a:endParaRPr>
           </a:p>
           <a:p>
             <a:pPr>
@@ -8055,10 +7874,6 @@
               </a:rPr>
               <a:t>	</a:t>
             </a:r>
-            <a:endParaRPr lang="en-US" sz="2400" dirty="0">
-              <a:ea typeface="SF Pro Semibold" pitchFamily="2" charset="0"/>
-              <a:cs typeface="Arial" panose="020B0604020202020204" pitchFamily="34" charset="0"/>
-            </a:endParaRPr>
           </a:p>
           <a:p>
             <a:pPr>
@@ -8073,10 +7888,6 @@
               </a:rPr>
               <a:t>=&gt; Ngưỡng điểm này thường lên đến &gt;90%.</a:t>
             </a:r>
-            <a:endParaRPr lang="en-US" sz="2400" dirty="0">
-              <a:ea typeface="SF Pro Semibold" pitchFamily="2" charset="0"/>
-              <a:cs typeface="Arial" panose="020B0604020202020204" pitchFamily="34" charset="0"/>
-            </a:endParaRPr>
           </a:p>
         </p:txBody>
       </p:sp>
@@ -8134,11 +7945,6 @@
               </a:rPr>
               <a:t>14</a:t>
             </a:r>
-            <a:endParaRPr lang="en-US">
-              <a:solidFill>
-                <a:srgbClr val="FF0000"/>
-              </a:solidFill>
-            </a:endParaRPr>
           </a:p>
         </p:txBody>
       </p:sp>
@@ -8209,13 +8015,6 @@
               </a:rPr>
               <a:t>3.3.Điểm tin cậy trong nhận dạng khuôn mặt?:  </a:t>
             </a:r>
-            <a:endParaRPr lang="en-US" sz="2800" dirty="0">
-              <a:solidFill>
-                <a:srgbClr val="FF0000"/>
-              </a:solidFill>
-              <a:ea typeface="SF Pro Semibold" pitchFamily="2" charset="0"/>
-              <a:cs typeface="Arial" panose="020B0604020202020204" pitchFamily="34" charset="0"/>
-            </a:endParaRPr>
           </a:p>
         </p:txBody>
       </p:sp>
@@ -8296,12 +8095,6 @@
               </a:rPr>
               <a:t>3.ĐỘ TIN CẬY VÀ CHÍNH XÁC. </a:t>
             </a:r>
-            <a:endParaRPr lang="en-US" sz="3200" b="1">
-              <a:solidFill>
-                <a:schemeClr val="bg1"/>
-              </a:solidFill>
-              <a:latin typeface="+mj-lt"/>
-            </a:endParaRPr>
           </a:p>
         </p:txBody>
       </p:sp>
@@ -8338,7 +8131,7 @@
           <p:nvPr/>
         </p:nvPicPr>
         <p:blipFill>
-          <a:blip r:embed="rId1"/>
+          <a:blip r:embed="rId2"/>
           <a:stretch>
             <a:fillRect/>
           </a:stretch>
@@ -8362,7 +8155,7 @@
           <p:nvPr/>
         </p:nvPicPr>
         <p:blipFill>
-          <a:blip r:embed="rId2"/>
+          <a:blip r:embed="rId3"/>
           <a:stretch>
             <a:fillRect/>
           </a:stretch>
@@ -8433,11 +8226,6 @@
               </a:rPr>
               <a:t>15</a:t>
             </a:r>
-            <a:endParaRPr lang="en-US">
-              <a:solidFill>
-                <a:srgbClr val="FF0000"/>
-              </a:solidFill>
-            </a:endParaRPr>
           </a:p>
         </p:txBody>
       </p:sp>
@@ -8472,7 +8260,7 @@
       <p:sp>
         <p:nvSpPr>
           <p:cNvPr id="10" name="TextBox 9">
-            <a:hlinkClick r:id="rId1"/>
+            <a:hlinkClick r:id="rId2"/>
           </p:cNvPr>
           <p:cNvSpPr txBox="1"/>
           <p:nvPr/>
@@ -8507,10 +8295,6 @@
               </a:rPr>
               <a:t>https://en.wikipedia.org/wiki/Facial_recognition_system</a:t>
             </a:r>
-            <a:endParaRPr lang="en-US" sz="2400" dirty="0">
-              <a:ea typeface="SF Pro Semibold" pitchFamily="2" charset="0"/>
-              <a:cs typeface="Arial" panose="020B0604020202020204" pitchFamily="34" charset="0"/>
-            </a:endParaRPr>
           </a:p>
         </p:txBody>
       </p:sp>
@@ -8591,12 +8375,6 @@
               </a:rPr>
               <a:t>CÁC TRANG TÀI LIỆU THAM KHẢO. </a:t>
             </a:r>
-            <a:endParaRPr lang="en-US" sz="3200" b="1">
-              <a:solidFill>
-                <a:schemeClr val="bg1"/>
-              </a:solidFill>
-              <a:latin typeface="+mj-lt"/>
-            </a:endParaRPr>
           </a:p>
         </p:txBody>
       </p:sp>
@@ -8633,7 +8411,7 @@
           <p:nvPr/>
         </p:nvPicPr>
         <p:blipFill>
-          <a:blip r:embed="rId2"/>
+          <a:blip r:embed="rId3"/>
           <a:stretch>
             <a:fillRect/>
           </a:stretch>
@@ -8651,7 +8429,7 @@
       <p:sp>
         <p:nvSpPr>
           <p:cNvPr id="17" name="TextBox 16">
-            <a:hlinkClick r:id="rId3"/>
+            <a:hlinkClick r:id="rId4"/>
           </p:cNvPr>
           <p:cNvSpPr txBox="1"/>
           <p:nvPr/>
@@ -8686,17 +8464,13 @@
               </a:rPr>
               <a:t>https://this.deakin.edu.au/innovation/facial-recognition-id-how-safe-is-your-face#:~:text=It's%20not%20relatively%20more%20secure,your%20phone%20using%20Face%20ID.</a:t>
             </a:r>
-            <a:endParaRPr lang="en-US" sz="2400" dirty="0">
-              <a:ea typeface="SF Pro Semibold" pitchFamily="2" charset="0"/>
-              <a:cs typeface="Arial" panose="020B0604020202020204" pitchFamily="34" charset="0"/>
-            </a:endParaRPr>
           </a:p>
         </p:txBody>
       </p:sp>
       <p:sp>
         <p:nvSpPr>
           <p:cNvPr id="18" name="TextBox 17">
-            <a:hlinkClick r:id="rId4"/>
+            <a:hlinkClick r:id="rId5"/>
           </p:cNvPr>
           <p:cNvSpPr txBox="1"/>
           <p:nvPr/>
@@ -8731,10 +8505,6 @@
               </a:rPr>
               <a:t>https://senstar.com/senstarpedia/pros-and-cons-of-facial-recognition/</a:t>
             </a:r>
-            <a:endParaRPr lang="en-US" sz="2400" dirty="0">
-              <a:ea typeface="SF Pro Semibold" pitchFamily="2" charset="0"/>
-              <a:cs typeface="Arial" panose="020B0604020202020204" pitchFamily="34" charset="0"/>
-            </a:endParaRPr>
           </a:p>
         </p:txBody>
       </p:sp>
@@ -8843,12 +8613,6 @@
               </a:rPr>
               <a:t>KẾT THÚC. </a:t>
             </a:r>
-            <a:endParaRPr lang="en-US" sz="3200" b="1">
-              <a:solidFill>
-                <a:schemeClr val="bg1"/>
-              </a:solidFill>
-              <a:latin typeface="+mj-lt"/>
-            </a:endParaRPr>
           </a:p>
         </p:txBody>
       </p:sp>
@@ -8885,7 +8649,7 @@
           <p:nvPr/>
         </p:nvPicPr>
         <p:blipFill>
-          <a:blip r:embed="rId1"/>
+          <a:blip r:embed="rId2"/>
           <a:stretch>
             <a:fillRect/>
           </a:stretch>
@@ -8909,7 +8673,7 @@
           <p:nvPr/>
         </p:nvPicPr>
         <p:blipFill>
-          <a:blip r:embed="rId2"/>
+          <a:blip r:embed="rId3"/>
           <a:stretch>
             <a:fillRect/>
           </a:stretch>
@@ -9007,7 +8771,7 @@
         <p:spPr>
           <a:xfrm>
             <a:off x="521852" y="315311"/>
-            <a:ext cx="2076209" cy="584775"/>
+            <a:ext cx="2190023" cy="584775"/>
           </a:xfrm>
           <a:prstGeom prst="rect">
             <a:avLst/>
@@ -9027,14 +8791,8 @@
                 </a:solidFill>
                 <a:latin typeface="+mj-lt"/>
               </a:rPr>
-              <a:t>MỤC LỤC</a:t>
-            </a:r>
-            <a:endParaRPr lang="en-US" sz="3200" b="1">
-              <a:solidFill>
-                <a:schemeClr val="bg1"/>
-              </a:solidFill>
-              <a:latin typeface="+mj-lt"/>
-            </a:endParaRPr>
+              <a:t>MỤC LỤC.</a:t>
+            </a:r>
           </a:p>
         </p:txBody>
       </p:sp>
@@ -9071,7 +8829,7 @@
           <p:nvPr/>
         </p:nvPicPr>
         <p:blipFill>
-          <a:blip r:embed="rId1"/>
+          <a:blip r:embed="rId2"/>
           <a:stretch>
             <a:fillRect/>
           </a:stretch>
@@ -9304,6 +9062,89 @@
               </a:rPr>
               <a:t>.</a:t>
             </a:r>
+          </a:p>
+          <a:p>
+            <a:r>
+              <a:rPr lang="en-US" sz="2400" dirty="0">
+                <a:solidFill>
+                  <a:srgbClr val="FF0000"/>
+                </a:solidFill>
+                <a:ea typeface="SF Pro Semibold" pitchFamily="2" charset="0"/>
+                <a:cs typeface="Arial" panose="020B0604020202020204" pitchFamily="34" charset="0"/>
+              </a:rPr>
+              <a:t>1.1.Khái </a:t>
+            </a:r>
+            <a:r>
+              <a:rPr lang="en-US" sz="2400" dirty="0" err="1">
+                <a:solidFill>
+                  <a:srgbClr val="FF0000"/>
+                </a:solidFill>
+                <a:ea typeface="SF Pro Semibold" pitchFamily="2" charset="0"/>
+                <a:cs typeface="Arial" panose="020B0604020202020204" pitchFamily="34" charset="0"/>
+              </a:rPr>
+              <a:t>niệm.</a:t>
+            </a:r>
+            <a:r>
+              <a:rPr lang="en-US" sz="2400" dirty="0">
+                <a:solidFill>
+                  <a:srgbClr val="FF0000"/>
+                </a:solidFill>
+                <a:ea typeface="SF Pro Semibold" pitchFamily="2" charset="0"/>
+                <a:cs typeface="Arial" panose="020B0604020202020204" pitchFamily="34" charset="0"/>
+              </a:rPr>
+              <a:t>	</a:t>
+            </a:r>
+          </a:p>
+          <a:p>
+            <a:r>
+              <a:rPr lang="en-US" sz="2400" dirty="0">
+                <a:solidFill>
+                  <a:srgbClr val="FF0000"/>
+                </a:solidFill>
+                <a:ea typeface="SF Pro Semibold" pitchFamily="2" charset="0"/>
+                <a:cs typeface="Arial" panose="020B0604020202020204" pitchFamily="34" charset="0"/>
+              </a:rPr>
+              <a:t>1.2.Cấu </a:t>
+            </a:r>
+            <a:r>
+              <a:rPr lang="en-US" sz="2400" dirty="0" err="1">
+                <a:solidFill>
+                  <a:srgbClr val="FF0000"/>
+                </a:solidFill>
+                <a:ea typeface="SF Pro Semibold" pitchFamily="2" charset="0"/>
+                <a:cs typeface="Arial" panose="020B0604020202020204" pitchFamily="34" charset="0"/>
+              </a:rPr>
+              <a:t>tạo</a:t>
+            </a:r>
+            <a:r>
+              <a:rPr lang="en-US" sz="2400" dirty="0">
+                <a:solidFill>
+                  <a:srgbClr val="FF0000"/>
+                </a:solidFill>
+                <a:ea typeface="SF Pro Semibold" pitchFamily="2" charset="0"/>
+                <a:cs typeface="Arial" panose="020B0604020202020204" pitchFamily="34" charset="0"/>
+              </a:rPr>
+              <a:t> Face ID.</a:t>
+            </a:r>
+            <a:endParaRPr lang="vi-VN" sz="2400" dirty="0">
+              <a:solidFill>
+                <a:srgbClr val="FF0000"/>
+              </a:solidFill>
+              <a:ea typeface="SF Pro Semibold" pitchFamily="2" charset="0"/>
+              <a:cs typeface="Arial" panose="020B0604020202020204" pitchFamily="34" charset="0"/>
+            </a:endParaRPr>
+          </a:p>
+          <a:p>
+            <a:r>
+              <a:rPr lang="vi-VN" sz="2400" dirty="0">
+                <a:solidFill>
+                  <a:srgbClr val="FF0000"/>
+                </a:solidFill>
+                <a:ea typeface="SF Pro Semibold" pitchFamily="2" charset="0"/>
+                <a:cs typeface="Arial" panose="020B0604020202020204" pitchFamily="34" charset="0"/>
+              </a:rPr>
+              <a:t>2. Nguyên lý hoạt động.</a:t>
+            </a:r>
             <a:endParaRPr lang="en-US" sz="2400" dirty="0">
               <a:solidFill>
                 <a:srgbClr val="FF0000"/>
@@ -9321,7 +9162,7 @@
                 <a:ea typeface="SF Pro Semibold" pitchFamily="2" charset="0"/>
                 <a:cs typeface="Arial" panose="020B0604020202020204" pitchFamily="34" charset="0"/>
               </a:rPr>
-              <a:t>1.1.Khái </a:t>
+              <a:t>2.1.Cơ </a:t>
             </a:r>
             <a:r>
               <a:rPr lang="en-US" sz="2400" dirty="0" err="1">
@@ -9331,17 +9172,7 @@
                 <a:ea typeface="SF Pro Semibold" pitchFamily="2" charset="0"/>
                 <a:cs typeface="Arial" panose="020B0604020202020204" pitchFamily="34" charset="0"/>
               </a:rPr>
-              <a:t>niệm.</a:t>
-            </a:r>
-            <a:r>
-              <a:rPr lang="en-US" sz="2400" dirty="0">
-                <a:solidFill>
-                  <a:srgbClr val="FF0000"/>
-                </a:solidFill>
-                <a:ea typeface="SF Pro Semibold" pitchFamily="2" charset="0"/>
-                <a:cs typeface="Arial" panose="020B0604020202020204" pitchFamily="34" charset="0"/>
-              </a:rPr>
-              <a:t>	</a:t>
+              <a:t>bản.</a:t>
             </a:r>
             <a:endParaRPr lang="en-US" sz="2400" dirty="0">
               <a:solidFill>
@@ -9360,7 +9191,7 @@
                 <a:ea typeface="SF Pro Semibold" pitchFamily="2" charset="0"/>
                 <a:cs typeface="Arial" panose="020B0604020202020204" pitchFamily="34" charset="0"/>
               </a:rPr>
-              <a:t>1.2.Cấu </a:t>
+              <a:t>2.2.Nhận </a:t>
             </a:r>
             <a:r>
               <a:rPr lang="en-US" sz="2400" dirty="0" err="1">
@@ -9370,7 +9201,7 @@
                 <a:ea typeface="SF Pro Semibold" pitchFamily="2" charset="0"/>
                 <a:cs typeface="Arial" panose="020B0604020202020204" pitchFamily="34" charset="0"/>
               </a:rPr>
-              <a:t>tạo</a:t>
+              <a:t>dạng</a:t>
             </a:r>
             <a:r>
               <a:rPr lang="en-US" sz="2400" dirty="0">
@@ -9380,26 +9211,17 @@
                 <a:ea typeface="SF Pro Semibold" pitchFamily="2" charset="0"/>
                 <a:cs typeface="Arial" panose="020B0604020202020204" pitchFamily="34" charset="0"/>
               </a:rPr>
-              <a:t> Face ID.</a:t>
-            </a:r>
-            <a:endParaRPr lang="vi-VN" sz="2400" dirty="0">
-              <a:solidFill>
-                <a:srgbClr val="FF0000"/>
-              </a:solidFill>
-              <a:ea typeface="SF Pro Semibold" pitchFamily="2" charset="0"/>
-              <a:cs typeface="Arial" panose="020B0604020202020204" pitchFamily="34" charset="0"/>
-            </a:endParaRPr>
-          </a:p>
-          <a:p>
-            <a:r>
-              <a:rPr lang="vi-VN" sz="2400" dirty="0">
-                <a:solidFill>
-                  <a:srgbClr val="FF0000"/>
-                </a:solidFill>
-                <a:ea typeface="SF Pro Semibold" pitchFamily="2" charset="0"/>
-                <a:cs typeface="Arial" panose="020B0604020202020204" pitchFamily="34" charset="0"/>
-              </a:rPr>
-              <a:t>2. Nguyên lý hoạt động.</a:t>
+              <a:t> 3 </a:t>
+            </a:r>
+            <a:r>
+              <a:rPr lang="en-US" sz="2400" dirty="0" err="1">
+                <a:solidFill>
+                  <a:srgbClr val="FF0000"/>
+                </a:solidFill>
+                <a:ea typeface="SF Pro Semibold" pitchFamily="2" charset="0"/>
+                <a:cs typeface="Arial" panose="020B0604020202020204" pitchFamily="34" charset="0"/>
+              </a:rPr>
+              <a:t>chiều.</a:t>
             </a:r>
             <a:endParaRPr lang="en-US" sz="2400" dirty="0">
               <a:solidFill>
@@ -9418,7 +9240,7 @@
                 <a:ea typeface="SF Pro Semibold" pitchFamily="2" charset="0"/>
                 <a:cs typeface="Arial" panose="020B0604020202020204" pitchFamily="34" charset="0"/>
               </a:rPr>
-              <a:t>2.1.Cơ </a:t>
+              <a:t>2.3.Phân </a:t>
             </a:r>
             <a:r>
               <a:rPr lang="en-US" sz="2400" dirty="0" err="1">
@@ -9428,7 +9250,69 @@
                 <a:ea typeface="SF Pro Semibold" pitchFamily="2" charset="0"/>
                 <a:cs typeface="Arial" panose="020B0604020202020204" pitchFamily="34" charset="0"/>
               </a:rPr>
-              <a:t>bản.</a:t>
+              <a:t>tích</a:t>
+            </a:r>
+            <a:r>
+              <a:rPr lang="en-US" sz="2400" dirty="0">
+                <a:solidFill>
+                  <a:srgbClr val="FF0000"/>
+                </a:solidFill>
+                <a:ea typeface="SF Pro Semibold" pitchFamily="2" charset="0"/>
+                <a:cs typeface="Arial" panose="020B0604020202020204" pitchFamily="34" charset="0"/>
+              </a:rPr>
+              <a:t> </a:t>
+            </a:r>
+            <a:r>
+              <a:rPr lang="en-US" sz="2400" dirty="0" err="1">
+                <a:solidFill>
+                  <a:srgbClr val="FF0000"/>
+                </a:solidFill>
+                <a:ea typeface="SF Pro Semibold" pitchFamily="2" charset="0"/>
+                <a:cs typeface="Arial" panose="020B0604020202020204" pitchFamily="34" charset="0"/>
+              </a:rPr>
+              <a:t>kết</a:t>
+            </a:r>
+            <a:r>
+              <a:rPr lang="en-US" sz="2400" dirty="0">
+                <a:solidFill>
+                  <a:srgbClr val="FF0000"/>
+                </a:solidFill>
+                <a:ea typeface="SF Pro Semibold" pitchFamily="2" charset="0"/>
+                <a:cs typeface="Arial" panose="020B0604020202020204" pitchFamily="34" charset="0"/>
+              </a:rPr>
+              <a:t> </a:t>
+            </a:r>
+            <a:r>
+              <a:rPr lang="en-US" sz="2400" dirty="0" err="1">
+                <a:solidFill>
+                  <a:srgbClr val="FF0000"/>
+                </a:solidFill>
+                <a:ea typeface="SF Pro Semibold" pitchFamily="2" charset="0"/>
+                <a:cs typeface="Arial" panose="020B0604020202020204" pitchFamily="34" charset="0"/>
+              </a:rPr>
+              <a:t>cấu</a:t>
+            </a:r>
+            <a:r>
+              <a:rPr lang="en-US" sz="2400" dirty="0">
+                <a:solidFill>
+                  <a:srgbClr val="FF0000"/>
+                </a:solidFill>
+                <a:ea typeface="SF Pro Semibold" pitchFamily="2" charset="0"/>
+                <a:cs typeface="Arial" panose="020B0604020202020204" pitchFamily="34" charset="0"/>
+              </a:rPr>
+              <a:t> da.</a:t>
+            </a:r>
+          </a:p>
+          <a:p>
+            <a:r>
+              <a:rPr lang="vi-VN" sz="2400" dirty="0">
+                <a:solidFill>
+                  <a:srgbClr val="FF0000"/>
+                </a:solidFill>
+                <a:ea typeface="SF Pro Semibold" pitchFamily="2" charset="0"/>
+                <a:cs typeface="Arial" panose="020B0604020202020204" pitchFamily="34" charset="0"/>
+              </a:rPr>
+              <a:t>3. Độ tin cậy và chính xác.</a:t>
             </a:r>
             <a:endParaRPr lang="en-US" sz="2400" dirty="0">
               <a:solidFill>
@@ -9447,7 +9331,7 @@
                 <a:ea typeface="SF Pro Semibold" pitchFamily="2" charset="0"/>
                 <a:cs typeface="Arial" panose="020B0604020202020204" pitchFamily="34" charset="0"/>
               </a:rPr>
-              <a:t>2.2.Nhận </a:t>
+              <a:t>3.1.Nhận </a:t>
             </a:r>
             <a:r>
               <a:rPr lang="en-US" sz="2400" dirty="0" err="1">
@@ -9457,7 +9341,7 @@
                 <a:ea typeface="SF Pro Semibold" pitchFamily="2" charset="0"/>
                 <a:cs typeface="Arial" panose="020B0604020202020204" pitchFamily="34" charset="0"/>
               </a:rPr>
-              <a:t>dạng</a:t>
+              <a:t>dạng</a:t>
             </a:r>
             <a:r>
               <a:rPr lang="en-US" sz="2400" dirty="0">
@@ -9467,7 +9351,7 @@
                 <a:ea typeface="SF Pro Semibold" pitchFamily="2" charset="0"/>
                 <a:cs typeface="Arial" panose="020B0604020202020204" pitchFamily="34" charset="0"/>
               </a:rPr>
-              <a:t> 3 </a:t>
+              <a:t> </a:t>
             </a:r>
             <a:r>
               <a:rPr lang="en-US" sz="2400" dirty="0" err="1">
@@ -9477,17 +9361,8 @@
                 <a:ea typeface="SF Pro Semibold" pitchFamily="2" charset="0"/>
                 <a:cs typeface="Arial" panose="020B0604020202020204" pitchFamily="34" charset="0"/>
               </a:rPr>
-              <a:t>chiều.</a:t>
-            </a:r>
-            <a:endParaRPr lang="en-US" sz="2400" dirty="0">
-              <a:solidFill>
-                <a:srgbClr val="FF0000"/>
-              </a:solidFill>
-              <a:ea typeface="SF Pro Semibold" pitchFamily="2" charset="0"/>
-              <a:cs typeface="Arial" panose="020B0604020202020204" pitchFamily="34" charset="0"/>
-            </a:endParaRPr>
-          </a:p>
-          <a:p>
+              <a:t>khuôn</a:t>
+            </a:r>
             <a:r>
               <a:rPr lang="en-US" sz="2400" dirty="0">
                 <a:solidFill>
@@ -9496,7 +9371,7 @@
                 <a:ea typeface="SF Pro Semibold" pitchFamily="2" charset="0"/>
                 <a:cs typeface="Arial" panose="020B0604020202020204" pitchFamily="34" charset="0"/>
               </a:rPr>
-              <a:t>2.3.Phân </a:t>
+              <a:t> </a:t>
             </a:r>
             <a:r>
               <a:rPr lang="en-US" sz="2400" dirty="0" err="1">
@@ -9506,7 +9381,7 @@
                 <a:ea typeface="SF Pro Semibold" pitchFamily="2" charset="0"/>
                 <a:cs typeface="Arial" panose="020B0604020202020204" pitchFamily="34" charset="0"/>
               </a:rPr>
-              <a:t>tích</a:t>
+              <a:t>mặt</a:t>
             </a:r>
             <a:r>
               <a:rPr lang="en-US" sz="2400" dirty="0">
@@ -9526,7 +9401,7 @@
                 <a:ea typeface="SF Pro Semibold" pitchFamily="2" charset="0"/>
                 <a:cs typeface="Arial" panose="020B0604020202020204" pitchFamily="34" charset="0"/>
               </a:rPr>
-              <a:t>kết</a:t>
+              <a:t>có</a:t>
             </a:r>
             <a:r>
               <a:rPr lang="en-US" sz="2400" dirty="0">
@@ -9546,7 +9421,7 @@
                 <a:ea typeface="SF Pro Semibold" pitchFamily="2" charset="0"/>
                 <a:cs typeface="Arial" panose="020B0604020202020204" pitchFamily="34" charset="0"/>
               </a:rPr>
-              <a:t>cấu</a:t>
+              <a:t>chính</a:t>
             </a:r>
             <a:r>
               <a:rPr lang="en-US" sz="2400" dirty="0">
@@ -9556,36 +9431,18 @@
                 <a:ea typeface="SF Pro Semibold" pitchFamily="2" charset="0"/>
                 <a:cs typeface="Arial" panose="020B0604020202020204" pitchFamily="34" charset="0"/>
               </a:rPr>
-              <a:t> da.</a:t>
-            </a:r>
-            <a:endParaRPr lang="en-US" sz="2400" dirty="0">
-              <a:solidFill>
-                <a:srgbClr val="FF0000"/>
-              </a:solidFill>
-              <a:ea typeface="SF Pro Semibold" pitchFamily="2" charset="0"/>
-              <a:cs typeface="Arial" panose="020B0604020202020204" pitchFamily="34" charset="0"/>
-            </a:endParaRPr>
-          </a:p>
-          <a:p>
-            <a:r>
-              <a:rPr lang="vi-VN" sz="2400" dirty="0">
-                <a:solidFill>
-                  <a:srgbClr val="FF0000"/>
-                </a:solidFill>
-                <a:ea typeface="SF Pro Semibold" pitchFamily="2" charset="0"/>
-                <a:cs typeface="Arial" panose="020B0604020202020204" pitchFamily="34" charset="0"/>
-              </a:rPr>
-              <a:t>3. Độ tin cậy và chính xác.</a:t>
-            </a:r>
-            <a:endParaRPr lang="en-US" sz="2400" dirty="0">
-              <a:solidFill>
-                <a:srgbClr val="FF0000"/>
-              </a:solidFill>
-              <a:ea typeface="SF Pro Semibold" pitchFamily="2" charset="0"/>
-              <a:cs typeface="Arial" panose="020B0604020202020204" pitchFamily="34" charset="0"/>
-            </a:endParaRPr>
-          </a:p>
-          <a:p>
+              <a:t> </a:t>
+            </a:r>
+            <a:r>
+              <a:rPr lang="en-US" sz="2400" dirty="0" err="1">
+                <a:solidFill>
+                  <a:srgbClr val="FF0000"/>
+                </a:solidFill>
+                <a:ea typeface="SF Pro Semibold" pitchFamily="2" charset="0"/>
+                <a:cs typeface="Arial" panose="020B0604020202020204" pitchFamily="34" charset="0"/>
+              </a:rPr>
+              <a:t>xác</a:t>
+            </a:r>
             <a:r>
               <a:rPr lang="en-US" sz="2400" dirty="0">
                 <a:solidFill>
@@ -9594,7 +9451,7 @@
                 <a:ea typeface="SF Pro Semibold" pitchFamily="2" charset="0"/>
                 <a:cs typeface="Arial" panose="020B0604020202020204" pitchFamily="34" charset="0"/>
               </a:rPr>
-              <a:t>3.1.Nhận </a:t>
+              <a:t> </a:t>
             </a:r>
             <a:r>
               <a:rPr lang="en-US" sz="2400" dirty="0" err="1">
@@ -9604,7 +9461,7 @@
                 <a:ea typeface="SF Pro Semibold" pitchFamily="2" charset="0"/>
                 <a:cs typeface="Arial" panose="020B0604020202020204" pitchFamily="34" charset="0"/>
               </a:rPr>
-              <a:t>dạng</a:t>
+              <a:t>không</a:t>
             </a:r>
             <a:r>
               <a:rPr lang="en-US" sz="2400" dirty="0">
@@ -9614,6 +9471,38 @@
                 <a:ea typeface="SF Pro Semibold" pitchFamily="2" charset="0"/>
                 <a:cs typeface="Arial" panose="020B0604020202020204" pitchFamily="34" charset="0"/>
               </a:rPr>
+              <a:t>?</a:t>
+            </a:r>
+          </a:p>
+          <a:p>
+            <a:r>
+              <a:rPr lang="en-US" sz="2400" dirty="0">
+                <a:solidFill>
+                  <a:srgbClr val="FF0000"/>
+                </a:solidFill>
+                <a:ea typeface="SF Pro Semibold" pitchFamily="2" charset="0"/>
+                <a:cs typeface="Arial" panose="020B0604020202020204" pitchFamily="34" charset="0"/>
+              </a:rPr>
+              <a:t>3.2.Nhận </a:t>
+            </a:r>
+            <a:r>
+              <a:rPr lang="en-US" sz="2400" dirty="0" err="1">
+                <a:solidFill>
+                  <a:srgbClr val="FF0000"/>
+                </a:solidFill>
+                <a:ea typeface="SF Pro Semibold" pitchFamily="2" charset="0"/>
+                <a:cs typeface="Arial" panose="020B0604020202020204" pitchFamily="34" charset="0"/>
+              </a:rPr>
+              <a:t>diện</a:t>
+            </a:r>
+            <a:r>
+              <a:rPr lang="en-US" sz="2400" dirty="0">
+                <a:solidFill>
+                  <a:srgbClr val="FF0000"/>
+                </a:solidFill>
+                <a:ea typeface="SF Pro Semibold" pitchFamily="2" charset="0"/>
+                <a:cs typeface="Arial" panose="020B0604020202020204" pitchFamily="34" charset="0"/>
+              </a:rPr>
               <a:t> </a:t>
             </a:r>
             <a:r>
@@ -9674,6 +9563,26 @@
                 <a:ea typeface="SF Pro Semibold" pitchFamily="2" charset="0"/>
                 <a:cs typeface="Arial" panose="020B0604020202020204" pitchFamily="34" charset="0"/>
               </a:rPr>
+              <a:t> an </a:t>
+            </a:r>
+            <a:r>
+              <a:rPr lang="en-US" sz="2400" dirty="0" err="1">
+                <a:solidFill>
+                  <a:srgbClr val="FF0000"/>
+                </a:solidFill>
+                <a:ea typeface="SF Pro Semibold" pitchFamily="2" charset="0"/>
+                <a:cs typeface="Arial" panose="020B0604020202020204" pitchFamily="34" charset="0"/>
+              </a:rPr>
+              <a:t>toàn</a:t>
+            </a:r>
+            <a:r>
+              <a:rPr lang="en-US" sz="2400" dirty="0">
+                <a:solidFill>
+                  <a:srgbClr val="FF0000"/>
+                </a:solidFill>
+                <a:ea typeface="SF Pro Semibold" pitchFamily="2" charset="0"/>
+                <a:cs typeface="Arial" panose="020B0604020202020204" pitchFamily="34" charset="0"/>
+              </a:rPr>
               <a:t> </a:t>
             </a:r>
             <a:r>
@@ -9684,7 +9593,7 @@
                 <a:ea typeface="SF Pro Semibold" pitchFamily="2" charset="0"/>
                 <a:cs typeface="Arial" panose="020B0604020202020204" pitchFamily="34" charset="0"/>
               </a:rPr>
-              <a:t>chính</a:t>
+              <a:t>không</a:t>
             </a:r>
             <a:r>
               <a:rPr lang="en-US" sz="2400" dirty="0">
@@ -9694,194 +9603,8 @@
                 <a:ea typeface="SF Pro Semibold" pitchFamily="2" charset="0"/>
                 <a:cs typeface="Arial" panose="020B0604020202020204" pitchFamily="34" charset="0"/>
               </a:rPr>
-              <a:t> </a:t>
-            </a:r>
-            <a:r>
-              <a:rPr lang="en-US" sz="2400" dirty="0" err="1">
-                <a:solidFill>
-                  <a:srgbClr val="FF0000"/>
-                </a:solidFill>
-                <a:ea typeface="SF Pro Semibold" pitchFamily="2" charset="0"/>
-                <a:cs typeface="Arial" panose="020B0604020202020204" pitchFamily="34" charset="0"/>
-              </a:rPr>
-              <a:t>xác</a:t>
-            </a:r>
-            <a:r>
-              <a:rPr lang="en-US" sz="2400" dirty="0">
-                <a:solidFill>
-                  <a:srgbClr val="FF0000"/>
-                </a:solidFill>
-                <a:ea typeface="SF Pro Semibold" pitchFamily="2" charset="0"/>
-                <a:cs typeface="Arial" panose="020B0604020202020204" pitchFamily="34" charset="0"/>
-              </a:rPr>
-              <a:t> </a:t>
-            </a:r>
-            <a:r>
-              <a:rPr lang="en-US" sz="2400" dirty="0" err="1">
-                <a:solidFill>
-                  <a:srgbClr val="FF0000"/>
-                </a:solidFill>
-                <a:ea typeface="SF Pro Semibold" pitchFamily="2" charset="0"/>
-                <a:cs typeface="Arial" panose="020B0604020202020204" pitchFamily="34" charset="0"/>
-              </a:rPr>
-              <a:t>không</a:t>
-            </a:r>
-            <a:r>
-              <a:rPr lang="en-US" sz="2400" dirty="0">
-                <a:solidFill>
-                  <a:srgbClr val="FF0000"/>
-                </a:solidFill>
-                <a:ea typeface="SF Pro Semibold" pitchFamily="2" charset="0"/>
-                <a:cs typeface="Arial" panose="020B0604020202020204" pitchFamily="34" charset="0"/>
-              </a:rPr>
               <a:t>?</a:t>
             </a:r>
-            <a:endParaRPr lang="en-US" sz="2400" dirty="0">
-              <a:solidFill>
-                <a:srgbClr val="FF0000"/>
-              </a:solidFill>
-              <a:ea typeface="SF Pro Semibold" pitchFamily="2" charset="0"/>
-              <a:cs typeface="Arial" panose="020B0604020202020204" pitchFamily="34" charset="0"/>
-            </a:endParaRPr>
-          </a:p>
-          <a:p>
-            <a:r>
-              <a:rPr lang="en-US" sz="2400" dirty="0">
-                <a:solidFill>
-                  <a:srgbClr val="FF0000"/>
-                </a:solidFill>
-                <a:ea typeface="SF Pro Semibold" pitchFamily="2" charset="0"/>
-                <a:cs typeface="Arial" panose="020B0604020202020204" pitchFamily="34" charset="0"/>
-              </a:rPr>
-              <a:t>3.2.Nhận </a:t>
-            </a:r>
-            <a:r>
-              <a:rPr lang="en-US" sz="2400" dirty="0" err="1">
-                <a:solidFill>
-                  <a:srgbClr val="FF0000"/>
-                </a:solidFill>
-                <a:ea typeface="SF Pro Semibold" pitchFamily="2" charset="0"/>
-                <a:cs typeface="Arial" panose="020B0604020202020204" pitchFamily="34" charset="0"/>
-              </a:rPr>
-              <a:t>diện</a:t>
-            </a:r>
-            <a:r>
-              <a:rPr lang="en-US" sz="2400" dirty="0">
-                <a:solidFill>
-                  <a:srgbClr val="FF0000"/>
-                </a:solidFill>
-                <a:ea typeface="SF Pro Semibold" pitchFamily="2" charset="0"/>
-                <a:cs typeface="Arial" panose="020B0604020202020204" pitchFamily="34" charset="0"/>
-              </a:rPr>
-              <a:t> </a:t>
-            </a:r>
-            <a:r>
-              <a:rPr lang="en-US" sz="2400" dirty="0" err="1">
-                <a:solidFill>
-                  <a:srgbClr val="FF0000"/>
-                </a:solidFill>
-                <a:ea typeface="SF Pro Semibold" pitchFamily="2" charset="0"/>
-                <a:cs typeface="Arial" panose="020B0604020202020204" pitchFamily="34" charset="0"/>
-              </a:rPr>
-              <a:t>khuôn</a:t>
-            </a:r>
-            <a:r>
-              <a:rPr lang="en-US" sz="2400" dirty="0">
-                <a:solidFill>
-                  <a:srgbClr val="FF0000"/>
-                </a:solidFill>
-                <a:ea typeface="SF Pro Semibold" pitchFamily="2" charset="0"/>
-                <a:cs typeface="Arial" panose="020B0604020202020204" pitchFamily="34" charset="0"/>
-              </a:rPr>
-              <a:t> </a:t>
-            </a:r>
-            <a:r>
-              <a:rPr lang="en-US" sz="2400" dirty="0" err="1">
-                <a:solidFill>
-                  <a:srgbClr val="FF0000"/>
-                </a:solidFill>
-                <a:ea typeface="SF Pro Semibold" pitchFamily="2" charset="0"/>
-                <a:cs typeface="Arial" panose="020B0604020202020204" pitchFamily="34" charset="0"/>
-              </a:rPr>
-              <a:t>mặt</a:t>
-            </a:r>
-            <a:r>
-              <a:rPr lang="en-US" sz="2400" dirty="0">
-                <a:solidFill>
-                  <a:srgbClr val="FF0000"/>
-                </a:solidFill>
-                <a:ea typeface="SF Pro Semibold" pitchFamily="2" charset="0"/>
-                <a:cs typeface="Arial" panose="020B0604020202020204" pitchFamily="34" charset="0"/>
-              </a:rPr>
-              <a:t> </a:t>
-            </a:r>
-            <a:r>
-              <a:rPr lang="en-US" sz="2400" dirty="0" err="1">
-                <a:solidFill>
-                  <a:srgbClr val="FF0000"/>
-                </a:solidFill>
-                <a:ea typeface="SF Pro Semibold" pitchFamily="2" charset="0"/>
-                <a:cs typeface="Arial" panose="020B0604020202020204" pitchFamily="34" charset="0"/>
-              </a:rPr>
-              <a:t>có</a:t>
-            </a:r>
-            <a:r>
-              <a:rPr lang="en-US" sz="2400" dirty="0">
-                <a:solidFill>
-                  <a:srgbClr val="FF0000"/>
-                </a:solidFill>
-                <a:ea typeface="SF Pro Semibold" pitchFamily="2" charset="0"/>
-                <a:cs typeface="Arial" panose="020B0604020202020204" pitchFamily="34" charset="0"/>
-              </a:rPr>
-              <a:t> an </a:t>
-            </a:r>
-            <a:r>
-              <a:rPr lang="en-US" sz="2400" dirty="0" err="1">
-                <a:solidFill>
-                  <a:srgbClr val="FF0000"/>
-                </a:solidFill>
-                <a:ea typeface="SF Pro Semibold" pitchFamily="2" charset="0"/>
-                <a:cs typeface="Arial" panose="020B0604020202020204" pitchFamily="34" charset="0"/>
-              </a:rPr>
-              <a:t>toàn</a:t>
-            </a:r>
-            <a:r>
-              <a:rPr lang="en-US" sz="2400" dirty="0">
-                <a:solidFill>
-                  <a:srgbClr val="FF0000"/>
-                </a:solidFill>
-                <a:ea typeface="SF Pro Semibold" pitchFamily="2" charset="0"/>
-                <a:cs typeface="Arial" panose="020B0604020202020204" pitchFamily="34" charset="0"/>
-              </a:rPr>
-              <a:t> </a:t>
-            </a:r>
-            <a:r>
-              <a:rPr lang="en-US" sz="2400" dirty="0" err="1">
-                <a:solidFill>
-                  <a:srgbClr val="FF0000"/>
-                </a:solidFill>
-                <a:ea typeface="SF Pro Semibold" pitchFamily="2" charset="0"/>
-                <a:cs typeface="Arial" panose="020B0604020202020204" pitchFamily="34" charset="0"/>
-              </a:rPr>
-              <a:t>không</a:t>
-            </a:r>
-            <a:r>
-              <a:rPr lang="en-US" sz="2400" dirty="0">
-                <a:solidFill>
-                  <a:srgbClr val="FF0000"/>
-                </a:solidFill>
-                <a:ea typeface="SF Pro Semibold" pitchFamily="2" charset="0"/>
-                <a:cs typeface="Arial" panose="020B0604020202020204" pitchFamily="34" charset="0"/>
-              </a:rPr>
-              <a:t>?</a:t>
-            </a:r>
-            <a:endParaRPr lang="en-US" sz="2400" dirty="0">
-              <a:solidFill>
-                <a:srgbClr val="FF0000"/>
-              </a:solidFill>
-              <a:ea typeface="SF Pro Semibold" pitchFamily="2" charset="0"/>
-              <a:cs typeface="Arial" panose="020B0604020202020204" pitchFamily="34" charset="0"/>
-            </a:endParaRPr>
           </a:p>
           <a:p>
             <a:r>
@@ -10046,11 +9769,6 @@
               </a:rPr>
               <a:t>2</a:t>
             </a:r>
-            <a:endParaRPr lang="en-US">
-              <a:solidFill>
-                <a:srgbClr val="FF0000"/>
-              </a:solidFill>
-            </a:endParaRPr>
           </a:p>
         </p:txBody>
       </p:sp>
@@ -10137,7 +9855,7 @@
         <p:spPr>
           <a:xfrm>
             <a:off x="521852" y="315311"/>
-            <a:ext cx="4791075" cy="583565"/>
+            <a:ext cx="5564344" cy="584775"/>
           </a:xfrm>
           <a:prstGeom prst="rect">
             <a:avLst/>
@@ -10157,34 +9875,7 @@
                 </a:solidFill>
                 <a:latin typeface="+mj-lt"/>
               </a:rPr>
-              <a:t>1</a:t>
-            </a:r>
-            <a:r>
-              <a:rPr lang="vi-VN" altLang="en-US" sz="3200" b="1">
-                <a:solidFill>
-                  <a:schemeClr val="bg1"/>
-                </a:solidFill>
-                <a:latin typeface="+mj-lt"/>
-              </a:rPr>
-              <a:t>.</a:t>
-            </a:r>
-            <a:r>
-              <a:rPr lang="en-US" sz="3200" b="1">
-                <a:solidFill>
-                  <a:schemeClr val="bg1"/>
-                </a:solidFill>
-                <a:latin typeface="+mj-lt"/>
-              </a:rPr>
-              <a:t>Kh</a:t>
-            </a:r>
-            <a:r>
-              <a:rPr lang="vi-VN" altLang="en-US" sz="3200" b="1">
-                <a:solidFill>
-                  <a:schemeClr val="bg1"/>
-                </a:solidFill>
-                <a:latin typeface="+mj-lt"/>
-              </a:rPr>
-              <a:t>ái Niệm và Cấu Tạo</a:t>
+              <a:t>1.KHÁI NIỆM VÀ CẤU TẠO. </a:t>
             </a:r>
             <a:endParaRPr lang="vi-VN" altLang="en-US" sz="3200" b="1">
               <a:solidFill>
@@ -10228,7 +9919,7 @@
           <p:nvPr/>
         </p:nvPicPr>
         <p:blipFill>
-          <a:blip r:embed="rId1"/>
+          <a:blip r:embed="rId2"/>
           <a:stretch>
             <a:fillRect/>
           </a:stretch>
@@ -10444,13 +10135,6 @@
               </a:rPr>
               <a:t>1.1.Khái Niệm</a:t>
             </a:r>
-            <a:endParaRPr lang="vi-VN" sz="2800" dirty="0">
-              <a:solidFill>
-                <a:srgbClr val="FF0000"/>
-              </a:solidFill>
-              <a:ea typeface="SF Pro Semibold" pitchFamily="2" charset="0"/>
-              <a:cs typeface="Arial" panose="020B0604020202020204" pitchFamily="34" charset="0"/>
-            </a:endParaRPr>
           </a:p>
         </p:txBody>
       </p:sp>
@@ -10494,9 +10178,6 @@
               </a:rPr>
               <a:t>Công nghệ nhận diện khuôn mặt là một công nghệ sinh trắc học ánh xạ các đặc điểm khuôn mặt của một cá nhân về mặt toán học và lưu trữ dữ liệu dưới dạng faceprint</a:t>
             </a:r>
-            <a:endParaRPr lang="en-US" sz="2400">
-              <a:cs typeface="Arial" panose="020B0604020202020204" pitchFamily="34" charset="0"/>
-            </a:endParaRPr>
           </a:p>
         </p:txBody>
       </p:sp>
@@ -10509,7 +10190,7 @@
           <p:nvPr/>
         </p:nvPicPr>
         <p:blipFill>
-          <a:blip r:embed="rId2"/>
+          <a:blip r:embed="rId3"/>
           <a:stretch>
             <a:fillRect/>
           </a:stretch>
@@ -10533,7 +10214,7 @@
           <p:nvPr/>
         </p:nvPicPr>
         <p:blipFill>
-          <a:blip r:embed="rId3"/>
+          <a:blip r:embed="rId4"/>
           <a:stretch>
             <a:fillRect/>
           </a:stretch>
@@ -10602,11 +10283,6 @@
               </a:rPr>
               <a:t>3</a:t>
             </a:r>
-            <a:endParaRPr lang="en-US">
-              <a:solidFill>
-                <a:srgbClr val="FF0000"/>
-              </a:solidFill>
-            </a:endParaRPr>
           </a:p>
         </p:txBody>
       </p:sp>
@@ -10693,7 +10369,7 @@
         <p:spPr>
           <a:xfrm>
             <a:off x="521852" y="315311"/>
-            <a:ext cx="4791075" cy="583565"/>
+            <a:ext cx="5564344" cy="584775"/>
           </a:xfrm>
           <a:prstGeom prst="rect">
             <a:avLst/>
@@ -10713,14 +10389,8 @@
                 </a:solidFill>
                 <a:latin typeface="+mj-lt"/>
               </a:rPr>
-              <a:t>1.Khái Niệm và Cấu Tạo</a:t>
-            </a:r>
-            <a:endParaRPr lang="vi-VN" altLang="en-US" sz="3200" b="1">
-              <a:solidFill>
-                <a:schemeClr val="bg1"/>
-              </a:solidFill>
-              <a:latin typeface="+mj-lt"/>
-            </a:endParaRPr>
+              <a:t>1.KHÁI NIỆM VÀ CẤU TẠO. </a:t>
+            </a:r>
           </a:p>
         </p:txBody>
       </p:sp>
@@ -10757,7 +10427,7 @@
           <p:nvPr/>
         </p:nvPicPr>
         <p:blipFill>
-          <a:blip r:embed="rId1"/>
+          <a:blip r:embed="rId2"/>
           <a:stretch>
             <a:fillRect/>
           </a:stretch>
@@ -10973,13 +10643,6 @@
               </a:rPr>
               <a:t>1.2 Cấu tạo Face ID</a:t>
             </a:r>
-            <a:endParaRPr lang="vi-VN" sz="2800" dirty="0">
-              <a:solidFill>
-                <a:srgbClr val="FF0000"/>
-              </a:solidFill>
-              <a:ea typeface="SF Pro Semibold" pitchFamily="2" charset="0"/>
-              <a:cs typeface="Arial" panose="020B0604020202020204" pitchFamily="34" charset="0"/>
-            </a:endParaRPr>
           </a:p>
         </p:txBody>
       </p:sp>
@@ -11016,9 +10679,6 @@
               </a:rPr>
               <a:t>Face ID bao gồm hai phần</a:t>
             </a:r>
-            <a:endParaRPr lang="en-US" sz="2400">
-              <a:cs typeface="Arial" panose="020B0604020202020204" pitchFamily="34" charset="0"/>
-            </a:endParaRPr>
           </a:p>
           <a:p>
             <a:pPr marL="285750" indent="-285750">
@@ -11034,9 +10694,6 @@
               </a:rPr>
               <a:t>mô-đun máy chiếu chấm chiếu hơn 30.000 điểm hồng ngoại lên mặt người dùng</a:t>
             </a:r>
-            <a:endParaRPr lang="en-US" sz="2400">
-              <a:cs typeface="Arial" panose="020B0604020202020204" pitchFamily="34" charset="0"/>
-            </a:endParaRPr>
           </a:p>
           <a:p>
             <a:pPr marL="285750" indent="-285750">
@@ -11052,9 +10709,6 @@
               </a:rPr>
               <a:t> mô-đun camera hồng ngoại đọc mẫu </a:t>
             </a:r>
-            <a:endParaRPr lang="en-US" sz="2400">
-              <a:cs typeface="Arial" panose="020B0604020202020204" pitchFamily="34" charset="0"/>
-            </a:endParaRPr>
           </a:p>
         </p:txBody>
       </p:sp>
@@ -11067,7 +10721,7 @@
           <p:nvPr/>
         </p:nvPicPr>
         <p:blipFill>
-          <a:blip r:embed="rId2"/>
+          <a:blip r:embed="rId3"/>
           <a:stretch>
             <a:fillRect/>
           </a:stretch>
@@ -11091,7 +10745,7 @@
           <p:nvPr/>
         </p:nvPicPr>
         <p:blipFill>
-          <a:blip r:embed="rId3"/>
+          <a:blip r:embed="rId4"/>
           <a:stretch>
             <a:fillRect/>
           </a:stretch>
@@ -11160,11 +10814,6 @@
               </a:rPr>
               <a:t>4</a:t>
             </a:r>
-            <a:endParaRPr lang="en-US">
-              <a:solidFill>
-                <a:srgbClr val="FF0000"/>
-              </a:solidFill>
-            </a:endParaRPr>
           </a:p>
         </p:txBody>
       </p:sp>
@@ -11251,7 +10900,7 @@
         <p:spPr>
           <a:xfrm>
             <a:off x="521852" y="315311"/>
-            <a:ext cx="3118485" cy="583565"/>
+            <a:ext cx="3260829" cy="584775"/>
           </a:xfrm>
           <a:prstGeom prst="rect">
             <a:avLst/>
@@ -11271,14 +10920,8 @@
                 </a:solidFill>
                 <a:latin typeface="+mj-lt"/>
               </a:rPr>
-              <a:t>2.HOẠT ĐỘNG </a:t>
-            </a:r>
-            <a:endParaRPr lang="en-US" sz="3200" b="1">
-              <a:solidFill>
-                <a:schemeClr val="bg1"/>
-              </a:solidFill>
-              <a:latin typeface="+mj-lt"/>
-            </a:endParaRPr>
+              <a:t>2.HOẠT ĐỘNG. </a:t>
+            </a:r>
           </a:p>
         </p:txBody>
       </p:sp>
@@ -11315,7 +10958,7 @@
           <p:nvPr/>
         </p:nvPicPr>
         <p:blipFill>
-          <a:blip r:embed="rId1"/>
+          <a:blip r:embed="rId2"/>
           <a:stretch>
             <a:fillRect/>
           </a:stretch>
@@ -11369,13 +11012,6 @@
               </a:rPr>
               <a:t>2.1.Truyền thống </a:t>
             </a:r>
-            <a:endParaRPr lang="en-US" sz="2800" dirty="0">
-              <a:solidFill>
-                <a:srgbClr val="FF0000"/>
-              </a:solidFill>
-              <a:ea typeface="SF Pro Semibold" pitchFamily="2" charset="0"/>
-              <a:cs typeface="Arial" panose="020B0604020202020204" pitchFamily="34" charset="0"/>
-            </a:endParaRPr>
           </a:p>
           <a:p>
             <a:pPr marL="457200" indent="-457200">
@@ -11392,10 +11028,6 @@
               </a:rPr>
               <a:t>Mỗi khuôn mặt đều có nhiều điểm mốc. Là phần lòi lõm tạo nên khuôn mặt.</a:t>
             </a:r>
-            <a:endParaRPr lang="en-US" sz="2400" dirty="0">
-              <a:ea typeface="SF Pro Semibold" pitchFamily="2" charset="0"/>
-              <a:cs typeface="Arial" panose="020B0604020202020204" pitchFamily="34" charset="0"/>
-            </a:endParaRPr>
           </a:p>
           <a:p>
             <a:pPr marL="457200" indent="-457200">
@@ -11412,10 +11044,6 @@
               </a:rPr>
               <a:t>Hệ thống nhận diện qua những điểm nút</a:t>
             </a:r>
-            <a:endParaRPr lang="en-US" sz="2400" dirty="0">
-              <a:ea typeface="SF Pro Semibold" pitchFamily="2" charset="0"/>
-              <a:cs typeface="Arial" panose="020B0604020202020204" pitchFamily="34" charset="0"/>
-            </a:endParaRPr>
           </a:p>
           <a:p>
             <a:pPr marL="457200" indent="-457200">
@@ -11432,10 +11060,6 @@
               </a:rPr>
               <a:t>Mỗi mặt người có khoảng 80 điểm nút</a:t>
             </a:r>
-            <a:endParaRPr lang="en-US" sz="2400" dirty="0">
-              <a:ea typeface="SF Pro Semibold" pitchFamily="2" charset="0"/>
-              <a:cs typeface="Arial" panose="020B0604020202020204" pitchFamily="34" charset="0"/>
-            </a:endParaRPr>
           </a:p>
           <a:p>
             <a:pPr marL="457200" indent="-457200">
@@ -11491,10 +11115,6 @@
               </a:rPr>
               <a:t>Độ sâu của hốc mắt</a:t>
             </a:r>
-            <a:endParaRPr lang="en-US" sz="2400" dirty="0">
-              <a:ea typeface="SF Pro Semibold" pitchFamily="2" charset="0"/>
-              <a:cs typeface="Arial" panose="020B0604020202020204" pitchFamily="34" charset="0"/>
-            </a:endParaRPr>
           </a:p>
         </p:txBody>
       </p:sp>
@@ -11552,11 +11172,6 @@
               </a:rPr>
               <a:t>5</a:t>
             </a:r>
-            <a:endParaRPr lang="en-US">
-              <a:solidFill>
-                <a:srgbClr val="FF0000"/>
-              </a:solidFill>
-            </a:endParaRPr>
           </a:p>
         </p:txBody>
       </p:sp>
@@ -11665,12 +11280,6 @@
               </a:rPr>
               <a:t>2.HOẠT ĐỘNG </a:t>
             </a:r>
-            <a:endParaRPr lang="en-US" sz="3200" b="1">
-              <a:solidFill>
-                <a:schemeClr val="bg1"/>
-              </a:solidFill>
-              <a:latin typeface="+mj-lt"/>
-            </a:endParaRPr>
           </a:p>
         </p:txBody>
       </p:sp>
@@ -11707,7 +11316,7 @@
           <p:nvPr/>
         </p:nvPicPr>
         <p:blipFill>
-          <a:blip r:embed="rId1"/>
+          <a:blip r:embed="rId2"/>
           <a:stretch>
             <a:fillRect/>
           </a:stretch>
@@ -11761,13 +11370,6 @@
               </a:rPr>
               <a:t>2.1.Truyền thống </a:t>
             </a:r>
-            <a:endParaRPr lang="en-US" sz="2800" dirty="0">
-              <a:solidFill>
-                <a:srgbClr val="FF0000"/>
-              </a:solidFill>
-              <a:ea typeface="SF Pro Semibold" pitchFamily="2" charset="0"/>
-              <a:cs typeface="Arial" panose="020B0604020202020204" pitchFamily="34" charset="0"/>
-            </a:endParaRPr>
           </a:p>
           <a:p>
             <a:pPr marL="0" indent="0">
@@ -11793,7 +11395,7 @@
           <p:nvPr/>
         </p:nvPicPr>
         <p:blipFill>
-          <a:blip r:embed="rId2"/>
+          <a:blip r:embed="rId3"/>
           <a:stretch>
             <a:fillRect/>
           </a:stretch>
@@ -11817,7 +11419,7 @@
           <p:nvPr/>
         </p:nvPicPr>
         <p:blipFill>
-          <a:blip r:embed="rId3"/>
+          <a:blip r:embed="rId4"/>
           <a:stretch>
             <a:fillRect/>
           </a:stretch>
@@ -11841,7 +11443,7 @@
           <p:nvPr/>
         </p:nvPicPr>
         <p:blipFill>
-          <a:blip r:embed="rId4"/>
+          <a:blip r:embed="rId5"/>
           <a:stretch>
             <a:fillRect/>
           </a:stretch>
@@ -11910,11 +11512,6 @@
               </a:rPr>
               <a:t>6</a:t>
             </a:r>
-            <a:endParaRPr lang="en-US">
-              <a:solidFill>
-                <a:srgbClr val="FF0000"/>
-              </a:solidFill>
-            </a:endParaRPr>
           </a:p>
         </p:txBody>
       </p:sp>
@@ -12001,7 +11598,7 @@
         <p:spPr>
           <a:xfrm>
             <a:off x="521852" y="315311"/>
-            <a:ext cx="3118485" cy="583565"/>
+            <a:ext cx="3260829" cy="584775"/>
           </a:xfrm>
           <a:prstGeom prst="rect">
             <a:avLst/>
@@ -12021,14 +11618,8 @@
                 </a:solidFill>
                 <a:latin typeface="+mj-lt"/>
               </a:rPr>
-              <a:t>2.HOẠT ĐỘNG </a:t>
-            </a:r>
-            <a:endParaRPr lang="en-US" sz="3200" b="1">
-              <a:solidFill>
-                <a:schemeClr val="bg1"/>
-              </a:solidFill>
-              <a:latin typeface="+mj-lt"/>
-            </a:endParaRPr>
+              <a:t>2.HOẠT ĐỘNG. </a:t>
+            </a:r>
           </a:p>
         </p:txBody>
       </p:sp>
@@ -12065,7 +11656,7 @@
           <p:nvPr/>
         </p:nvPicPr>
         <p:blipFill>
-          <a:blip r:embed="rId1"/>
+          <a:blip r:embed="rId2"/>
           <a:stretch>
             <a:fillRect/>
           </a:stretch>
@@ -12119,13 +11710,6 @@
               </a:rPr>
               <a:t>2.2.Nâng cao dạng 3D</a:t>
             </a:r>
-            <a:endParaRPr lang="en-US" sz="2400" dirty="0">
-              <a:solidFill>
-                <a:srgbClr val="FF0000"/>
-              </a:solidFill>
-              <a:ea typeface="SF Pro Semibold" pitchFamily="2" charset="0"/>
-              <a:cs typeface="Arial" panose="020B0604020202020204" pitchFamily="34" charset="0"/>
-            </a:endParaRPr>
           </a:p>
           <a:p>
             <a:pPr marL="457200" indent="-457200">
@@ -12142,10 +11726,6 @@
               </a:rPr>
               <a:t> Kỹ thuật này sử dụng các cảm biến 3D để nắm bắt thông tin về hình dạng của khuôn mặt.</a:t>
             </a:r>
-            <a:endParaRPr lang="en-US" sz="2400" dirty="0">
-              <a:ea typeface="SF Pro Semibold" pitchFamily="2" charset="0"/>
-              <a:cs typeface="Arial" panose="020B0604020202020204" pitchFamily="34" charset="0"/>
-            </a:endParaRPr>
           </a:p>
           <a:p>
             <a:pPr marL="457200" indent="-457200">
@@ -12162,10 +11742,6 @@
               </a:rPr>
               <a:t>Thông tin này được sử dụng xác định một khuôn mặt như các đường viền của hốc mắt, mũi và cằm.</a:t>
             </a:r>
-            <a:endParaRPr lang="en-US" sz="2400" dirty="0">
-              <a:ea typeface="SF Pro Semibold" pitchFamily="2" charset="0"/>
-              <a:cs typeface="Arial" panose="020B0604020202020204" pitchFamily="34" charset="0"/>
-            </a:endParaRPr>
           </a:p>
           <a:p>
             <a:pPr marL="457200" indent="-457200">
@@ -12182,10 +11758,6 @@
               </a:rPr>
               <a:t>Nhận dạng khuôn mặt 3D là nó không bị ảnh hưởng bởi những thay đổi trong ánh sáng.</a:t>
             </a:r>
-            <a:endParaRPr lang="en-US" sz="2400" dirty="0">
-              <a:ea typeface="SF Pro Semibold" pitchFamily="2" charset="0"/>
-              <a:cs typeface="Arial" panose="020B0604020202020204" pitchFamily="34" charset="0"/>
-            </a:endParaRPr>
           </a:p>
           <a:p>
             <a:pPr marL="457200" indent="-457200">
@@ -12256,11 +11828,6 @@
               </a:rPr>
               <a:t>7</a:t>
             </a:r>
-            <a:endParaRPr lang="en-US">
-              <a:solidFill>
-                <a:srgbClr val="FF0000"/>
-              </a:solidFill>
-            </a:endParaRPr>
           </a:p>
         </p:txBody>
       </p:sp>
@@ -12347,7 +11914,7 @@
         <p:spPr>
           <a:xfrm>
             <a:off x="521852" y="315311"/>
-            <a:ext cx="3118485" cy="583565"/>
+            <a:ext cx="3260829" cy="584775"/>
           </a:xfrm>
           <a:prstGeom prst="rect">
             <a:avLst/>
@@ -12367,14 +11934,8 @@
                 </a:solidFill>
                 <a:latin typeface="+mj-lt"/>
               </a:rPr>
-              <a:t>2.HOẠT ĐỘNG </a:t>
-            </a:r>
-            <a:endParaRPr lang="en-US" sz="3200" b="1">
-              <a:solidFill>
-                <a:schemeClr val="bg1"/>
-              </a:solidFill>
-              <a:latin typeface="+mj-lt"/>
-            </a:endParaRPr>
+              <a:t>2.HOẠT ĐỘNG. </a:t>
+            </a:r>
           </a:p>
         </p:txBody>
       </p:sp>
@@ -12411,7 +11972,7 @@
           <p:nvPr/>
         </p:nvPicPr>
         <p:blipFill>
-          <a:blip r:embed="rId1"/>
+          <a:blip r:embed="rId2"/>
           <a:stretch>
             <a:fillRect/>
           </a:stretch>
@@ -12465,13 +12026,6 @@
               </a:rPr>
               <a:t>2.2.Nâng cao dạng 3D</a:t>
             </a:r>
-            <a:endParaRPr lang="en-US" sz="2400" dirty="0">
-              <a:solidFill>
-                <a:srgbClr val="FF0000"/>
-              </a:solidFill>
-              <a:ea typeface="SF Pro Semibold" pitchFamily="2" charset="0"/>
-              <a:cs typeface="Arial" panose="020B0604020202020204" pitchFamily="34" charset="0"/>
-            </a:endParaRPr>
           </a:p>
           <a:p>
             <a:pPr marL="0" indent="0">
@@ -12510,7 +12064,7 @@
           <p:nvPr/>
         </p:nvPicPr>
         <p:blipFill>
-          <a:blip r:embed="rId2"/>
+          <a:blip r:embed="rId3"/>
           <a:stretch>
             <a:fillRect/>
           </a:stretch>
@@ -12534,7 +12088,7 @@
           <p:nvPr/>
         </p:nvPicPr>
         <p:blipFill>
-          <a:blip r:embed="rId3"/>
+          <a:blip r:embed="rId4"/>
           <a:stretch>
             <a:fillRect/>
           </a:stretch>
@@ -12603,11 +12157,6 @@
               </a:rPr>
               <a:t>8</a:t>
             </a:r>
-            <a:endParaRPr lang="en-US">
-              <a:solidFill>
-                <a:srgbClr val="FF0000"/>
-              </a:solidFill>
-            </a:endParaRPr>
           </a:p>
         </p:txBody>
       </p:sp>
@@ -12694,7 +12243,7 @@
         <p:spPr>
           <a:xfrm>
             <a:off x="521852" y="315311"/>
-            <a:ext cx="3118485" cy="583565"/>
+            <a:ext cx="3260829" cy="584775"/>
           </a:xfrm>
           <a:prstGeom prst="rect">
             <a:avLst/>
@@ -12714,14 +12263,8 @@
                 </a:solidFill>
                 <a:latin typeface="+mj-lt"/>
               </a:rPr>
-              <a:t>2.HOẠT ĐỘNG </a:t>
-            </a:r>
-            <a:endParaRPr lang="en-US" sz="3200" b="1">
-              <a:solidFill>
-                <a:schemeClr val="bg1"/>
-              </a:solidFill>
-              <a:latin typeface="+mj-lt"/>
-            </a:endParaRPr>
+              <a:t>2.HOẠT ĐỘNG. </a:t>
+            </a:r>
           </a:p>
         </p:txBody>
       </p:sp>
@@ -12758,7 +12301,7 @@
           <p:nvPr/>
         </p:nvPicPr>
         <p:blipFill>
-          <a:blip r:embed="rId1"/>
+          <a:blip r:embed="rId2"/>
           <a:stretch>
             <a:fillRect/>
           </a:stretch>
@@ -12812,13 +12355,6 @@
               </a:rPr>
               <a:t>2.3.Phân tích kết cấu da</a:t>
             </a:r>
-            <a:endParaRPr lang="en-US" sz="2400" dirty="0">
-              <a:solidFill>
-                <a:srgbClr val="FF0000"/>
-              </a:solidFill>
-              <a:ea typeface="SF Pro Semibold" pitchFamily="2" charset="0"/>
-              <a:cs typeface="Arial" panose="020B0604020202020204" pitchFamily="34" charset="0"/>
-            </a:endParaRPr>
           </a:p>
           <a:p>
             <a:pPr marL="457200" indent="-457200">
@@ -12835,10 +12371,6 @@
               </a:rPr>
               <a:t> sử dụng các chi tiết hình ảnh của da, được chụp trong các hình ảnh kỹ thuật số hoặc máy scan tiêu chuẩn.</a:t>
             </a:r>
-            <a:endParaRPr lang="en-US" sz="2400" dirty="0">
-              <a:ea typeface="SF Pro Semibold" pitchFamily="2" charset="0"/>
-              <a:cs typeface="Arial" panose="020B0604020202020204" pitchFamily="34" charset="0"/>
-            </a:endParaRPr>
           </a:p>
           <a:p>
             <a:pPr marL="457200" indent="-457200">
@@ -12855,10 +12387,6 @@
               </a:rPr>
               <a:t>phân tích kết cấu da, các đường đặc trưng, hình dạng và điểm nốt trên da.</a:t>
             </a:r>
-            <a:endParaRPr lang="en-US" sz="2400" dirty="0">
-              <a:ea typeface="SF Pro Semibold" pitchFamily="2" charset="0"/>
-              <a:cs typeface="Arial" panose="020B0604020202020204" pitchFamily="34" charset="0"/>
-            </a:endParaRPr>
           </a:p>
           <a:p>
             <a:pPr marL="457200" indent="-457200">
@@ -12875,10 +12403,6 @@
               </a:rPr>
               <a:t>Đưa vào không gian toán học.</a:t>
             </a:r>
-            <a:endParaRPr lang="en-US" sz="2400" dirty="0">
-              <a:ea typeface="SF Pro Semibold" pitchFamily="2" charset="0"/>
-              <a:cs typeface="Arial" panose="020B0604020202020204" pitchFamily="34" charset="0"/>
-            </a:endParaRPr>
           </a:p>
           <a:p>
             <a:pPr marL="457200" indent="-457200">
@@ -12988,11 +12512,6 @@
               </a:rPr>
               <a:t>9</a:t>
             </a:r>
-            <a:endParaRPr lang="en-US">
-              <a:solidFill>
-                <a:srgbClr val="FF0000"/>
-              </a:solidFill>
-            </a:endParaRPr>
           </a:p>
         </p:txBody>
       </p:sp>
@@ -13227,6 +12746,7 @@
       </a:bgFillStyleLst>
     </a:fmtScheme>
   </a:themeElements>
+  <a:objectDefaults/>
   <a:extraClrSchemeLst>
     <a:extraClrScheme>
       <a:clrScheme name="cdb2004158l 1">

</xml_diff>

<commit_message>
sửa nd phần 4
</commit_message>
<xml_diff>
--- a/BÀI THUYẾT TRÌNH MẪU.pptx
+++ b/BÀI THUYẾT TRÌNH MẪU.pptx
@@ -9807,7 +9807,7 @@
         <p:spPr>
           <a:xfrm>
             <a:off x="703384" y="1121261"/>
-            <a:ext cx="8169310" cy="3028714"/>
+            <a:ext cx="8169310" cy="3890489"/>
           </a:xfrm>
           <a:prstGeom prst="rect">
             <a:avLst/>
@@ -9860,6 +9860,9 @@
           </a:p>
           <a:p>
             <a:pPr marL="457200" indent="-457200">
+              <a:lnSpc>
+                <a:spcPct val="150000"/>
+              </a:lnSpc>
               <a:buFont typeface="Wingdings" panose="05000000000000000000" pitchFamily="2" charset="2"/>
               <a:buChar char="ü"/>
             </a:pPr>
@@ -10295,6 +10298,9 @@
           </a:p>
           <a:p>
             <a:pPr marL="457200" indent="-457200">
+              <a:lnSpc>
+                <a:spcPct val="150000"/>
+              </a:lnSpc>
               <a:buFont typeface="Wingdings" panose="05000000000000000000" pitchFamily="2" charset="2"/>
               <a:buChar char="ü"/>
             </a:pPr>
@@ -10856,7 +10862,7 @@
         <p:spPr>
           <a:xfrm>
             <a:off x="703384" y="1121261"/>
-            <a:ext cx="8169310" cy="8005910"/>
+            <a:ext cx="8169310" cy="8932445"/>
           </a:xfrm>
           <a:prstGeom prst="rect">
             <a:avLst/>
@@ -10910,7 +10916,7 @@
           <a:p>
             <a:pPr marL="457200" marR="0" indent="-457200">
               <a:lnSpc>
-                <a:spcPct val="107000"/>
+                <a:spcPct val="150000"/>
               </a:lnSpc>
               <a:spcBef>
                 <a:spcPts val="0"/>
@@ -11142,7 +11148,7 @@
           <a:p>
             <a:pPr marL="457200" marR="0" indent="-457200">
               <a:lnSpc>
-                <a:spcPct val="107000"/>
+                <a:spcPct val="150000"/>
               </a:lnSpc>
               <a:spcBef>
                 <a:spcPts val="0"/>
@@ -11417,7 +11423,7 @@
           <a:p>
             <a:pPr marL="457200" indent="-457200">
               <a:lnSpc>
-                <a:spcPct val="107000"/>
+                <a:spcPct val="150000"/>
               </a:lnSpc>
               <a:spcBef>
                 <a:spcPts val="0"/>
@@ -11640,7 +11646,7 @@
           <a:p>
             <a:pPr marL="457200" indent="-457200">
               <a:lnSpc>
-                <a:spcPct val="107000"/>
+                <a:spcPct val="150000"/>
               </a:lnSpc>
               <a:spcBef>
                 <a:spcPts val="0"/>
@@ -13207,7 +13213,7 @@
         <p:spPr>
           <a:xfrm>
             <a:off x="703384" y="1121261"/>
-            <a:ext cx="8169310" cy="7589770"/>
+            <a:ext cx="8169310" cy="9072227"/>
           </a:xfrm>
           <a:prstGeom prst="rect">
             <a:avLst/>
@@ -13222,7 +13228,7 @@
           <a:p>
             <a:pPr marL="457200" indent="-457200">
               <a:lnSpc>
-                <a:spcPct val="107000"/>
+                <a:spcPct val="150000"/>
               </a:lnSpc>
               <a:spcBef>
                 <a:spcPts val="0"/>
@@ -13288,7 +13294,7 @@
           <a:p>
             <a:pPr marL="457200" indent="-457200">
               <a:lnSpc>
-                <a:spcPct val="107000"/>
+                <a:spcPct val="150000"/>
               </a:lnSpc>
               <a:spcBef>
                 <a:spcPts val="0"/>
@@ -14473,7 +14479,7 @@
           <a:p>
             <a:pPr>
               <a:lnSpc>
-                <a:spcPct val="107000"/>
+                <a:spcPct val="150000"/>
               </a:lnSpc>
               <a:spcBef>
                 <a:spcPts val="0"/>

</xml_diff>

<commit_message>
chỉnh sửa cuối cùng
</commit_message>
<xml_diff>
--- a/BÀI THUYẾT TRÌNH MẪU.pptx
+++ b/BÀI THUYẾT TRÌNH MẪU.pptx
@@ -734,7 +734,7 @@
           <a:p>
             <a:fld id="{6BDEAFE6-325E-AA48-AC90-E1B1FC9AAA75}" type="datetimeFigureOut">
               <a:rPr lang="en-US"/>
-              <a:t>10/22/2023</a:t>
+              <a:t>10/22/23</a:t>
             </a:fld>
             <a:endParaRPr lang="en-US"/>
           </a:p>
@@ -922,7 +922,7 @@
           <a:p>
             <a:fld id="{6BDEAFE6-325E-AA48-AC90-E1B1FC9AAA75}" type="datetimeFigureOut">
               <a:rPr lang="en-US"/>
-              <a:t>10/22/2023</a:t>
+              <a:t>10/22/23</a:t>
             </a:fld>
             <a:endParaRPr lang="en-US"/>
           </a:p>
@@ -1105,7 +1105,7 @@
           <a:p>
             <a:fld id="{6BDEAFE6-325E-AA48-AC90-E1B1FC9AAA75}" type="datetimeFigureOut">
               <a:rPr lang="en-US"/>
-              <a:t>10/22/2023</a:t>
+              <a:t>10/22/23</a:t>
             </a:fld>
             <a:endParaRPr lang="en-US"/>
           </a:p>
@@ -1283,7 +1283,7 @@
           <a:p>
             <a:fld id="{6BDEAFE6-325E-AA48-AC90-E1B1FC9AAA75}" type="datetimeFigureOut">
               <a:rPr lang="en-US"/>
-              <a:t>10/22/2023</a:t>
+              <a:t>10/22/23</a:t>
             </a:fld>
             <a:endParaRPr lang="en-US"/>
           </a:p>
@@ -1484,7 +1484,7 @@
           <a:p>
             <a:fld id="{6BDEAFE6-325E-AA48-AC90-E1B1FC9AAA75}" type="datetimeFigureOut">
               <a:rPr lang="en-US"/>
-              <a:t>10/22/2023</a:t>
+              <a:t>10/22/23</a:t>
             </a:fld>
             <a:endParaRPr lang="en-US"/>
           </a:p>
@@ -1779,7 +1779,7 @@
           <a:p>
             <a:fld id="{6BDEAFE6-325E-AA48-AC90-E1B1FC9AAA75}" type="datetimeFigureOut">
               <a:rPr lang="en-US"/>
-              <a:t>10/22/2023</a:t>
+              <a:t>10/22/23</a:t>
             </a:fld>
             <a:endParaRPr lang="en-US"/>
           </a:p>
@@ -2213,7 +2213,7 @@
           <a:p>
             <a:fld id="{6BDEAFE6-325E-AA48-AC90-E1B1FC9AAA75}" type="datetimeFigureOut">
               <a:rPr lang="en-US"/>
-              <a:t>10/22/2023</a:t>
+              <a:t>10/22/23</a:t>
             </a:fld>
             <a:endParaRPr lang="en-US"/>
           </a:p>
@@ -2340,7 +2340,7 @@
           <a:p>
             <a:fld id="{6BDEAFE6-325E-AA48-AC90-E1B1FC9AAA75}" type="datetimeFigureOut">
               <a:rPr lang="en-US"/>
-              <a:t>10/22/2023</a:t>
+              <a:t>10/22/23</a:t>
             </a:fld>
             <a:endParaRPr lang="en-US"/>
           </a:p>
@@ -2445,7 +2445,7 @@
           <a:p>
             <a:fld id="{6BDEAFE6-325E-AA48-AC90-E1B1FC9AAA75}" type="datetimeFigureOut">
               <a:rPr lang="en-US"/>
-              <a:t>10/22/2023</a:t>
+              <a:t>10/22/23</a:t>
             </a:fld>
             <a:endParaRPr lang="en-US"/>
           </a:p>
@@ -2730,7 +2730,7 @@
           <a:p>
             <a:fld id="{6BDEAFE6-325E-AA48-AC90-E1B1FC9AAA75}" type="datetimeFigureOut">
               <a:rPr lang="en-US"/>
-              <a:t>10/22/2023</a:t>
+              <a:t>10/22/23</a:t>
             </a:fld>
             <a:endParaRPr lang="en-US"/>
           </a:p>
@@ -2996,7 +2996,7 @@
           <a:p>
             <a:fld id="{6BDEAFE6-325E-AA48-AC90-E1B1FC9AAA75}" type="datetimeFigureOut">
               <a:rPr lang="en-US"/>
-              <a:t>10/22/2023</a:t>
+              <a:t>10/22/23</a:t>
             </a:fld>
             <a:endParaRPr lang="en-US"/>
           </a:p>
@@ -3631,7 +3631,7 @@
           <a:p>
             <a:fld id="{6BDEAFE6-325E-AA48-AC90-E1B1FC9AAA75}" type="datetimeFigureOut">
               <a:rPr lang="en-US"/>
-              <a:t>10/22/2023</a:t>
+              <a:t>10/22/23</a:t>
             </a:fld>
             <a:endParaRPr lang="en-US"/>
           </a:p>
@@ -17173,7 +17173,7 @@
               <a:buChar char="Ø"/>
             </a:pPr>
             <a:r>
-              <a:rPr lang="en-US" sz="2400" dirty="0">
+              <a:rPr lang="en-US" sz="2800" dirty="0">
                 <a:solidFill>
                   <a:srgbClr val="FF0000"/>
                 </a:solidFill>
@@ -17468,7 +17468,7 @@
         <p:spPr>
           <a:xfrm>
             <a:off x="703384" y="1121257"/>
-            <a:ext cx="8169310" cy="1753235"/>
+            <a:ext cx="8169310" cy="1778179"/>
           </a:xfrm>
           <a:prstGeom prst="rect">
             <a:avLst/>
@@ -17489,7 +17489,7 @@
               <a:buChar char="Ø"/>
             </a:pPr>
             <a:r>
-              <a:rPr lang="en-US" sz="2400" dirty="0">
+              <a:rPr lang="en-US" sz="2800" dirty="0">
                 <a:solidFill>
                   <a:srgbClr val="FF0000"/>
                 </a:solidFill>
@@ -17818,7 +17818,7 @@
               <a:buChar char="Ø"/>
             </a:pPr>
             <a:r>
-              <a:rPr lang="en-US" sz="2400" dirty="0">
+              <a:rPr lang="en-US" sz="2800" dirty="0">
                 <a:solidFill>
                   <a:srgbClr val="FF0000"/>
                 </a:solidFill>

</xml_diff>